<commit_message>
Updated ppt and code
</commit_message>
<xml_diff>
--- a/JavaScript Fundamentals.pptx
+++ b/JavaScript Fundamentals.pptx
@@ -8,33 +8,34 @@
     <p:sldMasterId id="2147483911" r:id="rId4"/>
   </p:sldMasterIdLst>
   <p:notesMasterIdLst>
-    <p:notesMasterId r:id="rId26"/>
+    <p:notesMasterId r:id="rId27"/>
   </p:notesMasterIdLst>
   <p:handoutMasterIdLst>
-    <p:handoutMasterId r:id="rId27"/>
+    <p:handoutMasterId r:id="rId28"/>
   </p:handoutMasterIdLst>
   <p:sldIdLst>
     <p:sldId id="256" r:id="rId5"/>
     <p:sldId id="257" r:id="rId6"/>
     <p:sldId id="258" r:id="rId7"/>
     <p:sldId id="259" r:id="rId8"/>
-    <p:sldId id="272" r:id="rId9"/>
-    <p:sldId id="265" r:id="rId10"/>
+    <p:sldId id="265" r:id="rId9"/>
+    <p:sldId id="272" r:id="rId10"/>
     <p:sldId id="266" r:id="rId11"/>
     <p:sldId id="267" r:id="rId12"/>
     <p:sldId id="262" r:id="rId13"/>
     <p:sldId id="263" r:id="rId14"/>
-    <p:sldId id="261" r:id="rId15"/>
-    <p:sldId id="264" r:id="rId16"/>
-    <p:sldId id="271" r:id="rId17"/>
-    <p:sldId id="269" r:id="rId18"/>
-    <p:sldId id="270" r:id="rId19"/>
-    <p:sldId id="260" r:id="rId20"/>
-    <p:sldId id="268" r:id="rId21"/>
-    <p:sldId id="273" r:id="rId22"/>
-    <p:sldId id="274" r:id="rId23"/>
-    <p:sldId id="275" r:id="rId24"/>
-    <p:sldId id="276" r:id="rId25"/>
+    <p:sldId id="277" r:id="rId15"/>
+    <p:sldId id="261" r:id="rId16"/>
+    <p:sldId id="264" r:id="rId17"/>
+    <p:sldId id="271" r:id="rId18"/>
+    <p:sldId id="269" r:id="rId19"/>
+    <p:sldId id="270" r:id="rId20"/>
+    <p:sldId id="260" r:id="rId21"/>
+    <p:sldId id="268" r:id="rId22"/>
+    <p:sldId id="273" r:id="rId23"/>
+    <p:sldId id="274" r:id="rId24"/>
+    <p:sldId id="275" r:id="rId25"/>
+    <p:sldId id="276" r:id="rId26"/>
   </p:sldIdLst>
   <p:sldSz cx="9144000" cy="6858000" type="screen4x3"/>
   <p:notesSz cx="6858000" cy="9144000"/>
@@ -219,7 +220,7 @@
             <a:fld id="{0054C2FE-BA7B-41D2-B892-E5AC5FCF854B}" type="datetimeFigureOut">
               <a:rPr lang="da-DK" smtClean="0"/>
               <a:pPr/>
-              <a:t>27-10-2014</a:t>
+              <a:t>28-10-2014</a:t>
             </a:fld>
             <a:endParaRPr lang="da-DK" dirty="0"/>
           </a:p>
@@ -387,7 +388,7 @@
             <a:fld id="{454483E1-46E1-47A5-84FB-98D3EDCCF46E}" type="datetimeFigureOut">
               <a:rPr lang="da-DK" smtClean="0"/>
               <a:pPr/>
-              <a:t>27-10-2014</a:t>
+              <a:t>28-10-2014</a:t>
             </a:fld>
             <a:endParaRPr lang="da-DK" dirty="0"/>
           </a:p>
@@ -765,6 +766,654 @@
           <a:lstStyle/>
           <a:p>
             <a:r>
+              <a:rPr lang="da-DK" dirty="0" smtClean="0"/>
+              <a:t>Most </a:t>
+            </a:r>
+            <a:r>
+              <a:rPr lang="da-DK" dirty="0" err="1" smtClean="0"/>
+              <a:t>people</a:t>
+            </a:r>
+            <a:r>
+              <a:rPr lang="da-DK" dirty="0" smtClean="0"/>
+              <a:t> </a:t>
+            </a:r>
+            <a:r>
+              <a:rPr lang="da-DK" dirty="0" err="1" smtClean="0"/>
+              <a:t>make</a:t>
+            </a:r>
+            <a:r>
+              <a:rPr lang="da-DK" dirty="0" smtClean="0"/>
+              <a:t> the </a:t>
+            </a:r>
+            <a:r>
+              <a:rPr lang="da-DK" dirty="0" err="1" smtClean="0"/>
+              <a:t>mistake</a:t>
+            </a:r>
+            <a:r>
+              <a:rPr lang="da-DK" dirty="0" smtClean="0"/>
+              <a:t> of </a:t>
+            </a:r>
+            <a:r>
+              <a:rPr lang="da-DK" dirty="0" err="1" smtClean="0"/>
+              <a:t>trying</a:t>
+            </a:r>
+            <a:r>
+              <a:rPr lang="da-DK" baseline="0" dirty="0" smtClean="0"/>
+              <a:t> to </a:t>
+            </a:r>
+            <a:r>
+              <a:rPr lang="da-DK" baseline="0" dirty="0" err="1" smtClean="0"/>
+              <a:t>cram</a:t>
+            </a:r>
+            <a:r>
+              <a:rPr lang="da-DK" baseline="0" dirty="0" smtClean="0"/>
+              <a:t> </a:t>
+            </a:r>
+            <a:r>
+              <a:rPr lang="da-DK" baseline="0" dirty="0" err="1" smtClean="0"/>
+              <a:t>javascript</a:t>
+            </a:r>
+            <a:r>
+              <a:rPr lang="da-DK" baseline="0" dirty="0" smtClean="0"/>
+              <a:t> </a:t>
+            </a:r>
+            <a:r>
+              <a:rPr lang="da-DK" baseline="0" dirty="0" err="1" smtClean="0"/>
+              <a:t>into</a:t>
+            </a:r>
+            <a:r>
+              <a:rPr lang="da-DK" baseline="0" dirty="0" smtClean="0"/>
+              <a:t> the </a:t>
+            </a:r>
+            <a:r>
+              <a:rPr lang="da-DK" baseline="0" dirty="0" err="1" smtClean="0"/>
+              <a:t>classical</a:t>
+            </a:r>
+            <a:r>
+              <a:rPr lang="da-DK" baseline="0" dirty="0" smtClean="0"/>
+              <a:t> </a:t>
+            </a:r>
+            <a:r>
+              <a:rPr lang="da-DK" baseline="0" dirty="0" err="1" smtClean="0"/>
+              <a:t>class</a:t>
+            </a:r>
+            <a:r>
+              <a:rPr lang="da-DK" baseline="0" dirty="0" smtClean="0"/>
+              <a:t> </a:t>
+            </a:r>
+            <a:r>
+              <a:rPr lang="da-DK" baseline="0" dirty="0" err="1" smtClean="0"/>
+              <a:t>oriented</a:t>
+            </a:r>
+            <a:r>
+              <a:rPr lang="da-DK" baseline="0" dirty="0" smtClean="0"/>
+              <a:t> </a:t>
+            </a:r>
+            <a:r>
+              <a:rPr lang="da-DK" baseline="0" dirty="0" err="1" smtClean="0"/>
+              <a:t>programming</a:t>
+            </a:r>
+            <a:r>
+              <a:rPr lang="da-DK" baseline="0" dirty="0" smtClean="0"/>
+              <a:t> </a:t>
+            </a:r>
+            <a:r>
+              <a:rPr lang="da-DK" baseline="0" dirty="0" err="1" smtClean="0"/>
+              <a:t>paradigm</a:t>
+            </a:r>
+            <a:r>
+              <a:rPr lang="da-DK" baseline="0" dirty="0" smtClean="0"/>
+              <a:t>. It is not </a:t>
+            </a:r>
+            <a:r>
+              <a:rPr lang="da-DK" baseline="0" dirty="0" err="1" smtClean="0"/>
+              <a:t>very</a:t>
+            </a:r>
+            <a:r>
+              <a:rPr lang="da-DK" baseline="0" dirty="0" smtClean="0"/>
+              <a:t> </a:t>
+            </a:r>
+            <a:r>
+              <a:rPr lang="da-DK" baseline="0" dirty="0" err="1" smtClean="0"/>
+              <a:t>well</a:t>
+            </a:r>
+            <a:r>
+              <a:rPr lang="da-DK" baseline="0" dirty="0" smtClean="0"/>
+              <a:t> </a:t>
+            </a:r>
+            <a:r>
+              <a:rPr lang="da-DK" baseline="0" dirty="0" err="1" smtClean="0"/>
+              <a:t>suited</a:t>
+            </a:r>
+            <a:r>
+              <a:rPr lang="da-DK" baseline="0" dirty="0" smtClean="0"/>
+              <a:t> for </a:t>
+            </a:r>
+            <a:r>
+              <a:rPr lang="da-DK" baseline="0" dirty="0" err="1" smtClean="0"/>
+              <a:t>that</a:t>
+            </a:r>
+            <a:endParaRPr lang="da-DK" baseline="0" dirty="0" smtClean="0"/>
+          </a:p>
+          <a:p>
+            <a:r>
+              <a:rPr lang="da-DK" baseline="0" dirty="0" err="1" smtClean="0"/>
+              <a:t>You</a:t>
+            </a:r>
+            <a:r>
+              <a:rPr lang="da-DK" baseline="0" dirty="0" smtClean="0"/>
+              <a:t> </a:t>
+            </a:r>
+            <a:r>
+              <a:rPr lang="da-DK" baseline="0" dirty="0" err="1" smtClean="0"/>
+              <a:t>will</a:t>
+            </a:r>
+            <a:r>
+              <a:rPr lang="da-DK" baseline="0" dirty="0" smtClean="0"/>
+              <a:t> </a:t>
+            </a:r>
+            <a:r>
+              <a:rPr lang="da-DK" baseline="0" dirty="0" err="1" smtClean="0"/>
+              <a:t>be</a:t>
+            </a:r>
+            <a:r>
+              <a:rPr lang="da-DK" baseline="0" dirty="0" smtClean="0"/>
+              <a:t> </a:t>
+            </a:r>
+            <a:r>
+              <a:rPr lang="da-DK" baseline="0" dirty="0" err="1" smtClean="0"/>
+              <a:t>working</a:t>
+            </a:r>
+            <a:r>
+              <a:rPr lang="da-DK" baseline="0" dirty="0" smtClean="0"/>
+              <a:t> </a:t>
+            </a:r>
+            <a:r>
+              <a:rPr lang="da-DK" baseline="0" dirty="0" err="1" smtClean="0"/>
+              <a:t>against</a:t>
+            </a:r>
+            <a:r>
+              <a:rPr lang="da-DK" baseline="0" dirty="0" smtClean="0"/>
+              <a:t> the </a:t>
+            </a:r>
+            <a:r>
+              <a:rPr lang="da-DK" baseline="0" dirty="0" err="1" smtClean="0"/>
+              <a:t>language</a:t>
+            </a:r>
+            <a:r>
+              <a:rPr lang="da-DK" baseline="0" dirty="0" smtClean="0"/>
+              <a:t>.</a:t>
+            </a:r>
+          </a:p>
+          <a:p>
+            <a:endParaRPr lang="da-DK" baseline="0" dirty="0" smtClean="0"/>
+          </a:p>
+          <a:p>
+            <a:r>
+              <a:rPr lang="da-DK" baseline="0" dirty="0" smtClean="0"/>
+              <a:t>Show proto0</a:t>
+            </a:r>
+          </a:p>
+          <a:p>
+            <a:endParaRPr lang="da-DK" baseline="0" dirty="0" smtClean="0"/>
+          </a:p>
+          <a:p>
+            <a:r>
+              <a:rPr lang="da-DK" baseline="0" dirty="0" smtClean="0"/>
+              <a:t>Show prototype3</a:t>
+            </a:r>
+            <a:endParaRPr lang="da-DK" dirty="0"/>
+          </a:p>
+        </p:txBody>
+      </p:sp>
+    </p:spTree>
+    <p:extLst>
+      <p:ext uri="{BB962C8B-B14F-4D97-AF65-F5344CB8AC3E}">
+        <p14:creationId xmlns:p14="http://schemas.microsoft.com/office/powerpoint/2010/main" val="45028235"/>
+      </p:ext>
+    </p:extLst>
+  </p:cSld>
+  <p:clrMapOvr>
+    <a:masterClrMapping/>
+  </p:clrMapOvr>
+</p:notes>
+</file>
+
+<file path=ppt/notesSlides/notesSlide11.xml><?xml version="1.0" encoding="utf-8"?>
+<p:notes xmlns:a="http://schemas.openxmlformats.org/drawingml/2006/main" xmlns:r="http://schemas.openxmlformats.org/officeDocument/2006/relationships" xmlns:p="http://schemas.openxmlformats.org/presentationml/2006/main">
+  <p:cSld>
+    <p:spTree>
+      <p:nvGrpSpPr>
+        <p:cNvPr id="1" name=""/>
+        <p:cNvGrpSpPr/>
+        <p:nvPr/>
+      </p:nvGrpSpPr>
+      <p:grpSpPr>
+        <a:xfrm>
+          <a:off x="0" y="0"/>
+          <a:ext cx="0" cy="0"/>
+          <a:chOff x="0" y="0"/>
+          <a:chExt cx="0" cy="0"/>
+        </a:xfrm>
+      </p:grpSpPr>
+      <p:sp>
+        <p:nvSpPr>
+          <p:cNvPr id="2" name="Slide Image Placeholder 1"/>
+          <p:cNvSpPr>
+            <a:spLocks noGrp="1" noRot="1" noChangeAspect="1"/>
+          </p:cNvSpPr>
+          <p:nvPr>
+            <p:ph type="sldImg"/>
+          </p:nvPr>
+        </p:nvSpPr>
+        <p:spPr/>
+      </p:sp>
+      <p:sp>
+        <p:nvSpPr>
+          <p:cNvPr id="3" name="Notes Placeholder 2"/>
+          <p:cNvSpPr>
+            <a:spLocks noGrp="1"/>
+          </p:cNvSpPr>
+          <p:nvPr>
+            <p:ph type="body" idx="1"/>
+          </p:nvPr>
+        </p:nvSpPr>
+        <p:spPr/>
+        <p:txBody>
+          <a:bodyPr/>
+          <a:lstStyle/>
+          <a:p>
+            <a:r>
+              <a:rPr lang="da-DK" dirty="0" smtClean="0"/>
+              <a:t>Proto3</a:t>
+            </a:r>
+            <a:endParaRPr lang="da-DK" dirty="0"/>
+          </a:p>
+        </p:txBody>
+      </p:sp>
+    </p:spTree>
+    <p:extLst>
+      <p:ext uri="{BB962C8B-B14F-4D97-AF65-F5344CB8AC3E}">
+        <p14:creationId xmlns:p14="http://schemas.microsoft.com/office/powerpoint/2010/main" val="724399097"/>
+      </p:ext>
+    </p:extLst>
+  </p:cSld>
+  <p:clrMapOvr>
+    <a:masterClrMapping/>
+  </p:clrMapOvr>
+</p:notes>
+</file>
+
+<file path=ppt/notesSlides/notesSlide12.xml><?xml version="1.0" encoding="utf-8"?>
+<p:notes xmlns:a="http://schemas.openxmlformats.org/drawingml/2006/main" xmlns:r="http://schemas.openxmlformats.org/officeDocument/2006/relationships" xmlns:p="http://schemas.openxmlformats.org/presentationml/2006/main">
+  <p:cSld>
+    <p:spTree>
+      <p:nvGrpSpPr>
+        <p:cNvPr id="1" name=""/>
+        <p:cNvGrpSpPr/>
+        <p:nvPr/>
+      </p:nvGrpSpPr>
+      <p:grpSpPr>
+        <a:xfrm>
+          <a:off x="0" y="0"/>
+          <a:ext cx="0" cy="0"/>
+          <a:chOff x="0" y="0"/>
+          <a:chExt cx="0" cy="0"/>
+        </a:xfrm>
+      </p:grpSpPr>
+      <p:sp>
+        <p:nvSpPr>
+          <p:cNvPr id="2" name="Slide Image Placeholder 1"/>
+          <p:cNvSpPr>
+            <a:spLocks noGrp="1" noRot="1" noChangeAspect="1"/>
+          </p:cNvSpPr>
+          <p:nvPr>
+            <p:ph type="sldImg"/>
+          </p:nvPr>
+        </p:nvSpPr>
+        <p:spPr/>
+      </p:sp>
+      <p:sp>
+        <p:nvSpPr>
+          <p:cNvPr id="3" name="Notes Placeholder 2"/>
+          <p:cNvSpPr>
+            <a:spLocks noGrp="1"/>
+          </p:cNvSpPr>
+          <p:nvPr>
+            <p:ph type="body" idx="1"/>
+          </p:nvPr>
+        </p:nvSpPr>
+        <p:spPr/>
+        <p:txBody>
+          <a:bodyPr/>
+          <a:lstStyle/>
+          <a:p>
+            <a:r>
+              <a:rPr lang="da-DK" dirty="0" smtClean="0"/>
+              <a:t>Proto4</a:t>
+            </a:r>
+          </a:p>
+          <a:p>
+            <a:endParaRPr lang="da-DK" dirty="0" smtClean="0"/>
+          </a:p>
+          <a:p>
+            <a:r>
+              <a:rPr lang="da-DK" dirty="0" err="1" smtClean="0"/>
+              <a:t>Then</a:t>
+            </a:r>
+            <a:r>
+              <a:rPr lang="da-DK" dirty="0" smtClean="0"/>
+              <a:t> show proto1 </a:t>
+            </a:r>
+            <a:r>
+              <a:rPr lang="da-DK" smtClean="0"/>
+              <a:t>and proto2</a:t>
+            </a:r>
+            <a:endParaRPr lang="da-DK" dirty="0"/>
+          </a:p>
+        </p:txBody>
+      </p:sp>
+    </p:spTree>
+    <p:extLst>
+      <p:ext uri="{BB962C8B-B14F-4D97-AF65-F5344CB8AC3E}">
+        <p14:creationId xmlns:p14="http://schemas.microsoft.com/office/powerpoint/2010/main" val="3647212318"/>
+      </p:ext>
+    </p:extLst>
+  </p:cSld>
+  <p:clrMapOvr>
+    <a:masterClrMapping/>
+  </p:clrMapOvr>
+</p:notes>
+</file>
+
+<file path=ppt/notesSlides/notesSlide13.xml><?xml version="1.0" encoding="utf-8"?>
+<p:notes xmlns:a="http://schemas.openxmlformats.org/drawingml/2006/main" xmlns:r="http://schemas.openxmlformats.org/officeDocument/2006/relationships" xmlns:p="http://schemas.openxmlformats.org/presentationml/2006/main">
+  <p:cSld>
+    <p:spTree>
+      <p:nvGrpSpPr>
+        <p:cNvPr id="1" name=""/>
+        <p:cNvGrpSpPr/>
+        <p:nvPr/>
+      </p:nvGrpSpPr>
+      <p:grpSpPr>
+        <a:xfrm>
+          <a:off x="0" y="0"/>
+          <a:ext cx="0" cy="0"/>
+          <a:chOff x="0" y="0"/>
+          <a:chExt cx="0" cy="0"/>
+        </a:xfrm>
+      </p:grpSpPr>
+      <p:sp>
+        <p:nvSpPr>
+          <p:cNvPr id="2" name="Slide Image Placeholder 1"/>
+          <p:cNvSpPr>
+            <a:spLocks noGrp="1" noRot="1" noChangeAspect="1"/>
+          </p:cNvSpPr>
+          <p:nvPr>
+            <p:ph type="sldImg"/>
+          </p:nvPr>
+        </p:nvSpPr>
+        <p:spPr/>
+      </p:sp>
+      <p:sp>
+        <p:nvSpPr>
+          <p:cNvPr id="3" name="Notes Placeholder 2"/>
+          <p:cNvSpPr>
+            <a:spLocks noGrp="1"/>
+          </p:cNvSpPr>
+          <p:nvPr>
+            <p:ph type="body" idx="1"/>
+          </p:nvPr>
+        </p:nvSpPr>
+        <p:spPr/>
+        <p:txBody>
+          <a:bodyPr/>
+          <a:lstStyle/>
+          <a:p>
+            <a:endParaRPr lang="da-DK" dirty="0"/>
+          </a:p>
+        </p:txBody>
+      </p:sp>
+    </p:spTree>
+    <p:extLst>
+      <p:ext uri="{BB962C8B-B14F-4D97-AF65-F5344CB8AC3E}">
+        <p14:creationId xmlns:p14="http://schemas.microsoft.com/office/powerpoint/2010/main" val="1557260125"/>
+      </p:ext>
+    </p:extLst>
+  </p:cSld>
+  <p:clrMapOvr>
+    <a:masterClrMapping/>
+  </p:clrMapOvr>
+</p:notes>
+</file>
+
+<file path=ppt/notesSlides/notesSlide14.xml><?xml version="1.0" encoding="utf-8"?>
+<p:notes xmlns:a="http://schemas.openxmlformats.org/drawingml/2006/main" xmlns:r="http://schemas.openxmlformats.org/officeDocument/2006/relationships" xmlns:p="http://schemas.openxmlformats.org/presentationml/2006/main">
+  <p:cSld>
+    <p:spTree>
+      <p:nvGrpSpPr>
+        <p:cNvPr id="1" name=""/>
+        <p:cNvGrpSpPr/>
+        <p:nvPr/>
+      </p:nvGrpSpPr>
+      <p:grpSpPr>
+        <a:xfrm>
+          <a:off x="0" y="0"/>
+          <a:ext cx="0" cy="0"/>
+          <a:chOff x="0" y="0"/>
+          <a:chExt cx="0" cy="0"/>
+        </a:xfrm>
+      </p:grpSpPr>
+      <p:sp>
+        <p:nvSpPr>
+          <p:cNvPr id="2" name="Slide Image Placeholder 1"/>
+          <p:cNvSpPr>
+            <a:spLocks noGrp="1" noRot="1" noChangeAspect="1"/>
+          </p:cNvSpPr>
+          <p:nvPr>
+            <p:ph type="sldImg"/>
+          </p:nvPr>
+        </p:nvSpPr>
+        <p:spPr/>
+      </p:sp>
+      <p:sp>
+        <p:nvSpPr>
+          <p:cNvPr id="3" name="Notes Placeholder 2"/>
+          <p:cNvSpPr>
+            <a:spLocks noGrp="1"/>
+          </p:cNvSpPr>
+          <p:nvPr>
+            <p:ph type="body" idx="1"/>
+          </p:nvPr>
+        </p:nvSpPr>
+        <p:spPr/>
+        <p:txBody>
+          <a:bodyPr/>
+          <a:lstStyle/>
+          <a:p>
+            <a:r>
+              <a:rPr lang="da-DK" dirty="0" smtClean="0"/>
+              <a:t>Show hoisting1,</a:t>
+            </a:r>
+            <a:r>
+              <a:rPr lang="da-DK" baseline="0" dirty="0" smtClean="0"/>
+              <a:t> hoisting2</a:t>
+            </a:r>
+          </a:p>
+          <a:p>
+            <a:r>
+              <a:rPr lang="da-DK" baseline="0" dirty="0" err="1" smtClean="0"/>
+              <a:t>Then</a:t>
+            </a:r>
+            <a:r>
+              <a:rPr lang="da-DK" baseline="0" dirty="0" smtClean="0"/>
+              <a:t> </a:t>
+            </a:r>
+            <a:r>
+              <a:rPr lang="da-DK" baseline="0" dirty="0" err="1" smtClean="0"/>
+              <a:t>bullet</a:t>
+            </a:r>
+            <a:r>
+              <a:rPr lang="da-DK" baseline="0" dirty="0" smtClean="0"/>
+              <a:t>,</a:t>
+            </a:r>
+          </a:p>
+          <a:p>
+            <a:r>
+              <a:rPr lang="da-DK" baseline="0" dirty="0" err="1" smtClean="0"/>
+              <a:t>Then</a:t>
+            </a:r>
+            <a:r>
+              <a:rPr lang="da-DK" baseline="0" dirty="0" smtClean="0"/>
+              <a:t> </a:t>
+            </a:r>
+            <a:r>
+              <a:rPr lang="da-DK" baseline="0" dirty="0" err="1" smtClean="0"/>
+              <a:t>hoisting</a:t>
+            </a:r>
+            <a:r>
+              <a:rPr lang="da-DK" baseline="0" dirty="0" smtClean="0"/>
+              <a:t> 1a, 2a</a:t>
+            </a:r>
+          </a:p>
+          <a:p>
+            <a:r>
+              <a:rPr lang="da-DK" baseline="0" dirty="0" smtClean="0"/>
+              <a:t>The 3a – Note </a:t>
+            </a:r>
+            <a:r>
+              <a:rPr lang="da-DK" baseline="0" dirty="0" err="1" smtClean="0"/>
+              <a:t>typeError</a:t>
+            </a:r>
+            <a:r>
+              <a:rPr lang="da-DK" baseline="0" dirty="0" smtClean="0"/>
+              <a:t>, not </a:t>
+            </a:r>
+            <a:r>
+              <a:rPr lang="da-DK" baseline="0" dirty="0" err="1" smtClean="0"/>
+              <a:t>referenceError</a:t>
+            </a:r>
+            <a:endParaRPr lang="da-DK" baseline="0" dirty="0" smtClean="0"/>
+          </a:p>
+          <a:p>
+            <a:r>
+              <a:rPr lang="da-DK" baseline="0" dirty="0" err="1" smtClean="0"/>
+              <a:t>Function</a:t>
+            </a:r>
+            <a:r>
+              <a:rPr lang="da-DK" baseline="0" dirty="0" smtClean="0"/>
+              <a:t> </a:t>
+            </a:r>
+            <a:r>
+              <a:rPr lang="da-DK" baseline="0" dirty="0" err="1" smtClean="0"/>
+              <a:t>declarations</a:t>
+            </a:r>
+            <a:r>
+              <a:rPr lang="da-DK" baseline="0" dirty="0" smtClean="0"/>
+              <a:t> </a:t>
+            </a:r>
+            <a:r>
+              <a:rPr lang="da-DK" baseline="0" dirty="0" err="1" smtClean="0"/>
+              <a:t>are</a:t>
+            </a:r>
+            <a:r>
+              <a:rPr lang="da-DK" baseline="0" dirty="0" smtClean="0"/>
+              <a:t> </a:t>
+            </a:r>
+            <a:r>
+              <a:rPr lang="da-DK" baseline="0" dirty="0" err="1" smtClean="0"/>
+              <a:t>hoisted</a:t>
+            </a:r>
+            <a:r>
+              <a:rPr lang="da-DK" baseline="0" dirty="0" smtClean="0"/>
+              <a:t>, but </a:t>
+            </a:r>
+            <a:r>
+              <a:rPr lang="da-DK" baseline="0" dirty="0" err="1" smtClean="0"/>
+              <a:t>function</a:t>
+            </a:r>
+            <a:r>
+              <a:rPr lang="da-DK" baseline="0" dirty="0" smtClean="0"/>
+              <a:t> </a:t>
+            </a:r>
+            <a:r>
+              <a:rPr lang="da-DK" baseline="0" dirty="0" err="1" smtClean="0"/>
+              <a:t>expressions</a:t>
+            </a:r>
+            <a:r>
+              <a:rPr lang="da-DK" baseline="0" dirty="0" smtClean="0"/>
+              <a:t> </a:t>
+            </a:r>
+            <a:r>
+              <a:rPr lang="da-DK" baseline="0" dirty="0" err="1" smtClean="0"/>
+              <a:t>are</a:t>
+            </a:r>
+            <a:r>
+              <a:rPr lang="da-DK" baseline="0" dirty="0" smtClean="0"/>
+              <a:t> not!</a:t>
+            </a:r>
+            <a:endParaRPr lang="da-DK" dirty="0"/>
+          </a:p>
+        </p:txBody>
+      </p:sp>
+    </p:spTree>
+    <p:extLst>
+      <p:ext uri="{BB962C8B-B14F-4D97-AF65-F5344CB8AC3E}">
+        <p14:creationId xmlns:p14="http://schemas.microsoft.com/office/powerpoint/2010/main" val="838790980"/>
+      </p:ext>
+    </p:extLst>
+  </p:cSld>
+  <p:clrMapOvr>
+    <a:masterClrMapping/>
+  </p:clrMapOvr>
+</p:notes>
+</file>
+
+<file path=ppt/notesSlides/notesSlide15.xml><?xml version="1.0" encoding="utf-8"?>
+<p:notes xmlns:a="http://schemas.openxmlformats.org/drawingml/2006/main" xmlns:r="http://schemas.openxmlformats.org/officeDocument/2006/relationships" xmlns:p="http://schemas.openxmlformats.org/presentationml/2006/main">
+  <p:cSld>
+    <p:spTree>
+      <p:nvGrpSpPr>
+        <p:cNvPr id="1" name=""/>
+        <p:cNvGrpSpPr/>
+        <p:nvPr/>
+      </p:nvGrpSpPr>
+      <p:grpSpPr>
+        <a:xfrm>
+          <a:off x="0" y="0"/>
+          <a:ext cx="0" cy="0"/>
+          <a:chOff x="0" y="0"/>
+          <a:chExt cx="0" cy="0"/>
+        </a:xfrm>
+      </p:grpSpPr>
+      <p:sp>
+        <p:nvSpPr>
+          <p:cNvPr id="2" name="Slide Image Placeholder 1"/>
+          <p:cNvSpPr>
+            <a:spLocks noGrp="1" noRot="1" noChangeAspect="1"/>
+          </p:cNvSpPr>
+          <p:nvPr>
+            <p:ph type="sldImg"/>
+          </p:nvPr>
+        </p:nvSpPr>
+        <p:spPr/>
+      </p:sp>
+      <p:sp>
+        <p:nvSpPr>
+          <p:cNvPr id="3" name="Notes Placeholder 2"/>
+          <p:cNvSpPr>
+            <a:spLocks noGrp="1"/>
+          </p:cNvSpPr>
+          <p:nvPr>
+            <p:ph type="body" idx="1"/>
+          </p:nvPr>
+        </p:nvSpPr>
+        <p:spPr/>
+        <p:txBody>
+          <a:bodyPr/>
+          <a:lstStyle/>
+          <a:p>
+            <a:r>
               <a:rPr lang="da-DK" dirty="0" err="1" smtClean="0"/>
               <a:t>Well</a:t>
             </a:r>
@@ -1479,27 +2128,7 @@
           <a:p>
             <a:r>
               <a:rPr lang="da-DK" dirty="0" smtClean="0"/>
-              <a:t>More on </a:t>
-            </a:r>
-            <a:r>
-              <a:rPr lang="da-DK" dirty="0" err="1" smtClean="0"/>
-              <a:t>that</a:t>
-            </a:r>
-            <a:r>
-              <a:rPr lang="da-DK" dirty="0" smtClean="0"/>
-              <a:t> in </a:t>
-            </a:r>
-            <a:r>
-              <a:rPr lang="da-DK" dirty="0" err="1" smtClean="0"/>
-              <a:t>later</a:t>
-            </a:r>
-            <a:r>
-              <a:rPr lang="da-DK" dirty="0" smtClean="0"/>
-              <a:t> </a:t>
-            </a:r>
-            <a:r>
-              <a:rPr lang="da-DK" dirty="0" err="1" smtClean="0"/>
-              <a:t>exercises</a:t>
+              <a:t>imperative1.js</a:t>
             </a:r>
             <a:endParaRPr lang="da-DK" dirty="0"/>
           </a:p>
@@ -1508,7 +2137,7 @@
     </p:spTree>
     <p:extLst>
       <p:ext uri="{BB962C8B-B14F-4D97-AF65-F5344CB8AC3E}">
-        <p14:creationId xmlns:p14="http://schemas.microsoft.com/office/powerpoint/2010/main" val="1527587767"/>
+        <p14:creationId xmlns:p14="http://schemas.microsoft.com/office/powerpoint/2010/main" val="3150999082"/>
       </p:ext>
     </p:extLst>
   </p:cSld>
@@ -1564,13 +2193,7 @@
           <a:p>
             <a:r>
               <a:rPr lang="da-DK" dirty="0" smtClean="0"/>
-              <a:t>Count + i?</a:t>
-            </a:r>
-          </a:p>
-          <a:p>
-            <a:r>
-              <a:rPr lang="da-DK" dirty="0" smtClean="0"/>
-              <a:t>Console.log(i);</a:t>
+              <a:t>types.js</a:t>
             </a:r>
             <a:endParaRPr lang="da-DK" dirty="0"/>
           </a:p>
@@ -1579,7 +2202,7 @@
     </p:spTree>
     <p:extLst>
       <p:ext uri="{BB962C8B-B14F-4D97-AF65-F5344CB8AC3E}">
-        <p14:creationId xmlns:p14="http://schemas.microsoft.com/office/powerpoint/2010/main" val="4248618219"/>
+        <p14:creationId xmlns:p14="http://schemas.microsoft.com/office/powerpoint/2010/main" val="260580981"/>
       </p:ext>
     </p:extLst>
   </p:cSld>
@@ -1635,33 +2258,15 @@
           <a:p>
             <a:r>
               <a:rPr lang="da-DK" dirty="0" smtClean="0"/>
-              <a:t>Lex1 – is </a:t>
+              <a:t>- Object </a:t>
             </a:r>
             <a:r>
               <a:rPr lang="da-DK" dirty="0" err="1" smtClean="0"/>
-              <a:t>this</a:t>
+              <a:t>based</a:t>
             </a:r>
             <a:r>
               <a:rPr lang="da-DK" dirty="0" smtClean="0"/>
-              <a:t> </a:t>
-            </a:r>
-            <a:r>
-              <a:rPr lang="da-DK" dirty="0" err="1" smtClean="0"/>
-              <a:t>closure</a:t>
-            </a:r>
-            <a:r>
-              <a:rPr lang="da-DK" dirty="0" smtClean="0"/>
-              <a:t>?</a:t>
-            </a:r>
-          </a:p>
-          <a:p>
-            <a:r>
-              <a:rPr lang="da-DK" dirty="0" smtClean="0"/>
-              <a:t>Closure1 - &gt; </a:t>
-            </a:r>
-            <a:r>
-              <a:rPr lang="da-DK" dirty="0" err="1" smtClean="0"/>
-              <a:t>observed</a:t>
+              <a:t>:</a:t>
             </a:r>
             <a:r>
               <a:rPr lang="da-DK" baseline="0" dirty="0" smtClean="0"/>
@@ -1669,14 +2274,64 @@
             </a:r>
             <a:r>
               <a:rPr lang="da-DK" baseline="0" dirty="0" err="1" smtClean="0"/>
-              <a:t>closure</a:t>
-            </a:r>
-            <a:endParaRPr lang="da-DK" baseline="0" dirty="0" smtClean="0"/>
-          </a:p>
-          <a:p>
-            <a:endParaRPr lang="da-DK" dirty="0" smtClean="0"/>
-          </a:p>
-          <a:p>
+              <a:t>functions</a:t>
+            </a:r>
+            <a:r>
+              <a:rPr lang="da-DK" baseline="0" dirty="0" smtClean="0"/>
+              <a:t> </a:t>
+            </a:r>
+            <a:r>
+              <a:rPr lang="da-DK" baseline="0" dirty="0" err="1" smtClean="0"/>
+              <a:t>are</a:t>
+            </a:r>
+            <a:r>
+              <a:rPr lang="da-DK" baseline="0" dirty="0" smtClean="0"/>
+              <a:t> </a:t>
+            </a:r>
+            <a:r>
+              <a:rPr lang="da-DK" baseline="0" dirty="0" err="1" smtClean="0"/>
+              <a:t>objects</a:t>
+            </a:r>
+            <a:r>
+              <a:rPr lang="da-DK" baseline="0" dirty="0" smtClean="0"/>
+              <a:t>, </a:t>
+            </a:r>
+            <a:r>
+              <a:rPr lang="da-DK" baseline="0" dirty="0" err="1" smtClean="0"/>
+              <a:t>than</a:t>
+            </a:r>
+            <a:r>
+              <a:rPr lang="da-DK" baseline="0" dirty="0" smtClean="0"/>
+              <a:t> </a:t>
+            </a:r>
+            <a:r>
+              <a:rPr lang="da-DK" baseline="0" dirty="0" err="1" smtClean="0"/>
+              <a:t>can</a:t>
+            </a:r>
+            <a:r>
+              <a:rPr lang="da-DK" baseline="0" dirty="0" smtClean="0"/>
+              <a:t> </a:t>
+            </a:r>
+            <a:r>
+              <a:rPr lang="da-DK" baseline="0" dirty="0" err="1" smtClean="0"/>
+              <a:t>be</a:t>
+            </a:r>
+            <a:r>
+              <a:rPr lang="da-DK" baseline="0" dirty="0" smtClean="0"/>
+              <a:t> </a:t>
+            </a:r>
+            <a:r>
+              <a:rPr lang="da-DK" baseline="0" dirty="0" err="1" smtClean="0"/>
+              <a:t>passed</a:t>
+            </a:r>
+            <a:r>
+              <a:rPr lang="da-DK" baseline="0" dirty="0" smtClean="0"/>
+              <a:t> </a:t>
+            </a:r>
+            <a:r>
+              <a:rPr lang="da-DK" baseline="0" dirty="0" err="1" smtClean="0"/>
+              <a:t>around</a:t>
+            </a:r>
             <a:endParaRPr lang="da-DK" dirty="0"/>
           </a:p>
         </p:txBody>
@@ -1684,7 +2339,7 @@
     </p:spTree>
     <p:extLst>
       <p:ext uri="{BB962C8B-B14F-4D97-AF65-F5344CB8AC3E}">
-        <p14:creationId xmlns:p14="http://schemas.microsoft.com/office/powerpoint/2010/main" val="495123908"/>
+        <p14:creationId xmlns:p14="http://schemas.microsoft.com/office/powerpoint/2010/main" val="1112185795"/>
       </p:ext>
     </p:extLst>
   </p:cSld>
@@ -1740,15 +2395,7 @@
           <a:p>
             <a:r>
               <a:rPr lang="da-DK" dirty="0" err="1" smtClean="0"/>
-              <a:t>IIFEs</a:t>
-            </a:r>
-            <a:r>
-              <a:rPr lang="da-DK" dirty="0" smtClean="0"/>
-              <a:t>, </a:t>
-            </a:r>
-            <a:r>
-              <a:rPr lang="da-DK" dirty="0" err="1" smtClean="0"/>
-              <a:t>see</a:t>
+              <a:t>Function</a:t>
             </a:r>
             <a:r>
               <a:rPr lang="da-DK" dirty="0" smtClean="0"/>
@@ -1756,17 +2403,62 @@
             </a:r>
             <a:r>
               <a:rPr lang="da-DK" dirty="0" err="1" smtClean="0"/>
-              <a:t>closure</a:t>
+              <a:t>composition</a:t>
+            </a:r>
+            <a:r>
+              <a:rPr lang="da-DK" dirty="0" smtClean="0"/>
+              <a:t>,</a:t>
             </a:r>
             <a:r>
               <a:rPr lang="da-DK" baseline="0" dirty="0" smtClean="0"/>
-              <a:t> 3</a:t>
-            </a:r>
-          </a:p>
-          <a:p>
+              <a:t> </a:t>
+            </a:r>
             <a:r>
               <a:rPr lang="da-DK" baseline="0" dirty="0" err="1" smtClean="0"/>
-              <a:t>Modules</a:t>
+              <a:t>chaining</a:t>
+            </a:r>
+            <a:r>
+              <a:rPr lang="da-DK" baseline="0" dirty="0" smtClean="0"/>
+              <a:t>, </a:t>
+            </a:r>
+            <a:r>
+              <a:rPr lang="da-DK" baseline="0" dirty="0" err="1" smtClean="0"/>
+              <a:t>currying</a:t>
+            </a:r>
+            <a:r>
+              <a:rPr lang="da-DK" baseline="0" dirty="0" smtClean="0"/>
+              <a:t>, etc.</a:t>
+            </a:r>
+            <a:endParaRPr lang="da-DK" dirty="0" smtClean="0"/>
+          </a:p>
+          <a:p>
+            <a:r>
+              <a:rPr lang="da-DK" dirty="0" smtClean="0"/>
+              <a:t>More </a:t>
+            </a:r>
+            <a:r>
+              <a:rPr lang="da-DK" dirty="0" smtClean="0"/>
+              <a:t>on </a:t>
+            </a:r>
+            <a:r>
+              <a:rPr lang="da-DK" dirty="0" err="1" smtClean="0"/>
+              <a:t>that</a:t>
+            </a:r>
+            <a:r>
+              <a:rPr lang="da-DK" dirty="0" smtClean="0"/>
+              <a:t> in </a:t>
+            </a:r>
+            <a:r>
+              <a:rPr lang="da-DK" dirty="0" err="1" smtClean="0"/>
+              <a:t>later</a:t>
+            </a:r>
+            <a:r>
+              <a:rPr lang="da-DK" dirty="0" smtClean="0"/>
+              <a:t> </a:t>
+            </a:r>
+            <a:r>
+              <a:rPr lang="da-DK" dirty="0" err="1" smtClean="0"/>
+              <a:t>exercises</a:t>
             </a:r>
             <a:endParaRPr lang="da-DK" dirty="0"/>
           </a:p>
@@ -1775,7 +2467,7 @@
     </p:spTree>
     <p:extLst>
       <p:ext uri="{BB962C8B-B14F-4D97-AF65-F5344CB8AC3E}">
-        <p14:creationId xmlns:p14="http://schemas.microsoft.com/office/powerpoint/2010/main" val="3470971837"/>
+        <p14:creationId xmlns:p14="http://schemas.microsoft.com/office/powerpoint/2010/main" val="1527587767"/>
       </p:ext>
     </p:extLst>
   </p:cSld>
@@ -1831,7 +2523,13 @@
           <a:p>
             <a:r>
               <a:rPr lang="da-DK" dirty="0" smtClean="0"/>
-              <a:t>Proto3</a:t>
+              <a:t>Count + i?</a:t>
+            </a:r>
+          </a:p>
+          <a:p>
+            <a:r>
+              <a:rPr lang="da-DK" dirty="0" smtClean="0"/>
+              <a:t>Console.log(i);</a:t>
             </a:r>
             <a:endParaRPr lang="da-DK" dirty="0"/>
           </a:p>
@@ -1840,7 +2538,7 @@
     </p:spTree>
     <p:extLst>
       <p:ext uri="{BB962C8B-B14F-4D97-AF65-F5344CB8AC3E}">
-        <p14:creationId xmlns:p14="http://schemas.microsoft.com/office/powerpoint/2010/main" val="724399097"/>
+        <p14:creationId xmlns:p14="http://schemas.microsoft.com/office/powerpoint/2010/main" val="4248618219"/>
       </p:ext>
     </p:extLst>
   </p:cSld>
@@ -1894,6 +2592,50 @@
           <a:bodyPr/>
           <a:lstStyle/>
           <a:p>
+            <a:r>
+              <a:rPr lang="da-DK" dirty="0" smtClean="0"/>
+              <a:t>Lex1 – is </a:t>
+            </a:r>
+            <a:r>
+              <a:rPr lang="da-DK" dirty="0" err="1" smtClean="0"/>
+              <a:t>this</a:t>
+            </a:r>
+            <a:r>
+              <a:rPr lang="da-DK" dirty="0" smtClean="0"/>
+              <a:t> </a:t>
+            </a:r>
+            <a:r>
+              <a:rPr lang="da-DK" dirty="0" err="1" smtClean="0"/>
+              <a:t>closure</a:t>
+            </a:r>
+            <a:r>
+              <a:rPr lang="da-DK" dirty="0" smtClean="0"/>
+              <a:t>?</a:t>
+            </a:r>
+          </a:p>
+          <a:p>
+            <a:r>
+              <a:rPr lang="da-DK" dirty="0" smtClean="0"/>
+              <a:t>Closure1 - &gt; </a:t>
+            </a:r>
+            <a:r>
+              <a:rPr lang="da-DK" dirty="0" err="1" smtClean="0"/>
+              <a:t>observed</a:t>
+            </a:r>
+            <a:r>
+              <a:rPr lang="da-DK" baseline="0" dirty="0" smtClean="0"/>
+              <a:t> </a:t>
+            </a:r>
+            <a:r>
+              <a:rPr lang="da-DK" baseline="0" dirty="0" err="1" smtClean="0"/>
+              <a:t>closure</a:t>
+            </a:r>
+            <a:endParaRPr lang="da-DK" baseline="0" dirty="0" smtClean="0"/>
+          </a:p>
+          <a:p>
+            <a:endParaRPr lang="da-DK" dirty="0" smtClean="0"/>
+          </a:p>
+          <a:p>
             <a:endParaRPr lang="da-DK" dirty="0"/>
           </a:p>
         </p:txBody>
@@ -1901,7 +2643,7 @@
     </p:spTree>
     <p:extLst>
       <p:ext uri="{BB962C8B-B14F-4D97-AF65-F5344CB8AC3E}">
-        <p14:creationId xmlns:p14="http://schemas.microsoft.com/office/powerpoint/2010/main" val="1557260125"/>
+        <p14:creationId xmlns:p14="http://schemas.microsoft.com/office/powerpoint/2010/main" val="495123908"/>
       </p:ext>
     </p:extLst>
   </p:cSld>
@@ -1956,125 +2698,34 @@
           <a:lstStyle/>
           <a:p>
             <a:r>
+              <a:rPr lang="da-DK" dirty="0" err="1" smtClean="0"/>
+              <a:t>IIFEs</a:t>
+            </a:r>
+            <a:r>
               <a:rPr lang="da-DK" dirty="0" smtClean="0"/>
-              <a:t>Show hoisting1,</a:t>
+              <a:t>, </a:t>
+            </a:r>
+            <a:r>
+              <a:rPr lang="da-DK" dirty="0" err="1" smtClean="0"/>
+              <a:t>see</a:t>
+            </a:r>
+            <a:r>
+              <a:rPr lang="da-DK" dirty="0" smtClean="0"/>
+              <a:t> </a:t>
+            </a:r>
+            <a:r>
+              <a:rPr lang="da-DK" dirty="0" err="1" smtClean="0"/>
+              <a:t>closure</a:t>
             </a:r>
             <a:r>
               <a:rPr lang="da-DK" baseline="0" dirty="0" smtClean="0"/>
-              <a:t> hoisting2</a:t>
+              <a:t> 3</a:t>
             </a:r>
           </a:p>
           <a:p>
             <a:r>
               <a:rPr lang="da-DK" baseline="0" dirty="0" err="1" smtClean="0"/>
-              <a:t>Then</a:t>
-            </a:r>
-            <a:r>
-              <a:rPr lang="da-DK" baseline="0" dirty="0" smtClean="0"/>
-              <a:t> </a:t>
-            </a:r>
-            <a:r>
-              <a:rPr lang="da-DK" baseline="0" dirty="0" err="1" smtClean="0"/>
-              <a:t>bullet</a:t>
-            </a:r>
-            <a:r>
-              <a:rPr lang="da-DK" baseline="0" dirty="0" smtClean="0"/>
-              <a:t>,</a:t>
-            </a:r>
-          </a:p>
-          <a:p>
-            <a:r>
-              <a:rPr lang="da-DK" baseline="0" dirty="0" err="1" smtClean="0"/>
-              <a:t>Then</a:t>
-            </a:r>
-            <a:r>
-              <a:rPr lang="da-DK" baseline="0" dirty="0" smtClean="0"/>
-              <a:t> </a:t>
-            </a:r>
-            <a:r>
-              <a:rPr lang="da-DK" baseline="0" dirty="0" err="1" smtClean="0"/>
-              <a:t>hoisting</a:t>
-            </a:r>
-            <a:r>
-              <a:rPr lang="da-DK" baseline="0" dirty="0" smtClean="0"/>
-              <a:t> 1a, 2a</a:t>
-            </a:r>
-          </a:p>
-          <a:p>
-            <a:r>
-              <a:rPr lang="da-DK" baseline="0" dirty="0" smtClean="0"/>
-              <a:t>The 3a – Note </a:t>
-            </a:r>
-            <a:r>
-              <a:rPr lang="da-DK" baseline="0" dirty="0" err="1" smtClean="0"/>
-              <a:t>typeError</a:t>
-            </a:r>
-            <a:r>
-              <a:rPr lang="da-DK" baseline="0" dirty="0" smtClean="0"/>
-              <a:t>, not </a:t>
-            </a:r>
-            <a:r>
-              <a:rPr lang="da-DK" baseline="0" dirty="0" err="1" smtClean="0"/>
-              <a:t>referenceError</a:t>
-            </a:r>
-            <a:endParaRPr lang="da-DK" baseline="0" dirty="0" smtClean="0"/>
-          </a:p>
-          <a:p>
-            <a:r>
-              <a:rPr lang="da-DK" baseline="0" dirty="0" err="1" smtClean="0"/>
-              <a:t>Function</a:t>
-            </a:r>
-            <a:r>
-              <a:rPr lang="da-DK" baseline="0" dirty="0" smtClean="0"/>
-              <a:t> </a:t>
-            </a:r>
-            <a:r>
-              <a:rPr lang="da-DK" baseline="0" dirty="0" err="1" smtClean="0"/>
-              <a:t>declarations</a:t>
-            </a:r>
-            <a:r>
-              <a:rPr lang="da-DK" baseline="0" dirty="0" smtClean="0"/>
-              <a:t> </a:t>
-            </a:r>
-            <a:r>
-              <a:rPr lang="da-DK" baseline="0" dirty="0" err="1" smtClean="0"/>
-              <a:t>are</a:t>
-            </a:r>
-            <a:r>
-              <a:rPr lang="da-DK" baseline="0" dirty="0" smtClean="0"/>
-              <a:t> </a:t>
-            </a:r>
-            <a:r>
-              <a:rPr lang="da-DK" baseline="0" dirty="0" err="1" smtClean="0"/>
-              <a:t>hoisted</a:t>
-            </a:r>
-            <a:r>
-              <a:rPr lang="da-DK" baseline="0" dirty="0" smtClean="0"/>
-              <a:t>, but </a:t>
-            </a:r>
-            <a:r>
-              <a:rPr lang="da-DK" baseline="0" dirty="0" err="1" smtClean="0"/>
-              <a:t>function</a:t>
-            </a:r>
-            <a:r>
-              <a:rPr lang="da-DK" baseline="0" dirty="0" smtClean="0"/>
-              <a:t> </a:t>
-            </a:r>
-            <a:r>
-              <a:rPr lang="da-DK" baseline="0" dirty="0" err="1" smtClean="0"/>
-              <a:t>expressions</a:t>
-            </a:r>
-            <a:r>
-              <a:rPr lang="da-DK" baseline="0" dirty="0" smtClean="0"/>
-              <a:t> </a:t>
-            </a:r>
-            <a:r>
-              <a:rPr lang="da-DK" baseline="0" dirty="0" err="1" smtClean="0"/>
-              <a:t>are</a:t>
-            </a:r>
-            <a:r>
-              <a:rPr lang="da-DK" baseline="0" dirty="0" smtClean="0"/>
-              <a:t> not!</a:t>
+              <a:t>Modules</a:t>
             </a:r>
             <a:endParaRPr lang="da-DK" dirty="0"/>
           </a:p>
@@ -2083,7 +2734,7 @@
     </p:spTree>
     <p:extLst>
       <p:ext uri="{BB962C8B-B14F-4D97-AF65-F5344CB8AC3E}">
-        <p14:creationId xmlns:p14="http://schemas.microsoft.com/office/powerpoint/2010/main" val="838790980"/>
+        <p14:creationId xmlns:p14="http://schemas.microsoft.com/office/powerpoint/2010/main" val="3470971837"/>
       </p:ext>
     </p:extLst>
   </p:cSld>
@@ -11913,26 +12564,49 @@
           <a:bodyPr/>
           <a:lstStyle/>
           <a:p>
-            <a:pPr marL="400005" lvl="1" indent="0">
-              <a:buNone/>
-            </a:pPr>
-            <a:r>
-              <a:rPr lang="da-DK" dirty="0" smtClean="0"/>
-              <a:t>”</a:t>
-            </a:r>
-            <a:r>
-              <a:rPr lang="en-US" dirty="0" smtClean="0"/>
-              <a:t>Closure </a:t>
-            </a:r>
-            <a:r>
-              <a:rPr lang="en-US" dirty="0"/>
-              <a:t>is when a function is able to remember and access its lexical scope even when that function is executing outside its lexical scope</a:t>
-            </a:r>
-            <a:r>
-              <a:rPr lang="en-US" dirty="0" smtClean="0"/>
-              <a:t>.”</a:t>
-            </a:r>
-            <a:endParaRPr lang="da-DK" dirty="0" smtClean="0"/>
+            <a:r>
+              <a:rPr lang="da-DK" sz="1600" dirty="0">
+                <a:hlinkClick r:id="rId2"/>
+              </a:rPr>
+              <a:t>http://www.codewars.com/kata/basic-training-add-item-to-an-array</a:t>
+            </a:r>
+            <a:endParaRPr lang="da-DK" sz="1600" dirty="0"/>
+          </a:p>
+          <a:p>
+            <a:r>
+              <a:rPr lang="da-DK" sz="1600" dirty="0">
+                <a:hlinkClick r:id="rId3"/>
+              </a:rPr>
+              <a:t>http://www.codewars.com/kata/even-or-odd</a:t>
+            </a:r>
+            <a:endParaRPr lang="da-DK" sz="1600" dirty="0"/>
+          </a:p>
+          <a:p>
+            <a:r>
+              <a:rPr lang="da-DK" sz="1600" dirty="0">
+                <a:hlinkClick r:id="rId4"/>
+              </a:rPr>
+              <a:t>http://www.codewars.com/kata/are-you-playing-banjo</a:t>
+            </a:r>
+            <a:endParaRPr lang="da-DK" sz="1600" dirty="0"/>
+          </a:p>
+          <a:p>
+            <a:r>
+              <a:rPr lang="da-DK" sz="1600" dirty="0" smtClean="0">
+                <a:hlinkClick r:id="rId3"/>
+              </a:rPr>
+              <a:t>http</a:t>
+            </a:r>
+            <a:r>
+              <a:rPr lang="da-DK" sz="1600" dirty="0">
+                <a:hlinkClick r:id="rId3"/>
+              </a:rPr>
+              <a:t>://www.codewars.com/kata/even-or-odd</a:t>
+            </a:r>
+            <a:endParaRPr lang="da-DK" sz="1600" dirty="0"/>
+          </a:p>
+          <a:p>
+            <a:endParaRPr lang="da-DK" dirty="0"/>
           </a:p>
         </p:txBody>
       </p:sp>
@@ -11951,7 +12625,39 @@
           <a:bodyPr/>
           <a:lstStyle/>
           <a:p>
-            <a:endParaRPr lang="da-DK"/>
+            <a:r>
+              <a:rPr lang="da-DK" dirty="0" smtClean="0"/>
+              <a:t>- To </a:t>
+            </a:r>
+            <a:r>
+              <a:rPr lang="da-DK" dirty="0" err="1" smtClean="0"/>
+              <a:t>get</a:t>
+            </a:r>
+            <a:r>
+              <a:rPr lang="da-DK" dirty="0" smtClean="0"/>
+              <a:t> </a:t>
+            </a:r>
+            <a:r>
+              <a:rPr lang="da-DK" dirty="0" err="1" smtClean="0"/>
+              <a:t>our</a:t>
+            </a:r>
+            <a:r>
+              <a:rPr lang="da-DK" dirty="0" smtClean="0"/>
+              <a:t> </a:t>
+            </a:r>
+            <a:r>
+              <a:rPr lang="da-DK" dirty="0" err="1" smtClean="0"/>
+              <a:t>feet</a:t>
+            </a:r>
+            <a:r>
+              <a:rPr lang="da-DK" dirty="0" smtClean="0"/>
+              <a:t> </a:t>
+            </a:r>
+            <a:r>
+              <a:rPr lang="da-DK" dirty="0" err="1" smtClean="0"/>
+              <a:t>wet</a:t>
+            </a:r>
+            <a:endParaRPr lang="da-DK" dirty="0"/>
           </a:p>
         </p:txBody>
       </p:sp>
@@ -11972,7 +12678,7 @@
           <a:p>
             <a:r>
               <a:rPr lang="da-DK" dirty="0" err="1" smtClean="0"/>
-              <a:t>Closures</a:t>
+              <a:t>Exercises</a:t>
             </a:r>
             <a:endParaRPr lang="da-DK" dirty="0"/>
           </a:p>
@@ -11981,20 +12687,13 @@
     </p:spTree>
     <p:extLst>
       <p:ext uri="{BB962C8B-B14F-4D97-AF65-F5344CB8AC3E}">
-        <p14:creationId xmlns:p14="http://schemas.microsoft.com/office/powerpoint/2010/main" val="2485934660"/>
+        <p14:creationId xmlns:p14="http://schemas.microsoft.com/office/powerpoint/2010/main" val="1581041961"/>
       </p:ext>
     </p:extLst>
   </p:cSld>
   <p:clrMapOvr>
     <a:masterClrMapping/>
   </p:clrMapOvr>
-  <p:timing>
-    <p:tnLst>
-      <p:par>
-        <p:cTn id="1" dur="indefinite" restart="never" nodeType="tmRoot"/>
-      </p:par>
-    </p:tnLst>
-  </p:timing>
 </p:sld>
 </file>
 
@@ -12030,37 +12729,26 @@
           <a:bodyPr/>
           <a:lstStyle/>
           <a:p>
-            <a:r>
-              <a:rPr lang="da-DK" dirty="0" err="1" smtClean="0"/>
-              <a:t>Immediately</a:t>
-            </a:r>
+            <a:pPr marL="400005" lvl="1" indent="0">
+              <a:buNone/>
+            </a:pPr>
             <a:r>
               <a:rPr lang="da-DK" dirty="0" smtClean="0"/>
-              <a:t> </a:t>
-            </a:r>
-            <a:r>
-              <a:rPr lang="da-DK" dirty="0" err="1" smtClean="0"/>
-              <a:t>Invoked</a:t>
-            </a:r>
-            <a:r>
-              <a:rPr lang="da-DK" dirty="0" smtClean="0"/>
-              <a:t> </a:t>
-            </a:r>
-            <a:r>
-              <a:rPr lang="da-DK" dirty="0" err="1" smtClean="0"/>
-              <a:t>Function</a:t>
-            </a:r>
-            <a:r>
-              <a:rPr lang="da-DK" dirty="0" smtClean="0"/>
-              <a:t> Expressions</a:t>
-            </a:r>
-          </a:p>
-          <a:p>
-            <a:r>
-              <a:rPr lang="da-DK" dirty="0" err="1" smtClean="0"/>
-              <a:t>Modules</a:t>
-            </a:r>
-            <a:endParaRPr lang="da-DK" dirty="0"/>
+              <a:t>”</a:t>
+            </a:r>
+            <a:r>
+              <a:rPr lang="en-US" dirty="0" smtClean="0"/>
+              <a:t>Closure </a:t>
+            </a:r>
+            <a:r>
+              <a:rPr lang="en-US" dirty="0"/>
+              <a:t>is when a function is able to remember and access its lexical scope even when that function is executing outside its lexical scope</a:t>
+            </a:r>
+            <a:r>
+              <a:rPr lang="en-US" dirty="0" smtClean="0"/>
+              <a:t>.”</a:t>
+            </a:r>
+            <a:endParaRPr lang="da-DK" dirty="0" smtClean="0"/>
           </a:p>
         </p:txBody>
       </p:sp>
@@ -12100,15 +12788,7 @@
           <a:p>
             <a:r>
               <a:rPr lang="da-DK" dirty="0" err="1" smtClean="0"/>
-              <a:t>IIFEs</a:t>
-            </a:r>
-            <a:r>
-              <a:rPr lang="da-DK" dirty="0" smtClean="0"/>
-              <a:t> and </a:t>
-            </a:r>
-            <a:r>
-              <a:rPr lang="da-DK" dirty="0" err="1" smtClean="0"/>
-              <a:t>Modules</a:t>
+              <a:t>Closures</a:t>
             </a:r>
             <a:endParaRPr lang="da-DK" dirty="0"/>
           </a:p>
@@ -12117,7 +12797,7 @@
     </p:spTree>
     <p:extLst>
       <p:ext uri="{BB962C8B-B14F-4D97-AF65-F5344CB8AC3E}">
-        <p14:creationId xmlns:p14="http://schemas.microsoft.com/office/powerpoint/2010/main" val="2780296522"/>
+        <p14:creationId xmlns:p14="http://schemas.microsoft.com/office/powerpoint/2010/main" val="2485934660"/>
       </p:ext>
     </p:extLst>
   </p:cSld>
@@ -12166,6 +12846,142 @@
           <a:bodyPr/>
           <a:lstStyle/>
           <a:p>
+            <a:r>
+              <a:rPr lang="da-DK" dirty="0" err="1" smtClean="0"/>
+              <a:t>Immediately</a:t>
+            </a:r>
+            <a:r>
+              <a:rPr lang="da-DK" dirty="0" smtClean="0"/>
+              <a:t> </a:t>
+            </a:r>
+            <a:r>
+              <a:rPr lang="da-DK" dirty="0" err="1" smtClean="0"/>
+              <a:t>Invoked</a:t>
+            </a:r>
+            <a:r>
+              <a:rPr lang="da-DK" dirty="0" smtClean="0"/>
+              <a:t> </a:t>
+            </a:r>
+            <a:r>
+              <a:rPr lang="da-DK" dirty="0" err="1" smtClean="0"/>
+              <a:t>Function</a:t>
+            </a:r>
+            <a:r>
+              <a:rPr lang="da-DK" dirty="0" smtClean="0"/>
+              <a:t> Expressions</a:t>
+            </a:r>
+          </a:p>
+          <a:p>
+            <a:r>
+              <a:rPr lang="da-DK" dirty="0" err="1" smtClean="0"/>
+              <a:t>Modules</a:t>
+            </a:r>
+            <a:endParaRPr lang="da-DK" dirty="0"/>
+          </a:p>
+        </p:txBody>
+      </p:sp>
+      <p:sp>
+        <p:nvSpPr>
+          <p:cNvPr id="3" name="Text Placeholder 2"/>
+          <p:cNvSpPr>
+            <a:spLocks noGrp="1"/>
+          </p:cNvSpPr>
+          <p:nvPr>
+            <p:ph type="body" sz="quarter" idx="17"/>
+          </p:nvPr>
+        </p:nvSpPr>
+        <p:spPr/>
+        <p:txBody>
+          <a:bodyPr/>
+          <a:lstStyle/>
+          <a:p>
+            <a:endParaRPr lang="da-DK"/>
+          </a:p>
+        </p:txBody>
+      </p:sp>
+      <p:sp>
+        <p:nvSpPr>
+          <p:cNvPr id="4" name="Title 3"/>
+          <p:cNvSpPr>
+            <a:spLocks noGrp="1"/>
+          </p:cNvSpPr>
+          <p:nvPr>
+            <p:ph type="title"/>
+          </p:nvPr>
+        </p:nvSpPr>
+        <p:spPr/>
+        <p:txBody>
+          <a:bodyPr/>
+          <a:lstStyle/>
+          <a:p>
+            <a:r>
+              <a:rPr lang="da-DK" dirty="0" err="1" smtClean="0"/>
+              <a:t>IIFEs</a:t>
+            </a:r>
+            <a:r>
+              <a:rPr lang="da-DK" dirty="0" smtClean="0"/>
+              <a:t> and </a:t>
+            </a:r>
+            <a:r>
+              <a:rPr lang="da-DK" dirty="0" err="1" smtClean="0"/>
+              <a:t>Modules</a:t>
+            </a:r>
+            <a:endParaRPr lang="da-DK" dirty="0"/>
+          </a:p>
+        </p:txBody>
+      </p:sp>
+    </p:spTree>
+    <p:extLst>
+      <p:ext uri="{BB962C8B-B14F-4D97-AF65-F5344CB8AC3E}">
+        <p14:creationId xmlns:p14="http://schemas.microsoft.com/office/powerpoint/2010/main" val="2780296522"/>
+      </p:ext>
+    </p:extLst>
+  </p:cSld>
+  <p:clrMapOvr>
+    <a:masterClrMapping/>
+  </p:clrMapOvr>
+  <p:timing>
+    <p:tnLst>
+      <p:par>
+        <p:cTn id="1" dur="indefinite" restart="never" nodeType="tmRoot"/>
+      </p:par>
+    </p:tnLst>
+  </p:timing>
+</p:sld>
+</file>
+
+<file path=ppt/slides/slide14.xml><?xml version="1.0" encoding="utf-8"?>
+<p:sld xmlns:a="http://schemas.openxmlformats.org/drawingml/2006/main" xmlns:r="http://schemas.openxmlformats.org/officeDocument/2006/relationships" xmlns:p="http://schemas.openxmlformats.org/presentationml/2006/main">
+  <p:cSld>
+    <p:spTree>
+      <p:nvGrpSpPr>
+        <p:cNvPr id="1" name=""/>
+        <p:cNvGrpSpPr/>
+        <p:nvPr/>
+      </p:nvGrpSpPr>
+      <p:grpSpPr>
+        <a:xfrm>
+          <a:off x="0" y="0"/>
+          <a:ext cx="0" cy="0"/>
+          <a:chOff x="0" y="0"/>
+          <a:chExt cx="0" cy="0"/>
+        </a:xfrm>
+      </p:grpSpPr>
+      <p:sp>
+        <p:nvSpPr>
+          <p:cNvPr id="2" name="Content Placeholder 1"/>
+          <p:cNvSpPr>
+            <a:spLocks noGrp="1"/>
+          </p:cNvSpPr>
+          <p:nvPr>
+            <p:ph idx="1"/>
+          </p:nvPr>
+        </p:nvSpPr>
+        <p:spPr/>
+        <p:txBody>
+          <a:bodyPr/>
+          <a:lstStyle/>
+          <a:p>
             <a:pPr marL="0" indent="0">
               <a:buNone/>
             </a:pPr>
@@ -12187,7 +13003,7 @@
             </a:r>
             <a:r>
               <a:rPr lang="en-US" sz="2000" dirty="0">
-                <a:hlinkClick r:id="rId2" tooltip="Object-oriented programming"/>
+                <a:hlinkClick r:id="rId3" tooltip="Object-oriented programming"/>
               </a:rPr>
               <a:t>object-oriented programming</a:t>
             </a:r>
@@ -12205,7 +13021,7 @@
             </a:r>
             <a:r>
               <a:rPr lang="en-US" sz="2000" dirty="0">
-                <a:hlinkClick r:id="rId3" tooltip="Inheritance (programming)"/>
+                <a:hlinkClick r:id="rId4" tooltip="Inheritance (programming)"/>
               </a:rPr>
               <a:t>inheritance</a:t>
             </a:r>
@@ -12215,7 +13031,7 @@
             </a:r>
             <a:r>
               <a:rPr lang="en-US" sz="2000" dirty="0">
-                <a:hlinkClick r:id="rId4" tooltip="Cloning (programming)"/>
+                <a:hlinkClick r:id="rId5" tooltip="Cloning (programming)"/>
               </a:rPr>
               <a:t>cloning</a:t>
             </a:r>
@@ -12225,7 +13041,7 @@
             </a:r>
             <a:r>
               <a:rPr lang="en-US" sz="2000" dirty="0">
-                <a:hlinkClick r:id="rId5" tooltip="Object (programming)"/>
+                <a:hlinkClick r:id="rId6" tooltip="Object (programming)"/>
               </a:rPr>
               <a:t>objects</a:t>
             </a:r>
@@ -12235,7 +13051,7 @@
             </a:r>
             <a:r>
               <a:rPr lang="en-US" sz="2000" dirty="0">
-                <a:hlinkClick r:id="rId6" tooltip="Prototype"/>
+                <a:hlinkClick r:id="rId7" tooltip="Prototype"/>
               </a:rPr>
               <a:t>prototypes</a:t>
             </a:r>
@@ -12277,7 +13093,7 @@
             </a:r>
             <a:r>
               <a:rPr lang="en-US" sz="2000" dirty="0">
-                <a:hlinkClick r:id="rId7" tooltip="Delegation (programming)"/>
+                <a:hlinkClick r:id="rId8" tooltip="Delegation (programming)"/>
               </a:rPr>
               <a:t>Delegation</a:t>
             </a:r>
@@ -12348,7 +13164,7 @@
 </p:sld>
 </file>
 
-<file path=ppt/slides/slide14.xml><?xml version="1.0" encoding="utf-8"?>
+<file path=ppt/slides/slide15.xml><?xml version="1.0" encoding="utf-8"?>
 <p:sld xmlns:a="http://schemas.openxmlformats.org/drawingml/2006/main" xmlns:r="http://schemas.openxmlformats.org/officeDocument/2006/relationships" xmlns:p="http://schemas.openxmlformats.org/presentationml/2006/main">
   <p:cSld>
     <p:spTree>
@@ -12538,7 +13354,7 @@
 </p:sld>
 </file>
 
-<file path=ppt/slides/slide15.xml><?xml version="1.0" encoding="utf-8"?>
+<file path=ppt/slides/slide16.xml><?xml version="1.0" encoding="utf-8"?>
 <p:sld xmlns:a="http://schemas.openxmlformats.org/drawingml/2006/main" xmlns:r="http://schemas.openxmlformats.org/officeDocument/2006/relationships" xmlns:p="http://schemas.openxmlformats.org/presentationml/2006/main">
   <p:cSld>
     <p:spTree>
@@ -12708,7 +13524,7 @@
           <p:nvPr/>
         </p:nvPicPr>
         <p:blipFill>
-          <a:blip r:embed="rId2">
+          <a:blip r:embed="rId3">
             <a:extLst>
               <a:ext uri="{28A0092B-C50C-407E-A947-70E740481C1C}">
                 <a14:useLocalDpi xmlns:a14="http://schemas.microsoft.com/office/drawing/2010/main" val="0"/>
@@ -12760,7 +13576,7 @@
 </p:sld>
 </file>
 
-<file path=ppt/slides/slide16.xml><?xml version="1.0" encoding="utf-8"?>
+<file path=ppt/slides/slide17.xml><?xml version="1.0" encoding="utf-8"?>
 <p:sld xmlns:a="http://schemas.openxmlformats.org/drawingml/2006/main" xmlns:r="http://schemas.openxmlformats.org/officeDocument/2006/relationships" xmlns:p="http://schemas.openxmlformats.org/presentationml/2006/main">
   <p:cSld>
     <p:spTree>
@@ -12949,7 +13765,7 @@
 </p:sld>
 </file>
 
-<file path=ppt/slides/slide17.xml><?xml version="1.0" encoding="utf-8"?>
+<file path=ppt/slides/slide18.xml><?xml version="1.0" encoding="utf-8"?>
 <p:sld xmlns:a="http://schemas.openxmlformats.org/drawingml/2006/main" xmlns:r="http://schemas.openxmlformats.org/officeDocument/2006/relationships" xmlns:p="http://schemas.openxmlformats.org/presentationml/2006/main">
   <p:cSld>
     <p:spTree>
@@ -13283,172 +14099,6 @@
 </p:sld>
 </file>
 
-<file path=ppt/slides/slide18.xml><?xml version="1.0" encoding="utf-8"?>
-<p:sld xmlns:a="http://schemas.openxmlformats.org/drawingml/2006/main" xmlns:r="http://schemas.openxmlformats.org/officeDocument/2006/relationships" xmlns:p="http://schemas.openxmlformats.org/presentationml/2006/main">
-  <p:cSld>
-    <p:spTree>
-      <p:nvGrpSpPr>
-        <p:cNvPr id="1" name=""/>
-        <p:cNvGrpSpPr/>
-        <p:nvPr/>
-      </p:nvGrpSpPr>
-      <p:grpSpPr>
-        <a:xfrm>
-          <a:off x="0" y="0"/>
-          <a:ext cx="0" cy="0"/>
-          <a:chOff x="0" y="0"/>
-          <a:chExt cx="0" cy="0"/>
-        </a:xfrm>
-      </p:grpSpPr>
-      <p:sp>
-        <p:nvSpPr>
-          <p:cNvPr id="2" name="Content Placeholder 1"/>
-          <p:cNvSpPr>
-            <a:spLocks noGrp="1"/>
-          </p:cNvSpPr>
-          <p:nvPr>
-            <p:ph idx="1"/>
-          </p:nvPr>
-        </p:nvSpPr>
-        <p:spPr/>
-        <p:txBody>
-          <a:bodyPr/>
-          <a:lstStyle/>
-          <a:p>
-            <a:r>
-              <a:rPr lang="da-DK" dirty="0" smtClean="0"/>
-              <a:t>Values </a:t>
-            </a:r>
-            <a:r>
-              <a:rPr lang="da-DK" dirty="0" err="1" smtClean="0"/>
-              <a:t>can</a:t>
-            </a:r>
-            <a:r>
-              <a:rPr lang="da-DK" dirty="0" smtClean="0"/>
-              <a:t> </a:t>
-            </a:r>
-            <a:r>
-              <a:rPr lang="da-DK" dirty="0" err="1" smtClean="0"/>
-              <a:t>be</a:t>
-            </a:r>
-            <a:r>
-              <a:rPr lang="da-DK" dirty="0" smtClean="0"/>
-              <a:t> </a:t>
-            </a:r>
-            <a:r>
-              <a:rPr lang="da-DK" dirty="0" err="1" smtClean="0"/>
-              <a:t>implicitly</a:t>
-            </a:r>
-            <a:r>
-              <a:rPr lang="da-DK" dirty="0" smtClean="0"/>
-              <a:t> or </a:t>
-            </a:r>
-            <a:r>
-              <a:rPr lang="da-DK" dirty="0" err="1" smtClean="0"/>
-              <a:t>explicitly</a:t>
-            </a:r>
-            <a:r>
-              <a:rPr lang="da-DK" dirty="0" smtClean="0"/>
-              <a:t> </a:t>
-            </a:r>
-            <a:r>
-              <a:rPr lang="da-DK" dirty="0" err="1" smtClean="0"/>
-              <a:t>coerced</a:t>
-            </a:r>
-            <a:r>
-              <a:rPr lang="da-DK" dirty="0" smtClean="0"/>
-              <a:t> to </a:t>
-            </a:r>
-            <a:r>
-              <a:rPr lang="da-DK" dirty="0" err="1" smtClean="0"/>
-              <a:t>other</a:t>
-            </a:r>
-            <a:r>
-              <a:rPr lang="da-DK" dirty="0" smtClean="0"/>
-              <a:t> types</a:t>
-            </a:r>
-          </a:p>
-          <a:p>
-            <a:r>
-              <a:rPr lang="da-DK" dirty="0" smtClean="0"/>
-              <a:t>== </a:t>
-            </a:r>
-            <a:r>
-              <a:rPr lang="da-DK" dirty="0" err="1" smtClean="0"/>
-              <a:t>vs</a:t>
-            </a:r>
-            <a:r>
-              <a:rPr lang="da-DK" dirty="0" smtClean="0"/>
-              <a:t> ===</a:t>
-            </a:r>
-          </a:p>
-          <a:p>
-            <a:endParaRPr lang="da-DK" dirty="0"/>
-          </a:p>
-        </p:txBody>
-      </p:sp>
-      <p:sp>
-        <p:nvSpPr>
-          <p:cNvPr id="3" name="Text Placeholder 2"/>
-          <p:cNvSpPr>
-            <a:spLocks noGrp="1"/>
-          </p:cNvSpPr>
-          <p:nvPr>
-            <p:ph type="body" sz="quarter" idx="17"/>
-          </p:nvPr>
-        </p:nvSpPr>
-        <p:spPr/>
-        <p:txBody>
-          <a:bodyPr/>
-          <a:lstStyle/>
-          <a:p>
-            <a:endParaRPr lang="da-DK"/>
-          </a:p>
-        </p:txBody>
-      </p:sp>
-      <p:sp>
-        <p:nvSpPr>
-          <p:cNvPr id="4" name="Title 3"/>
-          <p:cNvSpPr>
-            <a:spLocks noGrp="1"/>
-          </p:cNvSpPr>
-          <p:nvPr>
-            <p:ph type="title"/>
-          </p:nvPr>
-        </p:nvSpPr>
-        <p:spPr/>
-        <p:txBody>
-          <a:bodyPr/>
-          <a:lstStyle/>
-          <a:p>
-            <a:r>
-              <a:rPr lang="da-DK" dirty="0" err="1" smtClean="0"/>
-              <a:t>Coercion</a:t>
-            </a:r>
-            <a:endParaRPr lang="da-DK" dirty="0"/>
-          </a:p>
-        </p:txBody>
-      </p:sp>
-    </p:spTree>
-    <p:extLst>
-      <p:ext uri="{BB962C8B-B14F-4D97-AF65-F5344CB8AC3E}">
-        <p14:creationId xmlns:p14="http://schemas.microsoft.com/office/powerpoint/2010/main" val="3689320305"/>
-      </p:ext>
-    </p:extLst>
-  </p:cSld>
-  <p:clrMapOvr>
-    <a:masterClrMapping/>
-  </p:clrMapOvr>
-  <p:timing>
-    <p:tnLst>
-      <p:par>
-        <p:cTn id="1" dur="indefinite" restart="never" nodeType="tmRoot"/>
-      </p:par>
-    </p:tnLst>
-  </p:timing>
-</p:sld>
-</file>
-
 <file path=ppt/slides/slide19.xml><?xml version="1.0" encoding="utf-8"?>
 <p:sld xmlns:a="http://schemas.openxmlformats.org/drawingml/2006/main" xmlns:r="http://schemas.openxmlformats.org/officeDocument/2006/relationships" xmlns:p="http://schemas.openxmlformats.org/presentationml/2006/main">
   <p:cSld>
@@ -13481,127 +14131,75 @@
           <a:bodyPr/>
           <a:lstStyle/>
           <a:p>
-            <a:pPr marL="0" indent="0">
-              <a:buNone/>
-            </a:pPr>
-            <a:r>
-              <a:rPr lang="en-US" sz="2000" dirty="0"/>
-              <a:t>All of JavaScript's values can be divided into two </a:t>
-            </a:r>
-            <a:r>
-              <a:rPr lang="en-US" sz="2000" dirty="0" smtClean="0"/>
-              <a:t>categories:</a:t>
-            </a:r>
-          </a:p>
-          <a:p>
-            <a:pPr marL="514350" indent="-514350">
-              <a:buFont typeface="+mj-lt"/>
-              <a:buAutoNum type="arabicPeriod"/>
-            </a:pPr>
-            <a:r>
-              <a:rPr lang="en-US" sz="2000" dirty="0"/>
-              <a:t>V</a:t>
-            </a:r>
-            <a:r>
-              <a:rPr lang="en-US" sz="2000" dirty="0" smtClean="0"/>
-              <a:t>alues </a:t>
-            </a:r>
-            <a:r>
-              <a:rPr lang="en-US" sz="2000" dirty="0"/>
-              <a:t>that will become false if coerced to </a:t>
-            </a:r>
-            <a:r>
-              <a:rPr lang="en-US" sz="2000" dirty="0" err="1" smtClean="0"/>
-              <a:t>boolean</a:t>
-            </a:r>
-            <a:endParaRPr lang="en-US" sz="2000" dirty="0" smtClean="0"/>
-          </a:p>
-          <a:p>
-            <a:pPr marL="514350" indent="-514350">
-              <a:buFont typeface="+mj-lt"/>
-              <a:buAutoNum type="arabicPeriod"/>
-            </a:pPr>
-            <a:r>
-              <a:rPr lang="en-US" sz="2000" dirty="0"/>
-              <a:t>E</a:t>
-            </a:r>
-            <a:r>
-              <a:rPr lang="en-US" sz="2000" dirty="0" smtClean="0"/>
-              <a:t>verything </a:t>
-            </a:r>
-            <a:r>
-              <a:rPr lang="en-US" sz="2000" dirty="0"/>
-              <a:t>else (which will obviously become true</a:t>
-            </a:r>
-            <a:r>
-              <a:rPr lang="en-US" sz="2000" dirty="0" smtClean="0"/>
-              <a:t>)</a:t>
-            </a:r>
-          </a:p>
-          <a:p>
-            <a:pPr marL="0" indent="0">
-              <a:buNone/>
-            </a:pPr>
-            <a:endParaRPr lang="en-US" sz="2000" dirty="0" smtClean="0"/>
-          </a:p>
-          <a:p>
-            <a:pPr marL="0" indent="0">
-              <a:buNone/>
-            </a:pPr>
-            <a:r>
-              <a:rPr lang="en-US" sz="2000" dirty="0" err="1" smtClean="0"/>
-              <a:t>Falsy</a:t>
-            </a:r>
-            <a:r>
-              <a:rPr lang="en-US" sz="2000" dirty="0" smtClean="0"/>
-              <a:t> values:</a:t>
-            </a:r>
-          </a:p>
-          <a:p>
-            <a:r>
-              <a:rPr lang="en-US" sz="2000" dirty="0" smtClean="0"/>
-              <a:t>undefined</a:t>
-            </a:r>
-            <a:endParaRPr lang="en-US" sz="2000" dirty="0"/>
-          </a:p>
-          <a:p>
-            <a:r>
-              <a:rPr lang="en-US" sz="2000" dirty="0"/>
-              <a:t>null</a:t>
-            </a:r>
-          </a:p>
-          <a:p>
-            <a:r>
-              <a:rPr lang="en-US" sz="2000" dirty="0"/>
-              <a:t>false</a:t>
-            </a:r>
-          </a:p>
-          <a:p>
-            <a:r>
-              <a:rPr lang="en-US" sz="2000" dirty="0" smtClean="0"/>
-              <a:t>0, </a:t>
-            </a:r>
-            <a:r>
-              <a:rPr lang="en-US" sz="2000" dirty="0"/>
-              <a:t>and </a:t>
-            </a:r>
-            <a:r>
-              <a:rPr lang="en-US" sz="2000" dirty="0" err="1"/>
-              <a:t>NaN</a:t>
-            </a:r>
-            <a:endParaRPr lang="en-US" sz="2000" dirty="0"/>
-          </a:p>
-          <a:p>
-            <a:r>
-              <a:rPr lang="en-US" sz="2000" dirty="0" smtClean="0"/>
-              <a:t>“”</a:t>
-            </a:r>
-          </a:p>
-          <a:p>
-            <a:endParaRPr lang="en-US" sz="2000" dirty="0"/>
-          </a:p>
-          <a:p>
-            <a:endParaRPr lang="en-US" sz="2000" dirty="0"/>
+            <a:r>
+              <a:rPr lang="da-DK" dirty="0" smtClean="0"/>
+              <a:t>Values </a:t>
+            </a:r>
+            <a:r>
+              <a:rPr lang="da-DK" dirty="0" err="1" smtClean="0"/>
+              <a:t>can</a:t>
+            </a:r>
+            <a:r>
+              <a:rPr lang="da-DK" dirty="0" smtClean="0"/>
+              <a:t> </a:t>
+            </a:r>
+            <a:r>
+              <a:rPr lang="da-DK" dirty="0" err="1" smtClean="0"/>
+              <a:t>be</a:t>
+            </a:r>
+            <a:r>
+              <a:rPr lang="da-DK" dirty="0" smtClean="0"/>
+              <a:t> </a:t>
+            </a:r>
+            <a:r>
+              <a:rPr lang="da-DK" dirty="0" err="1" smtClean="0"/>
+              <a:t>implicitly</a:t>
+            </a:r>
+            <a:r>
+              <a:rPr lang="da-DK" dirty="0" smtClean="0"/>
+              <a:t> or </a:t>
+            </a:r>
+            <a:r>
+              <a:rPr lang="da-DK" dirty="0" err="1" smtClean="0"/>
+              <a:t>explicitly</a:t>
+            </a:r>
+            <a:r>
+              <a:rPr lang="da-DK" dirty="0" smtClean="0"/>
+              <a:t> </a:t>
+            </a:r>
+            <a:r>
+              <a:rPr lang="da-DK" dirty="0" err="1" smtClean="0"/>
+              <a:t>coerced</a:t>
+            </a:r>
+            <a:r>
+              <a:rPr lang="da-DK" dirty="0" smtClean="0"/>
+              <a:t> to </a:t>
+            </a:r>
+            <a:r>
+              <a:rPr lang="da-DK" dirty="0" err="1" smtClean="0"/>
+              <a:t>other</a:t>
+            </a:r>
+            <a:r>
+              <a:rPr lang="da-DK" dirty="0" smtClean="0"/>
+              <a:t> types</a:t>
+            </a:r>
+          </a:p>
+          <a:p>
+            <a:r>
+              <a:rPr lang="da-DK" dirty="0" smtClean="0"/>
+              <a:t>== </a:t>
+            </a:r>
+            <a:r>
+              <a:rPr lang="da-DK" dirty="0" err="1" smtClean="0"/>
+              <a:t>vs</a:t>
+            </a:r>
+            <a:r>
+              <a:rPr lang="da-DK" dirty="0" smtClean="0"/>
+              <a:t> ===</a:t>
+            </a:r>
+          </a:p>
+          <a:p>
+            <a:endParaRPr lang="da-DK" dirty="0"/>
           </a:p>
         </p:txBody>
       </p:sp>
@@ -13620,7 +14218,7 @@
           <a:bodyPr/>
           <a:lstStyle/>
           <a:p>
-            <a:endParaRPr lang="da-DK" dirty="0"/>
+            <a:endParaRPr lang="da-DK"/>
           </a:p>
         </p:txBody>
       </p:sp>
@@ -13641,15 +14239,7 @@
           <a:p>
             <a:r>
               <a:rPr lang="da-DK" dirty="0" err="1" smtClean="0"/>
-              <a:t>Falsy</a:t>
-            </a:r>
-            <a:r>
-              <a:rPr lang="da-DK" dirty="0" smtClean="0"/>
-              <a:t> </a:t>
-            </a:r>
-            <a:r>
-              <a:rPr lang="da-DK" dirty="0" err="1" smtClean="0"/>
-              <a:t>values</a:t>
+              <a:t>Coercion</a:t>
             </a:r>
             <a:endParaRPr lang="da-DK" dirty="0"/>
           </a:p>
@@ -13658,7 +14248,7 @@
     </p:spTree>
     <p:extLst>
       <p:ext uri="{BB962C8B-B14F-4D97-AF65-F5344CB8AC3E}">
-        <p14:creationId xmlns:p14="http://schemas.microsoft.com/office/powerpoint/2010/main" val="287527280"/>
+        <p14:creationId xmlns:p14="http://schemas.microsoft.com/office/powerpoint/2010/main" val="3689320305"/>
       </p:ext>
     </p:extLst>
   </p:cSld>
@@ -13859,64 +14449,123 @@
               <a:buNone/>
             </a:pPr>
             <a:r>
-              <a:rPr lang="da-DK" dirty="0" err="1"/>
-              <a:t>f</a:t>
-            </a:r>
-            <a:r>
-              <a:rPr lang="da-DK" dirty="0" err="1" smtClean="0"/>
-              <a:t>unction</a:t>
-            </a:r>
-            <a:r>
-              <a:rPr lang="da-DK" dirty="0" smtClean="0"/>
-              <a:t> f(val) {</a:t>
+              <a:rPr lang="en-US" sz="2000" dirty="0"/>
+              <a:t>All of JavaScript's values can be divided into two </a:t>
+            </a:r>
+            <a:r>
+              <a:rPr lang="en-US" sz="2000" dirty="0" smtClean="0"/>
+              <a:t>categories:</a:t>
+            </a:r>
+          </a:p>
+          <a:p>
+            <a:pPr marL="514350" indent="-514350">
+              <a:buFont typeface="+mj-lt"/>
+              <a:buAutoNum type="arabicPeriod"/>
+            </a:pPr>
+            <a:r>
+              <a:rPr lang="en-US" sz="2000" dirty="0"/>
+              <a:t>V</a:t>
+            </a:r>
+            <a:r>
+              <a:rPr lang="en-US" sz="2000" dirty="0" smtClean="0"/>
+              <a:t>alues </a:t>
+            </a:r>
+            <a:r>
+              <a:rPr lang="en-US" sz="2000" dirty="0"/>
+              <a:t>that will become false if coerced to </a:t>
+            </a:r>
+            <a:r>
+              <a:rPr lang="en-US" sz="2000" dirty="0" err="1" smtClean="0"/>
+              <a:t>boolean</a:t>
+            </a:r>
+            <a:endParaRPr lang="en-US" sz="2000" dirty="0" smtClean="0"/>
+          </a:p>
+          <a:p>
+            <a:pPr marL="514350" indent="-514350">
+              <a:buFont typeface="+mj-lt"/>
+              <a:buAutoNum type="arabicPeriod"/>
+            </a:pPr>
+            <a:r>
+              <a:rPr lang="en-US" sz="2000" dirty="0"/>
+              <a:t>E</a:t>
+            </a:r>
+            <a:r>
+              <a:rPr lang="en-US" sz="2000" dirty="0" smtClean="0"/>
+              <a:t>verything </a:t>
+            </a:r>
+            <a:r>
+              <a:rPr lang="en-US" sz="2000" dirty="0"/>
+              <a:t>else (which will obviously become true</a:t>
+            </a:r>
+            <a:r>
+              <a:rPr lang="en-US" sz="2000" dirty="0" smtClean="0"/>
+              <a:t>)</a:t>
             </a:r>
           </a:p>
           <a:p>
             <a:pPr marL="0" indent="0">
               <a:buNone/>
             </a:pPr>
-            <a:r>
-              <a:rPr lang="da-DK" dirty="0"/>
-              <a:t> </a:t>
-            </a:r>
-            <a:r>
-              <a:rPr lang="da-DK" dirty="0" smtClean="0"/>
-              <a:t> </a:t>
-            </a:r>
-            <a:r>
-              <a:rPr lang="da-DK" dirty="0" err="1" smtClean="0"/>
-              <a:t>this.value</a:t>
-            </a:r>
-            <a:r>
-              <a:rPr lang="da-DK" dirty="0" smtClean="0"/>
-              <a:t> = val; // </a:t>
-            </a:r>
-            <a:r>
-              <a:rPr lang="da-DK" dirty="0" err="1" smtClean="0"/>
-              <a:t>What</a:t>
-            </a:r>
-            <a:r>
-              <a:rPr lang="da-DK" dirty="0" smtClean="0"/>
-              <a:t> is </a:t>
-            </a:r>
-            <a:r>
-              <a:rPr lang="da-DK" dirty="0" err="1" smtClean="0"/>
-              <a:t>this</a:t>
-            </a:r>
-            <a:r>
-              <a:rPr lang="da-DK" dirty="0" smtClean="0"/>
-              <a:t>? </a:t>
-            </a:r>
+            <a:endParaRPr lang="en-US" sz="2000" dirty="0" smtClean="0"/>
           </a:p>
           <a:p>
             <a:pPr marL="0" indent="0">
               <a:buNone/>
             </a:pPr>
             <a:r>
-              <a:rPr lang="da-DK" dirty="0" smtClean="0"/>
-              <a:t>}</a:t>
-            </a:r>
-            <a:endParaRPr lang="da-DK" dirty="0"/>
+              <a:rPr lang="en-US" sz="2000" dirty="0" err="1" smtClean="0"/>
+              <a:t>Falsy</a:t>
+            </a:r>
+            <a:r>
+              <a:rPr lang="en-US" sz="2000" dirty="0" smtClean="0"/>
+              <a:t> values:</a:t>
+            </a:r>
+          </a:p>
+          <a:p>
+            <a:r>
+              <a:rPr lang="en-US" sz="2000" dirty="0" smtClean="0"/>
+              <a:t>undefined</a:t>
+            </a:r>
+            <a:endParaRPr lang="en-US" sz="2000" dirty="0"/>
+          </a:p>
+          <a:p>
+            <a:r>
+              <a:rPr lang="en-US" sz="2000" dirty="0"/>
+              <a:t>null</a:t>
+            </a:r>
+          </a:p>
+          <a:p>
+            <a:r>
+              <a:rPr lang="en-US" sz="2000" dirty="0"/>
+              <a:t>false</a:t>
+            </a:r>
+          </a:p>
+          <a:p>
+            <a:r>
+              <a:rPr lang="en-US" sz="2000" dirty="0" smtClean="0"/>
+              <a:t>0, </a:t>
+            </a:r>
+            <a:r>
+              <a:rPr lang="en-US" sz="2000" dirty="0"/>
+              <a:t>and </a:t>
+            </a:r>
+            <a:r>
+              <a:rPr lang="en-US" sz="2000" dirty="0" err="1"/>
+              <a:t>NaN</a:t>
+            </a:r>
+            <a:endParaRPr lang="en-US" sz="2000" dirty="0"/>
+          </a:p>
+          <a:p>
+            <a:r>
+              <a:rPr lang="en-US" sz="2000" dirty="0" smtClean="0"/>
+              <a:t>“”</a:t>
+            </a:r>
+          </a:p>
+          <a:p>
+            <a:endParaRPr lang="en-US" sz="2000" dirty="0"/>
+          </a:p>
+          <a:p>
+            <a:endParaRPr lang="en-US" sz="2000" dirty="0"/>
           </a:p>
         </p:txBody>
       </p:sp>
@@ -13935,7 +14584,7 @@
           <a:bodyPr/>
           <a:lstStyle/>
           <a:p>
-            <a:endParaRPr lang="da-DK"/>
+            <a:endParaRPr lang="da-DK" dirty="0"/>
           </a:p>
         </p:txBody>
       </p:sp>
@@ -13956,7 +14605,15 @@
           <a:p>
             <a:r>
               <a:rPr lang="da-DK" dirty="0" err="1" smtClean="0"/>
-              <a:t>this</a:t>
+              <a:t>Falsy</a:t>
+            </a:r>
+            <a:r>
+              <a:rPr lang="da-DK" dirty="0" smtClean="0"/>
+              <a:t> </a:t>
+            </a:r>
+            <a:r>
+              <a:rPr lang="da-DK" dirty="0" err="1" smtClean="0"/>
+              <a:t>values</a:t>
             </a:r>
             <a:endParaRPr lang="da-DK" dirty="0"/>
           </a:p>
@@ -13965,7 +14622,7 @@
     </p:spTree>
     <p:extLst>
       <p:ext uri="{BB962C8B-B14F-4D97-AF65-F5344CB8AC3E}">
-        <p14:creationId xmlns:p14="http://schemas.microsoft.com/office/powerpoint/2010/main" val="3751570338"/>
+        <p14:creationId xmlns:p14="http://schemas.microsoft.com/office/powerpoint/2010/main" val="287527280"/>
       </p:ext>
     </p:extLst>
   </p:cSld>
@@ -14014,38 +14671,199 @@
           <a:bodyPr/>
           <a:lstStyle/>
           <a:p>
+            <a:pPr marL="0" indent="0">
+              <a:buNone/>
+            </a:pPr>
+            <a:r>
+              <a:rPr lang="da-DK" dirty="0" err="1"/>
+              <a:t>f</a:t>
+            </a:r>
+            <a:r>
+              <a:rPr lang="da-DK" dirty="0" err="1" smtClean="0"/>
+              <a:t>unction</a:t>
+            </a:r>
+            <a:r>
+              <a:rPr lang="da-DK" dirty="0" smtClean="0"/>
+              <a:t> f(val) {</a:t>
+            </a:r>
+          </a:p>
+          <a:p>
+            <a:pPr marL="0" indent="0">
+              <a:buNone/>
+            </a:pPr>
+            <a:r>
+              <a:rPr lang="da-DK" dirty="0"/>
+              <a:t> </a:t>
+            </a:r>
+            <a:r>
+              <a:rPr lang="da-DK" dirty="0" smtClean="0"/>
+              <a:t> </a:t>
+            </a:r>
+            <a:r>
+              <a:rPr lang="da-DK" dirty="0" err="1" smtClean="0"/>
+              <a:t>this.value</a:t>
+            </a:r>
+            <a:r>
+              <a:rPr lang="da-DK" dirty="0" smtClean="0"/>
+              <a:t> = val; // </a:t>
+            </a:r>
+            <a:r>
+              <a:rPr lang="da-DK" dirty="0" err="1" smtClean="0"/>
+              <a:t>What</a:t>
+            </a:r>
+            <a:r>
+              <a:rPr lang="da-DK" dirty="0" smtClean="0"/>
+              <a:t> is </a:t>
+            </a:r>
+            <a:r>
+              <a:rPr lang="da-DK" dirty="0" err="1" smtClean="0"/>
+              <a:t>this</a:t>
+            </a:r>
+            <a:r>
+              <a:rPr lang="da-DK" dirty="0" smtClean="0"/>
+              <a:t>? </a:t>
+            </a:r>
+          </a:p>
+          <a:p>
+            <a:pPr marL="0" indent="0">
+              <a:buNone/>
+            </a:pPr>
+            <a:r>
+              <a:rPr lang="da-DK" dirty="0" smtClean="0"/>
+              <a:t>}</a:t>
+            </a:r>
+            <a:endParaRPr lang="da-DK" dirty="0"/>
+          </a:p>
+        </p:txBody>
+      </p:sp>
+      <p:sp>
+        <p:nvSpPr>
+          <p:cNvPr id="3" name="Text Placeholder 2"/>
+          <p:cNvSpPr>
+            <a:spLocks noGrp="1"/>
+          </p:cNvSpPr>
+          <p:nvPr>
+            <p:ph type="body" sz="quarter" idx="17"/>
+          </p:nvPr>
+        </p:nvSpPr>
+        <p:spPr/>
+        <p:txBody>
+          <a:bodyPr/>
+          <a:lstStyle/>
+          <a:p>
+            <a:endParaRPr lang="da-DK"/>
+          </a:p>
+        </p:txBody>
+      </p:sp>
+      <p:sp>
+        <p:nvSpPr>
+          <p:cNvPr id="4" name="Title 3"/>
+          <p:cNvSpPr>
+            <a:spLocks noGrp="1"/>
+          </p:cNvSpPr>
+          <p:nvPr>
+            <p:ph type="title"/>
+          </p:nvPr>
+        </p:nvSpPr>
+        <p:spPr/>
+        <p:txBody>
+          <a:bodyPr/>
+          <a:lstStyle/>
+          <a:p>
+            <a:r>
+              <a:rPr lang="da-DK" dirty="0" err="1" smtClean="0"/>
+              <a:t>this</a:t>
+            </a:r>
+            <a:endParaRPr lang="da-DK" dirty="0"/>
+          </a:p>
+        </p:txBody>
+      </p:sp>
+    </p:spTree>
+    <p:extLst>
+      <p:ext uri="{BB962C8B-B14F-4D97-AF65-F5344CB8AC3E}">
+        <p14:creationId xmlns:p14="http://schemas.microsoft.com/office/powerpoint/2010/main" val="3751570338"/>
+      </p:ext>
+    </p:extLst>
+  </p:cSld>
+  <p:clrMapOvr>
+    <a:masterClrMapping/>
+  </p:clrMapOvr>
+  <p:timing>
+    <p:tnLst>
+      <p:par>
+        <p:cTn id="1" dur="indefinite" restart="never" nodeType="tmRoot"/>
+      </p:par>
+    </p:tnLst>
+  </p:timing>
+</p:sld>
+</file>
+
+<file path=ppt/slides/slide22.xml><?xml version="1.0" encoding="utf-8"?>
+<p:sld xmlns:a="http://schemas.openxmlformats.org/drawingml/2006/main" xmlns:r="http://schemas.openxmlformats.org/officeDocument/2006/relationships" xmlns:p="http://schemas.openxmlformats.org/presentationml/2006/main">
+  <p:cSld>
+    <p:spTree>
+      <p:nvGrpSpPr>
+        <p:cNvPr id="1" name=""/>
+        <p:cNvGrpSpPr/>
+        <p:nvPr/>
+      </p:nvGrpSpPr>
+      <p:grpSpPr>
+        <a:xfrm>
+          <a:off x="0" y="0"/>
+          <a:ext cx="0" cy="0"/>
+          <a:chOff x="0" y="0"/>
+          <a:chExt cx="0" cy="0"/>
+        </a:xfrm>
+      </p:grpSpPr>
+      <p:sp>
+        <p:nvSpPr>
+          <p:cNvPr id="2" name="Content Placeholder 1"/>
+          <p:cNvSpPr>
+            <a:spLocks noGrp="1"/>
+          </p:cNvSpPr>
+          <p:nvPr>
+            <p:ph idx="1"/>
+          </p:nvPr>
+        </p:nvSpPr>
+        <p:spPr/>
+        <p:txBody>
+          <a:bodyPr/>
+          <a:lstStyle/>
+          <a:p>
+            <a:r>
+              <a:rPr lang="da-DK" sz="1400" dirty="0">
+                <a:hlinkClick r:id="rId2"/>
+              </a:rPr>
+              <a:t>http://</a:t>
+            </a:r>
             <a:r>
               <a:rPr lang="da-DK" sz="1400" dirty="0" smtClean="0">
                 <a:hlinkClick r:id="rId2"/>
               </a:rPr>
+              <a:t>www.codewars.com/kata/a-function-within-a-function</a:t>
+            </a:r>
+            <a:endParaRPr lang="da-DK" sz="1400" dirty="0" smtClean="0">
+              <a:hlinkClick r:id="rId3"/>
+            </a:endParaRPr>
+          </a:p>
+          <a:p>
+            <a:r>
+              <a:rPr lang="da-DK" sz="1400" dirty="0" smtClean="0">
+                <a:hlinkClick r:id="rId3"/>
+              </a:rPr>
               <a:t>http</a:t>
             </a:r>
-            <a:r>
-              <a:rPr lang="da-DK" sz="1400" dirty="0">
-                <a:hlinkClick r:id="rId2"/>
-              </a:rPr>
-              <a:t>://</a:t>
-            </a:r>
-            <a:r>
-              <a:rPr lang="da-DK" sz="1400" dirty="0" smtClean="0">
-                <a:hlinkClick r:id="rId2"/>
-              </a:rPr>
-              <a:t>www.codewars.com/kata/basic-training-add-item-to-an-array</a:t>
-            </a:r>
-            <a:endParaRPr lang="da-DK" sz="1400" dirty="0" smtClean="0"/>
-          </a:p>
-          <a:p>
             <a:r>
               <a:rPr lang="da-DK" sz="1400" dirty="0">
                 <a:hlinkClick r:id="rId3"/>
               </a:rPr>
-              <a:t>http://</a:t>
+              <a:t>://</a:t>
             </a:r>
             <a:r>
               <a:rPr lang="da-DK" sz="1400" dirty="0" smtClean="0">
                 <a:hlinkClick r:id="rId3"/>
               </a:rPr>
-              <a:t>www.codewars.com/kata/even-or-odd</a:t>
+              <a:t>www.codewars.com/kata/shifty-closures</a:t>
             </a:r>
             <a:endParaRPr lang="da-DK" sz="1400" dirty="0" smtClean="0"/>
           </a:p>
@@ -14060,7 +14878,7 @@
               <a:rPr lang="da-DK" sz="1400" dirty="0" smtClean="0">
                 <a:hlinkClick r:id="rId4"/>
               </a:rPr>
-              <a:t>www.codewars.com/kata/are-you-playing-banjo</a:t>
+              <a:t>www.codewars.com/kata/anonymous-returns</a:t>
             </a:r>
             <a:endParaRPr lang="da-DK" sz="1400" dirty="0" smtClean="0"/>
           </a:p>
@@ -14075,92 +14893,17 @@
               <a:rPr lang="da-DK" sz="1400" dirty="0" smtClean="0">
                 <a:hlinkClick r:id="rId5"/>
               </a:rPr>
-              <a:t>www.codewars.com/kata/a-function-within-a-function</a:t>
+              <a:t>www.codewars.com/kata/uniquepush-no-dupes</a:t>
             </a:r>
             <a:endParaRPr lang="da-DK" sz="1400" dirty="0" smtClean="0"/>
           </a:p>
           <a:p>
-            <a:r>
-              <a:rPr lang="da-DK" sz="1400" dirty="0">
-                <a:hlinkClick r:id="rId3"/>
-              </a:rPr>
-              <a:t>http://</a:t>
-            </a:r>
-            <a:r>
-              <a:rPr lang="da-DK" sz="1400" dirty="0" smtClean="0">
-                <a:hlinkClick r:id="rId3"/>
-              </a:rPr>
-              <a:t>www.codewars.com/kata/even-or-odd</a:t>
-            </a:r>
-            <a:endParaRPr lang="da-DK" sz="1400" dirty="0" smtClean="0"/>
+            <a:endParaRPr lang="da-DK" sz="1400" dirty="0"/>
           </a:p>
           <a:p>
             <a:r>
               <a:rPr lang="da-DK" sz="1400" dirty="0">
                 <a:hlinkClick r:id="rId6"/>
-              </a:rPr>
-              <a:t>http://</a:t>
-            </a:r>
-            <a:r>
-              <a:rPr lang="da-DK" sz="1400" dirty="0" smtClean="0">
-                <a:hlinkClick r:id="rId6"/>
-              </a:rPr>
-              <a:t>www.codewars.com/kata/max-headroom-and-javascript-style</a:t>
-            </a:r>
-            <a:endParaRPr lang="da-DK" sz="1400" dirty="0" smtClean="0"/>
-          </a:p>
-          <a:p>
-            <a:r>
-              <a:rPr lang="da-DK" sz="1400" dirty="0">
-                <a:hlinkClick r:id="rId7"/>
-              </a:rPr>
-              <a:t>http://</a:t>
-            </a:r>
-            <a:r>
-              <a:rPr lang="da-DK" sz="1400" dirty="0" smtClean="0">
-                <a:hlinkClick r:id="rId7"/>
-              </a:rPr>
-              <a:t>www.codewars.com/kata/shifty-closures</a:t>
-            </a:r>
-            <a:endParaRPr lang="da-DK" sz="1400" dirty="0" smtClean="0"/>
-          </a:p>
-          <a:p>
-            <a:r>
-              <a:rPr lang="da-DK" sz="1400" dirty="0">
-                <a:hlinkClick r:id="rId8"/>
-              </a:rPr>
-              <a:t>http://</a:t>
-            </a:r>
-            <a:r>
-              <a:rPr lang="da-DK" sz="1400" dirty="0" smtClean="0">
-                <a:hlinkClick r:id="rId8"/>
-              </a:rPr>
-              <a:t>www.codewars.com/kata/anonymous-returns</a:t>
-            </a:r>
-            <a:endParaRPr lang="da-DK" sz="1400" dirty="0" smtClean="0"/>
-          </a:p>
-          <a:p>
-            <a:r>
-              <a:rPr lang="da-DK" sz="1400" dirty="0">
-                <a:hlinkClick r:id="rId9"/>
-              </a:rPr>
-              <a:t>http://</a:t>
-            </a:r>
-            <a:r>
-              <a:rPr lang="da-DK" sz="1400" dirty="0" smtClean="0">
-                <a:hlinkClick r:id="rId9"/>
-              </a:rPr>
-              <a:t>www.codewars.com/kata/uniquepush-no-dupes</a:t>
-            </a:r>
-            <a:endParaRPr lang="da-DK" sz="1400" dirty="0" smtClean="0"/>
-          </a:p>
-          <a:p>
-            <a:endParaRPr lang="da-DK" sz="1400" dirty="0"/>
-          </a:p>
-          <a:p>
-            <a:r>
-              <a:rPr lang="da-DK" sz="1400" dirty="0">
-                <a:hlinkClick r:id="rId10"/>
               </a:rPr>
               <a:t>http://jhusain.github.io/learnrx/</a:t>
             </a:r>
@@ -14739,61 +15482,20 @@
           <a:lstStyle/>
           <a:p>
             <a:r>
-              <a:rPr lang="en-US" dirty="0"/>
-              <a:t>null</a:t>
-            </a:r>
-          </a:p>
-          <a:p>
-            <a:r>
-              <a:rPr lang="en-US" dirty="0"/>
-              <a:t>undefined</a:t>
-            </a:r>
-          </a:p>
-          <a:p>
-            <a:r>
-              <a:rPr lang="en-US" dirty="0" err="1"/>
-              <a:t>boolean</a:t>
-            </a:r>
-            <a:endParaRPr lang="en-US" dirty="0"/>
-          </a:p>
-          <a:p>
-            <a:r>
-              <a:rPr lang="en-US" dirty="0"/>
-              <a:t>number</a:t>
-            </a:r>
-          </a:p>
-          <a:p>
-            <a:r>
-              <a:rPr lang="en-US" dirty="0"/>
-              <a:t>string</a:t>
-            </a:r>
-          </a:p>
-          <a:p>
-            <a:r>
-              <a:rPr lang="en-US" dirty="0" smtClean="0"/>
-              <a:t>object</a:t>
-            </a:r>
-          </a:p>
-          <a:p>
-            <a:pPr lvl="1"/>
-            <a:r>
-              <a:rPr lang="en-US" dirty="0"/>
-              <a:t>f</a:t>
-            </a:r>
-            <a:r>
-              <a:rPr lang="en-US" dirty="0" smtClean="0"/>
-              <a:t>unction</a:t>
-            </a:r>
-          </a:p>
-          <a:p>
-            <a:pPr lvl="1"/>
-            <a:r>
-              <a:rPr lang="en-US" dirty="0" smtClean="0"/>
-              <a:t>array</a:t>
-            </a:r>
-            <a:endParaRPr lang="en-US" dirty="0"/>
-          </a:p>
-          <a:p>
+              <a:rPr lang="da-DK" dirty="0" smtClean="0"/>
+              <a:t>Control </a:t>
+            </a:r>
+            <a:r>
+              <a:rPr lang="da-DK" dirty="0" err="1" smtClean="0"/>
+              <a:t>structures</a:t>
+            </a:r>
+            <a:endParaRPr lang="da-DK" dirty="0" smtClean="0"/>
+          </a:p>
+          <a:p>
+            <a:r>
+              <a:rPr lang="da-DK" smtClean="0"/>
+              <a:t>Variables</a:t>
+            </a:r>
             <a:endParaRPr lang="da-DK" dirty="0"/>
           </a:p>
         </p:txBody>
@@ -14813,13 +15515,7 @@
           <a:bodyPr/>
           <a:lstStyle/>
           <a:p>
-            <a:r>
-              <a:rPr lang="da-DK" dirty="0" smtClean="0">
-                <a:hlinkClick r:id="rId2"/>
-              </a:rPr>
-              <a:t>WAT</a:t>
-            </a:r>
-            <a:endParaRPr lang="da-DK" dirty="0"/>
+            <a:endParaRPr lang="da-DK"/>
           </a:p>
         </p:txBody>
       </p:sp>
@@ -14840,7 +15536,11 @@
           <a:p>
             <a:r>
               <a:rPr lang="da-DK" dirty="0" smtClean="0"/>
-              <a:t>Types</a:t>
+              <a:t>Imperative and </a:t>
+            </a:r>
+            <a:r>
+              <a:rPr lang="da-DK" dirty="0" err="1" smtClean="0"/>
+              <a:t>structured</a:t>
             </a:r>
             <a:endParaRPr lang="da-DK" dirty="0"/>
           </a:p>
@@ -14849,7 +15549,7 @@
     </p:spTree>
     <p:extLst>
       <p:ext uri="{BB962C8B-B14F-4D97-AF65-F5344CB8AC3E}">
-        <p14:creationId xmlns:p14="http://schemas.microsoft.com/office/powerpoint/2010/main" val="1697538298"/>
+        <p14:creationId xmlns:p14="http://schemas.microsoft.com/office/powerpoint/2010/main" val="2454809312"/>
       </p:ext>
     </p:extLst>
   </p:cSld>
@@ -14899,20 +15599,61 @@
           <a:lstStyle/>
           <a:p>
             <a:r>
-              <a:rPr lang="da-DK" dirty="0" smtClean="0"/>
-              <a:t>Control </a:t>
-            </a:r>
-            <a:r>
-              <a:rPr lang="da-DK" dirty="0" err="1" smtClean="0"/>
-              <a:t>structures</a:t>
-            </a:r>
-            <a:endParaRPr lang="da-DK" dirty="0" smtClean="0"/>
-          </a:p>
-          <a:p>
-            <a:r>
-              <a:rPr lang="da-DK" smtClean="0"/>
-              <a:t>Variables</a:t>
-            </a:r>
+              <a:rPr lang="en-US" dirty="0"/>
+              <a:t>null</a:t>
+            </a:r>
+          </a:p>
+          <a:p>
+            <a:r>
+              <a:rPr lang="en-US" dirty="0"/>
+              <a:t>undefined</a:t>
+            </a:r>
+          </a:p>
+          <a:p>
+            <a:r>
+              <a:rPr lang="en-US" dirty="0" err="1"/>
+              <a:t>boolean</a:t>
+            </a:r>
+            <a:endParaRPr lang="en-US" dirty="0"/>
+          </a:p>
+          <a:p>
+            <a:r>
+              <a:rPr lang="en-US" dirty="0"/>
+              <a:t>number</a:t>
+            </a:r>
+          </a:p>
+          <a:p>
+            <a:r>
+              <a:rPr lang="en-US" dirty="0"/>
+              <a:t>string</a:t>
+            </a:r>
+          </a:p>
+          <a:p>
+            <a:r>
+              <a:rPr lang="en-US" dirty="0" smtClean="0"/>
+              <a:t>object</a:t>
+            </a:r>
+          </a:p>
+          <a:p>
+            <a:pPr lvl="1"/>
+            <a:r>
+              <a:rPr lang="en-US" dirty="0"/>
+              <a:t>f</a:t>
+            </a:r>
+            <a:r>
+              <a:rPr lang="en-US" dirty="0" smtClean="0"/>
+              <a:t>unction</a:t>
+            </a:r>
+          </a:p>
+          <a:p>
+            <a:pPr lvl="1"/>
+            <a:r>
+              <a:rPr lang="en-US" dirty="0" smtClean="0"/>
+              <a:t>array</a:t>
+            </a:r>
+            <a:endParaRPr lang="en-US" dirty="0"/>
+          </a:p>
+          <a:p>
             <a:endParaRPr lang="da-DK" dirty="0"/>
           </a:p>
         </p:txBody>
@@ -14932,7 +15673,13 @@
           <a:bodyPr/>
           <a:lstStyle/>
           <a:p>
-            <a:endParaRPr lang="da-DK"/>
+            <a:r>
+              <a:rPr lang="da-DK" dirty="0" smtClean="0">
+                <a:hlinkClick r:id="rId3"/>
+              </a:rPr>
+              <a:t>WAT</a:t>
+            </a:r>
+            <a:endParaRPr lang="da-DK" dirty="0"/>
           </a:p>
         </p:txBody>
       </p:sp>
@@ -14953,11 +15700,7 @@
           <a:p>
             <a:r>
               <a:rPr lang="da-DK" dirty="0" smtClean="0"/>
-              <a:t>Imperative and </a:t>
-            </a:r>
-            <a:r>
-              <a:rPr lang="da-DK" dirty="0" err="1" smtClean="0"/>
-              <a:t>structured</a:t>
+              <a:t>Types</a:t>
             </a:r>
             <a:endParaRPr lang="da-DK" dirty="0"/>
           </a:p>
@@ -14966,13 +15709,20 @@
     </p:spTree>
     <p:extLst>
       <p:ext uri="{BB962C8B-B14F-4D97-AF65-F5344CB8AC3E}">
-        <p14:creationId xmlns:p14="http://schemas.microsoft.com/office/powerpoint/2010/main" val="2454809312"/>
+        <p14:creationId xmlns:p14="http://schemas.microsoft.com/office/powerpoint/2010/main" val="1697538298"/>
       </p:ext>
     </p:extLst>
   </p:cSld>
   <p:clrMapOvr>
     <a:masterClrMapping/>
   </p:clrMapOvr>
+  <p:timing>
+    <p:tnLst>
+      <p:par>
+        <p:cTn id="1" dur="indefinite" restart="never" nodeType="tmRoot"/>
+      </p:par>
+    </p:tnLst>
+  </p:timing>
 </p:sld>
 </file>
 
@@ -15113,6 +15863,13 @@
   <p:clrMapOvr>
     <a:masterClrMapping/>
   </p:clrMapOvr>
+  <p:timing>
+    <p:tnLst>
+      <p:par>
+        <p:cTn id="1" dur="indefinite" restart="never" nodeType="tmRoot"/>
+      </p:par>
+    </p:tnLst>
+  </p:timing>
 </p:sld>
 </file>
 

</xml_diff>

<commit_message>
Added more notes and samples
</commit_message>
<xml_diff>
--- a/JavaScript Fundamentals.pptx
+++ b/JavaScript Fundamentals.pptx
@@ -220,7 +220,7 @@
             <a:fld id="{0054C2FE-BA7B-41D2-B892-E5AC5FCF854B}" type="datetimeFigureOut">
               <a:rPr lang="da-DK" smtClean="0"/>
               <a:pPr/>
-              <a:t>28-10-2014</a:t>
+              <a:t>29-10-2014</a:t>
             </a:fld>
             <a:endParaRPr lang="da-DK" dirty="0"/>
           </a:p>
@@ -388,7 +388,7 @@
             <a:fld id="{454483E1-46E1-47A5-84FB-98D3EDCCF46E}" type="datetimeFigureOut">
               <a:rPr lang="da-DK" smtClean="0"/>
               <a:pPr/>
-              <a:t>28-10-2014</a:t>
+              <a:t>29-10-2014</a:t>
             </a:fld>
             <a:endParaRPr lang="da-DK" dirty="0"/>
           </a:p>
@@ -767,11 +767,11 @@
           <a:p>
             <a:r>
               <a:rPr lang="da-DK" dirty="0" smtClean="0"/>
-              <a:t>Most </a:t>
+              <a:t>Lex1 – is </a:t>
             </a:r>
             <a:r>
               <a:rPr lang="da-DK" dirty="0" err="1" smtClean="0"/>
-              <a:t>people</a:t>
+              <a:t>this</a:t>
             </a:r>
             <a:r>
               <a:rPr lang="da-DK" dirty="0" smtClean="0"/>
@@ -779,31 +779,21 @@
             </a:r>
             <a:r>
               <a:rPr lang="da-DK" dirty="0" err="1" smtClean="0"/>
-              <a:t>make</a:t>
+              <a:t>closure</a:t>
             </a:r>
             <a:r>
               <a:rPr lang="da-DK" dirty="0" smtClean="0"/>
-              <a:t> the </a:t>
+              <a:t>?</a:t>
+            </a:r>
+          </a:p>
+          <a:p>
+            <a:r>
+              <a:rPr lang="da-DK" dirty="0" smtClean="0"/>
+              <a:t>Closure1 - &gt; </a:t>
             </a:r>
             <a:r>
               <a:rPr lang="da-DK" dirty="0" err="1" smtClean="0"/>
-              <a:t>mistake</a:t>
-            </a:r>
-            <a:r>
-              <a:rPr lang="da-DK" dirty="0" smtClean="0"/>
-              <a:t> of </a:t>
-            </a:r>
-            <a:r>
-              <a:rPr lang="da-DK" dirty="0" err="1" smtClean="0"/>
-              <a:t>trying</a:t>
-            </a:r>
-            <a:r>
-              <a:rPr lang="da-DK" baseline="0" dirty="0" smtClean="0"/>
-              <a:t> to </a:t>
-            </a:r>
-            <a:r>
-              <a:rPr lang="da-DK" baseline="0" dirty="0" err="1" smtClean="0"/>
-              <a:t>cram</a:t>
+              <a:t>observed</a:t>
             </a:r>
             <a:r>
               <a:rPr lang="da-DK" baseline="0" dirty="0" smtClean="0"/>
@@ -811,157 +801,14 @@
             </a:r>
             <a:r>
               <a:rPr lang="da-DK" baseline="0" dirty="0" err="1" smtClean="0"/>
-              <a:t>javascript</a:t>
-            </a:r>
-            <a:r>
-              <a:rPr lang="da-DK" baseline="0" dirty="0" smtClean="0"/>
-              <a:t> </a:t>
-            </a:r>
-            <a:r>
-              <a:rPr lang="da-DK" baseline="0" dirty="0" err="1" smtClean="0"/>
-              <a:t>into</a:t>
-            </a:r>
-            <a:r>
-              <a:rPr lang="da-DK" baseline="0" dirty="0" smtClean="0"/>
-              <a:t> the </a:t>
-            </a:r>
-            <a:r>
-              <a:rPr lang="da-DK" baseline="0" dirty="0" err="1" smtClean="0"/>
-              <a:t>classical</a:t>
-            </a:r>
-            <a:r>
-              <a:rPr lang="da-DK" baseline="0" dirty="0" smtClean="0"/>
-              <a:t> </a:t>
-            </a:r>
-            <a:r>
-              <a:rPr lang="da-DK" baseline="0" dirty="0" err="1" smtClean="0"/>
-              <a:t>class</a:t>
-            </a:r>
-            <a:r>
-              <a:rPr lang="da-DK" baseline="0" dirty="0" smtClean="0"/>
-              <a:t> </a:t>
-            </a:r>
-            <a:r>
-              <a:rPr lang="da-DK" baseline="0" dirty="0" err="1" smtClean="0"/>
-              <a:t>oriented</a:t>
-            </a:r>
-            <a:r>
-              <a:rPr lang="da-DK" baseline="0" dirty="0" smtClean="0"/>
-              <a:t> </a:t>
-            </a:r>
-            <a:r>
-              <a:rPr lang="da-DK" baseline="0" dirty="0" err="1" smtClean="0"/>
-              <a:t>programming</a:t>
-            </a:r>
-            <a:r>
-              <a:rPr lang="da-DK" baseline="0" dirty="0" smtClean="0"/>
-              <a:t> </a:t>
-            </a:r>
-            <a:r>
-              <a:rPr lang="da-DK" baseline="0" dirty="0" err="1" smtClean="0"/>
-              <a:t>paradigm</a:t>
-            </a:r>
-            <a:r>
-              <a:rPr lang="da-DK" baseline="0" dirty="0" smtClean="0"/>
-              <a:t>. It is not </a:t>
-            </a:r>
-            <a:r>
-              <a:rPr lang="da-DK" baseline="0" dirty="0" err="1" smtClean="0"/>
-              <a:t>very</a:t>
-            </a:r>
-            <a:r>
-              <a:rPr lang="da-DK" baseline="0" dirty="0" smtClean="0"/>
-              <a:t> </a:t>
-            </a:r>
-            <a:r>
-              <a:rPr lang="da-DK" baseline="0" dirty="0" err="1" smtClean="0"/>
-              <a:t>well</a:t>
-            </a:r>
-            <a:r>
-              <a:rPr lang="da-DK" baseline="0" dirty="0" smtClean="0"/>
-              <a:t> </a:t>
-            </a:r>
-            <a:r>
-              <a:rPr lang="da-DK" baseline="0" dirty="0" err="1" smtClean="0"/>
-              <a:t>suited</a:t>
-            </a:r>
-            <a:r>
-              <a:rPr lang="da-DK" baseline="0" dirty="0" smtClean="0"/>
-              <a:t> for </a:t>
-            </a:r>
-            <a:r>
-              <a:rPr lang="da-DK" baseline="0" dirty="0" err="1" smtClean="0"/>
-              <a:t>that</a:t>
+              <a:t>closure</a:t>
             </a:r>
             <a:endParaRPr lang="da-DK" baseline="0" dirty="0" smtClean="0"/>
           </a:p>
           <a:p>
-            <a:r>
-              <a:rPr lang="da-DK" baseline="0" dirty="0" err="1" smtClean="0"/>
-              <a:t>You</a:t>
-            </a:r>
-            <a:r>
-              <a:rPr lang="da-DK" baseline="0" dirty="0" smtClean="0"/>
-              <a:t> </a:t>
-            </a:r>
-            <a:r>
-              <a:rPr lang="da-DK" baseline="0" dirty="0" err="1" smtClean="0"/>
-              <a:t>will</a:t>
-            </a:r>
-            <a:r>
-              <a:rPr lang="da-DK" baseline="0" dirty="0" smtClean="0"/>
-              <a:t> </a:t>
-            </a:r>
-            <a:r>
-              <a:rPr lang="da-DK" baseline="0" dirty="0" err="1" smtClean="0"/>
-              <a:t>be</a:t>
-            </a:r>
-            <a:r>
-              <a:rPr lang="da-DK" baseline="0" dirty="0" smtClean="0"/>
-              <a:t> </a:t>
-            </a:r>
-            <a:r>
-              <a:rPr lang="da-DK" baseline="0" dirty="0" err="1" smtClean="0"/>
-              <a:t>working</a:t>
-            </a:r>
-            <a:r>
-              <a:rPr lang="da-DK" baseline="0" dirty="0" smtClean="0"/>
-              <a:t> </a:t>
-            </a:r>
-            <a:r>
-              <a:rPr lang="da-DK" baseline="0" dirty="0" err="1" smtClean="0"/>
-              <a:t>against</a:t>
-            </a:r>
-            <a:r>
-              <a:rPr lang="da-DK" baseline="0" dirty="0" smtClean="0"/>
-              <a:t> the </a:t>
-            </a:r>
-            <a:r>
-              <a:rPr lang="da-DK" baseline="0" dirty="0" err="1" smtClean="0"/>
-              <a:t>language</a:t>
-            </a:r>
-            <a:r>
-              <a:rPr lang="da-DK" baseline="0" dirty="0" smtClean="0"/>
-              <a:t>.</a:t>
-            </a:r>
-          </a:p>
-          <a:p>
-            <a:endParaRPr lang="da-DK" baseline="0" dirty="0" smtClean="0"/>
-          </a:p>
-          <a:p>
-            <a:r>
-              <a:rPr lang="da-DK" baseline="0" dirty="0" smtClean="0"/>
-              <a:t>Show proto0</a:t>
-            </a:r>
-          </a:p>
-          <a:p>
-            <a:endParaRPr lang="da-DK" baseline="0" dirty="0" smtClean="0"/>
-          </a:p>
-          <a:p>
-            <a:r>
-              <a:rPr lang="da-DK" baseline="0" dirty="0" smtClean="0"/>
-              <a:t>Show prototype3</a:t>
-            </a:r>
+            <a:endParaRPr lang="da-DK" dirty="0" smtClean="0"/>
+          </a:p>
+          <a:p>
             <a:endParaRPr lang="da-DK" dirty="0"/>
           </a:p>
         </p:txBody>
@@ -969,7 +816,7 @@
     </p:spTree>
     <p:extLst>
       <p:ext uri="{BB962C8B-B14F-4D97-AF65-F5344CB8AC3E}">
-        <p14:creationId xmlns:p14="http://schemas.microsoft.com/office/powerpoint/2010/main" val="45028235"/>
+        <p14:creationId xmlns:p14="http://schemas.microsoft.com/office/powerpoint/2010/main" val="495123908"/>
       </p:ext>
     </p:extLst>
   </p:cSld>
@@ -1024,8 +871,34 @@
           <a:lstStyle/>
           <a:p>
             <a:r>
+              <a:rPr lang="da-DK" dirty="0" err="1" smtClean="0"/>
+              <a:t>IIFEs</a:t>
+            </a:r>
+            <a:r>
               <a:rPr lang="da-DK" dirty="0" smtClean="0"/>
-              <a:t>Proto3</a:t>
+              <a:t>, </a:t>
+            </a:r>
+            <a:r>
+              <a:rPr lang="da-DK" dirty="0" err="1" smtClean="0"/>
+              <a:t>see</a:t>
+            </a:r>
+            <a:r>
+              <a:rPr lang="da-DK" dirty="0" smtClean="0"/>
+              <a:t> </a:t>
+            </a:r>
+            <a:r>
+              <a:rPr lang="da-DK" dirty="0" err="1" smtClean="0"/>
+              <a:t>closure</a:t>
+            </a:r>
+            <a:r>
+              <a:rPr lang="da-DK" baseline="0" dirty="0" smtClean="0"/>
+              <a:t> 3</a:t>
+            </a:r>
+          </a:p>
+          <a:p>
+            <a:r>
+              <a:rPr lang="da-DK" baseline="0" dirty="0" err="1" smtClean="0"/>
+              <a:t>Modules</a:t>
             </a:r>
             <a:endParaRPr lang="da-DK" dirty="0"/>
           </a:p>
@@ -1034,7 +907,7 @@
     </p:spTree>
     <p:extLst>
       <p:ext uri="{BB962C8B-B14F-4D97-AF65-F5344CB8AC3E}">
-        <p14:creationId xmlns:p14="http://schemas.microsoft.com/office/powerpoint/2010/main" val="724399097"/>
+        <p14:creationId xmlns:p14="http://schemas.microsoft.com/office/powerpoint/2010/main" val="3470971837"/>
       </p:ext>
     </p:extLst>
   </p:cSld>
@@ -1090,20 +963,200 @@
           <a:p>
             <a:r>
               <a:rPr lang="da-DK" dirty="0" smtClean="0"/>
-              <a:t>Proto4</a:t>
-            </a:r>
-          </a:p>
-          <a:p>
-            <a:endParaRPr lang="da-DK" dirty="0" smtClean="0"/>
-          </a:p>
-          <a:p>
+              <a:t>Most </a:t>
+            </a:r>
             <a:r>
               <a:rPr lang="da-DK" dirty="0" err="1" smtClean="0"/>
-              <a:t>Then</a:t>
+              <a:t>people</a:t>
             </a:r>
             <a:r>
               <a:rPr lang="da-DK" dirty="0" smtClean="0"/>
-              <a:t> show proto1 and proto2</a:t>
+              <a:t> </a:t>
+            </a:r>
+            <a:r>
+              <a:rPr lang="da-DK" dirty="0" err="1" smtClean="0"/>
+              <a:t>make</a:t>
+            </a:r>
+            <a:r>
+              <a:rPr lang="da-DK" dirty="0" smtClean="0"/>
+              <a:t> the </a:t>
+            </a:r>
+            <a:r>
+              <a:rPr lang="da-DK" dirty="0" err="1" smtClean="0"/>
+              <a:t>mistake</a:t>
+            </a:r>
+            <a:r>
+              <a:rPr lang="da-DK" dirty="0" smtClean="0"/>
+              <a:t> of </a:t>
+            </a:r>
+            <a:r>
+              <a:rPr lang="da-DK" dirty="0" err="1" smtClean="0"/>
+              <a:t>trying</a:t>
+            </a:r>
+            <a:r>
+              <a:rPr lang="da-DK" baseline="0" dirty="0" smtClean="0"/>
+              <a:t> to </a:t>
+            </a:r>
+            <a:r>
+              <a:rPr lang="da-DK" baseline="0" dirty="0" err="1" smtClean="0"/>
+              <a:t>cram</a:t>
+            </a:r>
+            <a:r>
+              <a:rPr lang="da-DK" baseline="0" dirty="0" smtClean="0"/>
+              <a:t> </a:t>
+            </a:r>
+            <a:r>
+              <a:rPr lang="da-DK" baseline="0" dirty="0" err="1" smtClean="0"/>
+              <a:t>javascript</a:t>
+            </a:r>
+            <a:r>
+              <a:rPr lang="da-DK" baseline="0" dirty="0" smtClean="0"/>
+              <a:t> </a:t>
+            </a:r>
+            <a:r>
+              <a:rPr lang="da-DK" baseline="0" dirty="0" err="1" smtClean="0"/>
+              <a:t>into</a:t>
+            </a:r>
+            <a:r>
+              <a:rPr lang="da-DK" baseline="0" dirty="0" smtClean="0"/>
+              <a:t> the </a:t>
+            </a:r>
+            <a:r>
+              <a:rPr lang="da-DK" baseline="0" dirty="0" err="1" smtClean="0"/>
+              <a:t>classical</a:t>
+            </a:r>
+            <a:r>
+              <a:rPr lang="da-DK" baseline="0" dirty="0" smtClean="0"/>
+              <a:t> </a:t>
+            </a:r>
+            <a:r>
+              <a:rPr lang="da-DK" baseline="0" dirty="0" err="1" smtClean="0"/>
+              <a:t>class</a:t>
+            </a:r>
+            <a:r>
+              <a:rPr lang="da-DK" baseline="0" dirty="0" smtClean="0"/>
+              <a:t> </a:t>
+            </a:r>
+            <a:r>
+              <a:rPr lang="da-DK" baseline="0" dirty="0" err="1" smtClean="0"/>
+              <a:t>oriented</a:t>
+            </a:r>
+            <a:r>
+              <a:rPr lang="da-DK" baseline="0" dirty="0" smtClean="0"/>
+              <a:t> </a:t>
+            </a:r>
+            <a:r>
+              <a:rPr lang="da-DK" baseline="0" dirty="0" err="1" smtClean="0"/>
+              <a:t>programming</a:t>
+            </a:r>
+            <a:r>
+              <a:rPr lang="da-DK" baseline="0" dirty="0" smtClean="0"/>
+              <a:t> </a:t>
+            </a:r>
+            <a:r>
+              <a:rPr lang="da-DK" baseline="0" dirty="0" err="1" smtClean="0"/>
+              <a:t>paradigm</a:t>
+            </a:r>
+            <a:r>
+              <a:rPr lang="da-DK" baseline="0" dirty="0" smtClean="0"/>
+              <a:t>. It is not </a:t>
+            </a:r>
+            <a:r>
+              <a:rPr lang="da-DK" baseline="0" dirty="0" err="1" smtClean="0"/>
+              <a:t>very</a:t>
+            </a:r>
+            <a:r>
+              <a:rPr lang="da-DK" baseline="0" dirty="0" smtClean="0"/>
+              <a:t> </a:t>
+            </a:r>
+            <a:r>
+              <a:rPr lang="da-DK" baseline="0" dirty="0" err="1" smtClean="0"/>
+              <a:t>well</a:t>
+            </a:r>
+            <a:r>
+              <a:rPr lang="da-DK" baseline="0" dirty="0" smtClean="0"/>
+              <a:t> </a:t>
+            </a:r>
+            <a:r>
+              <a:rPr lang="da-DK" baseline="0" dirty="0" err="1" smtClean="0"/>
+              <a:t>suited</a:t>
+            </a:r>
+            <a:r>
+              <a:rPr lang="da-DK" baseline="0" dirty="0" smtClean="0"/>
+              <a:t> for </a:t>
+            </a:r>
+            <a:r>
+              <a:rPr lang="da-DK" baseline="0" dirty="0" err="1" smtClean="0"/>
+              <a:t>that</a:t>
+            </a:r>
+            <a:endParaRPr lang="da-DK" baseline="0" dirty="0" smtClean="0"/>
+          </a:p>
+          <a:p>
+            <a:r>
+              <a:rPr lang="da-DK" baseline="0" dirty="0" err="1" smtClean="0"/>
+              <a:t>You</a:t>
+            </a:r>
+            <a:r>
+              <a:rPr lang="da-DK" baseline="0" dirty="0" smtClean="0"/>
+              <a:t> </a:t>
+            </a:r>
+            <a:r>
+              <a:rPr lang="da-DK" baseline="0" dirty="0" err="1" smtClean="0"/>
+              <a:t>will</a:t>
+            </a:r>
+            <a:r>
+              <a:rPr lang="da-DK" baseline="0" dirty="0" smtClean="0"/>
+              <a:t> </a:t>
+            </a:r>
+            <a:r>
+              <a:rPr lang="da-DK" baseline="0" dirty="0" err="1" smtClean="0"/>
+              <a:t>be</a:t>
+            </a:r>
+            <a:r>
+              <a:rPr lang="da-DK" baseline="0" dirty="0" smtClean="0"/>
+              <a:t> </a:t>
+            </a:r>
+            <a:r>
+              <a:rPr lang="da-DK" baseline="0" dirty="0" err="1" smtClean="0"/>
+              <a:t>working</a:t>
+            </a:r>
+            <a:r>
+              <a:rPr lang="da-DK" baseline="0" dirty="0" smtClean="0"/>
+              <a:t> </a:t>
+            </a:r>
+            <a:r>
+              <a:rPr lang="da-DK" baseline="0" dirty="0" err="1" smtClean="0"/>
+              <a:t>against</a:t>
+            </a:r>
+            <a:r>
+              <a:rPr lang="da-DK" baseline="0" dirty="0" smtClean="0"/>
+              <a:t> the </a:t>
+            </a:r>
+            <a:r>
+              <a:rPr lang="da-DK" baseline="0" dirty="0" err="1" smtClean="0"/>
+              <a:t>language</a:t>
+            </a:r>
+            <a:r>
+              <a:rPr lang="da-DK" baseline="0" dirty="0" smtClean="0"/>
+              <a:t>.</a:t>
+            </a:r>
+          </a:p>
+          <a:p>
+            <a:endParaRPr lang="da-DK" baseline="0" dirty="0" smtClean="0"/>
+          </a:p>
+          <a:p>
+            <a:r>
+              <a:rPr lang="da-DK" baseline="0" dirty="0" smtClean="0"/>
+              <a:t>Show proto0</a:t>
+            </a:r>
+          </a:p>
+          <a:p>
+            <a:endParaRPr lang="da-DK" baseline="0" dirty="0" smtClean="0"/>
+          </a:p>
+          <a:p>
+            <a:r>
+              <a:rPr lang="da-DK" baseline="0" dirty="0" smtClean="0"/>
+              <a:t>Show prototype3</a:t>
             </a:r>
             <a:endParaRPr lang="da-DK" dirty="0"/>
           </a:p>
@@ -1112,7 +1165,7 @@
     </p:spTree>
     <p:extLst>
       <p:ext uri="{BB962C8B-B14F-4D97-AF65-F5344CB8AC3E}">
-        <p14:creationId xmlns:p14="http://schemas.microsoft.com/office/powerpoint/2010/main" val="3647212318"/>
+        <p14:creationId xmlns:p14="http://schemas.microsoft.com/office/powerpoint/2010/main" val="45028235"/>
       </p:ext>
     </p:extLst>
   </p:cSld>
@@ -1166,6 +1219,10 @@
           <a:bodyPr/>
           <a:lstStyle/>
           <a:p>
+            <a:r>
+              <a:rPr lang="da-DK" dirty="0" smtClean="0"/>
+              <a:t>Proto3</a:t>
+            </a:r>
             <a:endParaRPr lang="da-DK" dirty="0"/>
           </a:p>
         </p:txBody>
@@ -1173,7 +1230,7 @@
     </p:spTree>
     <p:extLst>
       <p:ext uri="{BB962C8B-B14F-4D97-AF65-F5344CB8AC3E}">
-        <p14:creationId xmlns:p14="http://schemas.microsoft.com/office/powerpoint/2010/main" val="1557260125"/>
+        <p14:creationId xmlns:p14="http://schemas.microsoft.com/office/powerpoint/2010/main" val="724399097"/>
       </p:ext>
     </p:extLst>
   </p:cSld>
@@ -1229,6 +1286,145 @@
           <a:p>
             <a:r>
               <a:rPr lang="da-DK" dirty="0" smtClean="0"/>
+              <a:t>Proto4</a:t>
+            </a:r>
+          </a:p>
+          <a:p>
+            <a:endParaRPr lang="da-DK" dirty="0" smtClean="0"/>
+          </a:p>
+          <a:p>
+            <a:r>
+              <a:rPr lang="da-DK" dirty="0" err="1" smtClean="0"/>
+              <a:t>Then</a:t>
+            </a:r>
+            <a:r>
+              <a:rPr lang="da-DK" dirty="0" smtClean="0"/>
+              <a:t> show proto1 and proto2</a:t>
+            </a:r>
+            <a:endParaRPr lang="da-DK" dirty="0"/>
+          </a:p>
+        </p:txBody>
+      </p:sp>
+    </p:spTree>
+    <p:extLst>
+      <p:ext uri="{BB962C8B-B14F-4D97-AF65-F5344CB8AC3E}">
+        <p14:creationId xmlns:p14="http://schemas.microsoft.com/office/powerpoint/2010/main" val="3647212318"/>
+      </p:ext>
+    </p:extLst>
+  </p:cSld>
+  <p:clrMapOvr>
+    <a:masterClrMapping/>
+  </p:clrMapOvr>
+</p:notes>
+</file>
+
+<file path=ppt/notesSlides/notesSlide15.xml><?xml version="1.0" encoding="utf-8"?>
+<p:notes xmlns:a="http://schemas.openxmlformats.org/drawingml/2006/main" xmlns:r="http://schemas.openxmlformats.org/officeDocument/2006/relationships" xmlns:p="http://schemas.openxmlformats.org/presentationml/2006/main">
+  <p:cSld>
+    <p:spTree>
+      <p:nvGrpSpPr>
+        <p:cNvPr id="1" name=""/>
+        <p:cNvGrpSpPr/>
+        <p:nvPr/>
+      </p:nvGrpSpPr>
+      <p:grpSpPr>
+        <a:xfrm>
+          <a:off x="0" y="0"/>
+          <a:ext cx="0" cy="0"/>
+          <a:chOff x="0" y="0"/>
+          <a:chExt cx="0" cy="0"/>
+        </a:xfrm>
+      </p:grpSpPr>
+      <p:sp>
+        <p:nvSpPr>
+          <p:cNvPr id="2" name="Slide Image Placeholder 1"/>
+          <p:cNvSpPr>
+            <a:spLocks noGrp="1" noRot="1" noChangeAspect="1"/>
+          </p:cNvSpPr>
+          <p:nvPr>
+            <p:ph type="sldImg"/>
+          </p:nvPr>
+        </p:nvSpPr>
+        <p:spPr/>
+      </p:sp>
+      <p:sp>
+        <p:nvSpPr>
+          <p:cNvPr id="3" name="Notes Placeholder 2"/>
+          <p:cNvSpPr>
+            <a:spLocks noGrp="1"/>
+          </p:cNvSpPr>
+          <p:nvPr>
+            <p:ph type="body" idx="1"/>
+          </p:nvPr>
+        </p:nvSpPr>
+        <p:spPr/>
+        <p:txBody>
+          <a:bodyPr/>
+          <a:lstStyle/>
+          <a:p>
+            <a:endParaRPr lang="da-DK" dirty="0"/>
+          </a:p>
+        </p:txBody>
+      </p:sp>
+    </p:spTree>
+    <p:extLst>
+      <p:ext uri="{BB962C8B-B14F-4D97-AF65-F5344CB8AC3E}">
+        <p14:creationId xmlns:p14="http://schemas.microsoft.com/office/powerpoint/2010/main" val="1557260125"/>
+      </p:ext>
+    </p:extLst>
+  </p:cSld>
+  <p:clrMapOvr>
+    <a:masterClrMapping/>
+  </p:clrMapOvr>
+</p:notes>
+</file>
+
+<file path=ppt/notesSlides/notesSlide16.xml><?xml version="1.0" encoding="utf-8"?>
+<p:notes xmlns:a="http://schemas.openxmlformats.org/drawingml/2006/main" xmlns:r="http://schemas.openxmlformats.org/officeDocument/2006/relationships" xmlns:p="http://schemas.openxmlformats.org/presentationml/2006/main">
+  <p:cSld>
+    <p:spTree>
+      <p:nvGrpSpPr>
+        <p:cNvPr id="1" name=""/>
+        <p:cNvGrpSpPr/>
+        <p:nvPr/>
+      </p:nvGrpSpPr>
+      <p:grpSpPr>
+        <a:xfrm>
+          <a:off x="0" y="0"/>
+          <a:ext cx="0" cy="0"/>
+          <a:chOff x="0" y="0"/>
+          <a:chExt cx="0" cy="0"/>
+        </a:xfrm>
+      </p:grpSpPr>
+      <p:sp>
+        <p:nvSpPr>
+          <p:cNvPr id="2" name="Slide Image Placeholder 1"/>
+          <p:cNvSpPr>
+            <a:spLocks noGrp="1" noRot="1" noChangeAspect="1"/>
+          </p:cNvSpPr>
+          <p:nvPr>
+            <p:ph type="sldImg"/>
+          </p:nvPr>
+        </p:nvSpPr>
+        <p:spPr/>
+      </p:sp>
+      <p:sp>
+        <p:nvSpPr>
+          <p:cNvPr id="3" name="Notes Placeholder 2"/>
+          <p:cNvSpPr>
+            <a:spLocks noGrp="1"/>
+          </p:cNvSpPr>
+          <p:nvPr>
+            <p:ph type="body" idx="1"/>
+          </p:nvPr>
+        </p:nvSpPr>
+        <p:spPr/>
+        <p:txBody>
+          <a:bodyPr/>
+          <a:lstStyle/>
+          <a:p>
+            <a:r>
+              <a:rPr lang="da-DK" dirty="0" smtClean="0"/>
               <a:t>Show hoisting1,</a:t>
             </a:r>
             <a:r>
@@ -1365,7 +1561,7 @@
 </p:notes>
 </file>
 
-<file path=ppt/notesSlides/notesSlide15.xml><?xml version="1.0" encoding="utf-8"?>
+<file path=ppt/notesSlides/notesSlide17.xml><?xml version="1.0" encoding="utf-8"?>
 <p:notes xmlns:a="http://schemas.openxmlformats.org/drawingml/2006/main" xmlns:r="http://schemas.openxmlformats.org/officeDocument/2006/relationships" xmlns:p="http://schemas.openxmlformats.org/presentationml/2006/main">
   <p:cSld>
     <p:spTree>
@@ -1874,193 +2070,46 @@
           <a:p>
             <a:r>
               <a:rPr lang="da-DK" dirty="0" smtClean="0"/>
-              <a:t>Imperative and </a:t>
-            </a:r>
-            <a:r>
-              <a:rPr lang="da-DK" dirty="0" err="1" smtClean="0"/>
-              <a:t>structured</a:t>
-            </a:r>
+              <a:t>Start med at spørge hvad deres erfaring er med JavaScript,</a:t>
+            </a:r>
+            <a:r>
+              <a:rPr lang="da-DK" baseline="0" dirty="0" smtClean="0"/>
+              <a:t> html, css etc.</a:t>
+            </a:r>
+          </a:p>
+          <a:p>
+            <a:endParaRPr lang="da-DK" baseline="0" dirty="0" smtClean="0"/>
+          </a:p>
+          <a:p>
             <a:r>
               <a:rPr lang="da-DK" dirty="0" smtClean="0"/>
-              <a:t>: </a:t>
-            </a:r>
-            <a:r>
-              <a:rPr lang="da-DK" dirty="0" err="1" smtClean="0"/>
-              <a:t>if</a:t>
-            </a:r>
-            <a:r>
-              <a:rPr lang="da-DK" dirty="0" smtClean="0"/>
-              <a:t>, </a:t>
-            </a:r>
-            <a:r>
-              <a:rPr lang="da-DK" dirty="0" err="1" smtClean="0"/>
-              <a:t>while</a:t>
-            </a:r>
-            <a:r>
-              <a:rPr lang="da-DK" dirty="0" smtClean="0"/>
-              <a:t>,</a:t>
+              <a:t>I</a:t>
             </a:r>
             <a:r>
               <a:rPr lang="da-DK" baseline="0" dirty="0" smtClean="0"/>
-              <a:t> switch, for</a:t>
+              <a:t> will dive a bit deeper than most ”fundamentals” courses might do. The reason for this, is that I think it is important to understand how javascript works in order to be efficient and avoid pitfalls.</a:t>
             </a:r>
           </a:p>
           <a:p>
             <a:r>
               <a:rPr lang="da-DK" baseline="0" dirty="0" smtClean="0"/>
-              <a:t>Dynamic: x </a:t>
-            </a:r>
-            <a:r>
-              <a:rPr lang="da-DK" baseline="0" dirty="0" err="1" smtClean="0"/>
-              <a:t>can</a:t>
-            </a:r>
+              <a:t>You are all seasoned developers, so we will go quickly through the basic stuff, and focus on how to be efficient in javascript.</a:t>
+            </a:r>
+          </a:p>
+          <a:p>
+            <a:endParaRPr lang="da-DK" baseline="0" dirty="0" smtClean="0"/>
+          </a:p>
+          <a:p>
             <a:r>
               <a:rPr lang="da-DK" baseline="0" dirty="0" smtClean="0"/>
-              <a:t> </a:t>
-            </a:r>
-            <a:r>
-              <a:rPr lang="da-DK" baseline="0" dirty="0" err="1" smtClean="0"/>
-              <a:t>be</a:t>
-            </a:r>
+              <a:t>Fundamentals != the basic stuff</a:t>
+            </a:r>
+          </a:p>
+          <a:p>
             <a:r>
               <a:rPr lang="da-DK" baseline="0" dirty="0" smtClean="0"/>
-              <a:t> a </a:t>
-            </a:r>
-            <a:r>
-              <a:rPr lang="da-DK" baseline="0" dirty="0" err="1" smtClean="0"/>
-              <a:t>number</a:t>
-            </a:r>
-            <a:r>
-              <a:rPr lang="da-DK" baseline="0" dirty="0" smtClean="0"/>
-              <a:t> and </a:t>
-            </a:r>
-            <a:r>
-              <a:rPr lang="da-DK" baseline="0" dirty="0" err="1" smtClean="0"/>
-              <a:t>later</a:t>
-            </a:r>
-            <a:r>
-              <a:rPr lang="da-DK" baseline="0" dirty="0" smtClean="0"/>
-              <a:t> a </a:t>
-            </a:r>
-            <a:r>
-              <a:rPr lang="da-DK" baseline="0" dirty="0" err="1" smtClean="0"/>
-              <a:t>string</a:t>
-            </a:r>
-            <a:r>
-              <a:rPr lang="da-DK" baseline="0" dirty="0" smtClean="0"/>
-              <a:t>, </a:t>
-            </a:r>
-            <a:r>
-              <a:rPr lang="da-DK" baseline="0" dirty="0" err="1" smtClean="0"/>
-              <a:t>object</a:t>
-            </a:r>
-            <a:r>
-              <a:rPr lang="da-DK" baseline="0" dirty="0" smtClean="0"/>
-              <a:t>, </a:t>
-            </a:r>
-            <a:r>
-              <a:rPr lang="da-DK" baseline="0" dirty="0" err="1" smtClean="0"/>
-              <a:t>function</a:t>
-            </a:r>
-            <a:r>
-              <a:rPr lang="da-DK" baseline="0" dirty="0" smtClean="0"/>
-              <a:t>, etc.</a:t>
-            </a:r>
-          </a:p>
-          <a:p>
-            <a:r>
-              <a:rPr lang="da-DK" baseline="0" dirty="0" err="1" smtClean="0"/>
-              <a:t>Functional</a:t>
-            </a:r>
-            <a:r>
-              <a:rPr lang="da-DK" baseline="0" dirty="0" smtClean="0"/>
-              <a:t>: </a:t>
-            </a:r>
-            <a:r>
-              <a:rPr lang="da-DK" baseline="0" dirty="0" err="1" smtClean="0"/>
-              <a:t>Functions</a:t>
-            </a:r>
-            <a:r>
-              <a:rPr lang="da-DK" baseline="0" dirty="0" smtClean="0"/>
-              <a:t> </a:t>
-            </a:r>
-            <a:r>
-              <a:rPr lang="da-DK" baseline="0" dirty="0" err="1" smtClean="0"/>
-              <a:t>are</a:t>
-            </a:r>
-            <a:r>
-              <a:rPr lang="da-DK" baseline="0" dirty="0" smtClean="0"/>
-              <a:t> </a:t>
-            </a:r>
-            <a:r>
-              <a:rPr lang="da-DK" baseline="0" dirty="0" err="1" smtClean="0"/>
-              <a:t>first</a:t>
-            </a:r>
-            <a:r>
-              <a:rPr lang="da-DK" baseline="0" dirty="0" smtClean="0"/>
-              <a:t> </a:t>
-            </a:r>
-            <a:r>
-              <a:rPr lang="da-DK" baseline="0" dirty="0" err="1" smtClean="0"/>
-              <a:t>class</a:t>
-            </a:r>
-            <a:r>
-              <a:rPr lang="da-DK" baseline="0" dirty="0" smtClean="0"/>
-              <a:t>, and </a:t>
-            </a:r>
-            <a:r>
-              <a:rPr lang="da-DK" baseline="0" dirty="0" err="1" smtClean="0"/>
-              <a:t>can</a:t>
-            </a:r>
-            <a:r>
-              <a:rPr lang="da-DK" baseline="0" dirty="0" smtClean="0"/>
-              <a:t> </a:t>
-            </a:r>
-            <a:r>
-              <a:rPr lang="da-DK" baseline="0" dirty="0" err="1" smtClean="0"/>
-              <a:t>be</a:t>
-            </a:r>
-            <a:r>
-              <a:rPr lang="da-DK" baseline="0" dirty="0" smtClean="0"/>
-              <a:t> </a:t>
-            </a:r>
-            <a:r>
-              <a:rPr lang="da-DK" baseline="0" dirty="0" err="1" smtClean="0"/>
-              <a:t>passed</a:t>
-            </a:r>
-            <a:r>
-              <a:rPr lang="da-DK" baseline="0" dirty="0" smtClean="0"/>
-              <a:t> </a:t>
-            </a:r>
-            <a:r>
-              <a:rPr lang="da-DK" baseline="0" dirty="0" err="1" smtClean="0"/>
-              <a:t>around</a:t>
-            </a:r>
-            <a:r>
-              <a:rPr lang="da-DK" baseline="0" dirty="0" smtClean="0"/>
-              <a:t>, </a:t>
-            </a:r>
-            <a:r>
-              <a:rPr lang="da-DK" baseline="0" dirty="0" err="1" smtClean="0"/>
-              <a:t>bound</a:t>
-            </a:r>
-            <a:r>
-              <a:rPr lang="da-DK" baseline="0" dirty="0" smtClean="0"/>
-              <a:t>, </a:t>
-            </a:r>
-            <a:r>
-              <a:rPr lang="da-DK" baseline="0" dirty="0" err="1" smtClean="0"/>
-              <a:t>curried</a:t>
-            </a:r>
-            <a:r>
-              <a:rPr lang="da-DK" baseline="0" dirty="0" smtClean="0"/>
-              <a:t>, etc.</a:t>
-            </a:r>
-          </a:p>
-          <a:p>
-            <a:endParaRPr lang="da-DK" baseline="0" dirty="0" smtClean="0"/>
-          </a:p>
-          <a:p>
+              <a:t>Fundamentals == the important stuff, fundamental to understanding and learning javascript properly.</a:t>
+            </a:r>
             <a:endParaRPr lang="da-DK" dirty="0"/>
           </a:p>
         </p:txBody>
@@ -2068,7 +2117,7 @@
     </p:spTree>
     <p:extLst>
       <p:ext uri="{BB962C8B-B14F-4D97-AF65-F5344CB8AC3E}">
-        <p14:creationId xmlns:p14="http://schemas.microsoft.com/office/powerpoint/2010/main" val="2157140608"/>
+        <p14:creationId xmlns:p14="http://schemas.microsoft.com/office/powerpoint/2010/main" val="3947873485"/>
       </p:ext>
     </p:extLst>
   </p:cSld>
@@ -2124,8 +2173,112 @@
           <a:p>
             <a:r>
               <a:rPr lang="da-DK" dirty="0" smtClean="0"/>
-              <a:t>imperative1.js</a:t>
-            </a:r>
+              <a:t>Prototypebased</a:t>
+            </a:r>
+            <a:r>
+              <a:rPr lang="da-DK" baseline="0" dirty="0" smtClean="0"/>
+              <a:t>: ”Inheritance” is obtained through delegation to other objects. </a:t>
+            </a:r>
+          </a:p>
+          <a:p>
+            <a:r>
+              <a:rPr lang="da-DK" baseline="0" dirty="0" smtClean="0"/>
+              <a:t>Scripting language: Interpreted – ie. Not compiled ahead of time. But compile by the js runtime</a:t>
+            </a:r>
+          </a:p>
+          <a:p>
+            <a:r>
+              <a:rPr lang="da-DK" baseline="0" dirty="0" smtClean="0"/>
+              <a:t>Dynamic typing: Types are not checked before runtime. Vars don’t have types, values have types.</a:t>
+            </a:r>
+          </a:p>
+          <a:p>
+            <a:r>
+              <a:rPr lang="da-DK" baseline="0" dirty="0" smtClean="0"/>
+              <a:t>Object oriented in the literal sense of the word, NOT class oriented. </a:t>
+            </a:r>
+          </a:p>
+          <a:p>
+            <a:r>
+              <a:rPr lang="da-DK" baseline="0" dirty="0" smtClean="0"/>
+              <a:t>Imperative: </a:t>
+            </a:r>
+            <a:r>
+              <a:rPr lang="en-US" sz="1200" b="0" i="0" kern="1200" dirty="0" smtClean="0">
+                <a:solidFill>
+                  <a:schemeClr val="tx1"/>
+                </a:solidFill>
+                <a:effectLst/>
+                <a:latin typeface="+mn-lt"/>
+                <a:ea typeface="+mn-ea"/>
+                <a:cs typeface="+mn-cs"/>
+              </a:rPr>
+              <a:t>describes computation in terms of </a:t>
+            </a:r>
+            <a:r>
+              <a:rPr lang="en-US" sz="1200" b="0" i="0" u="none" strike="noStrike" kern="1200" dirty="0" smtClean="0">
+                <a:solidFill>
+                  <a:schemeClr val="tx1"/>
+                </a:solidFill>
+                <a:effectLst/>
+                <a:latin typeface="+mn-lt"/>
+                <a:ea typeface="+mn-ea"/>
+                <a:cs typeface="+mn-cs"/>
+                <a:hlinkClick r:id="rId3" tooltip="Statement (computer science)"/>
+              </a:rPr>
+              <a:t>statements</a:t>
+            </a:r>
+            <a:r>
+              <a:rPr lang="en-US" sz="1200" b="0" i="0" kern="1200" dirty="0" smtClean="0">
+                <a:solidFill>
+                  <a:schemeClr val="tx1"/>
+                </a:solidFill>
+                <a:effectLst/>
+                <a:latin typeface="+mn-lt"/>
+                <a:ea typeface="+mn-ea"/>
+                <a:cs typeface="+mn-cs"/>
+              </a:rPr>
+              <a:t> that change a program </a:t>
+            </a:r>
+            <a:r>
+              <a:rPr lang="en-US" sz="1200" b="0" i="0" u="none" strike="noStrike" kern="1200" dirty="0" smtClean="0">
+                <a:solidFill>
+                  <a:schemeClr val="tx1"/>
+                </a:solidFill>
+                <a:effectLst/>
+                <a:latin typeface="+mn-lt"/>
+                <a:ea typeface="+mn-ea"/>
+                <a:cs typeface="+mn-cs"/>
+                <a:hlinkClick r:id="rId4" tooltip="State (computer science)"/>
+              </a:rPr>
+              <a:t>state</a:t>
+            </a:r>
+            <a:endParaRPr lang="en-US" sz="1200" b="0" i="0" u="none" strike="noStrike" kern="1200" dirty="0" smtClean="0">
+              <a:solidFill>
+                <a:schemeClr val="tx1"/>
+              </a:solidFill>
+              <a:effectLst/>
+              <a:latin typeface="+mn-lt"/>
+              <a:ea typeface="+mn-ea"/>
+              <a:cs typeface="+mn-cs"/>
+            </a:endParaRPr>
+          </a:p>
+          <a:p>
+            <a:r>
+              <a:rPr lang="en-US" sz="1200" b="0" i="0" u="none" strike="noStrike" kern="1200" baseline="0" dirty="0" smtClean="0">
+                <a:solidFill>
+                  <a:schemeClr val="tx1"/>
+                </a:solidFill>
+                <a:effectLst/>
+                <a:latin typeface="+mn-lt"/>
+                <a:ea typeface="+mn-ea"/>
+                <a:cs typeface="+mn-cs"/>
+              </a:rPr>
+              <a:t>Declarative or functional: describes desired result.</a:t>
+            </a:r>
+            <a:endParaRPr lang="da-DK" baseline="0" dirty="0" smtClean="0"/>
+          </a:p>
+          <a:p>
             <a:endParaRPr lang="da-DK" dirty="0"/>
           </a:p>
         </p:txBody>
@@ -2133,7 +2286,7 @@
     </p:spTree>
     <p:extLst>
       <p:ext uri="{BB962C8B-B14F-4D97-AF65-F5344CB8AC3E}">
-        <p14:creationId xmlns:p14="http://schemas.microsoft.com/office/powerpoint/2010/main" val="3150999082"/>
+        <p14:creationId xmlns:p14="http://schemas.microsoft.com/office/powerpoint/2010/main" val="2316618346"/>
       </p:ext>
     </p:extLst>
   </p:cSld>
@@ -2189,8 +2342,105 @@
           <a:p>
             <a:r>
               <a:rPr lang="da-DK" dirty="0" smtClean="0"/>
-              <a:t>types.js</a:t>
-            </a:r>
+              <a:t>Types:</a:t>
+            </a:r>
+            <a:r>
+              <a:rPr lang="da-DK" baseline="0" dirty="0" smtClean="0"/>
+              <a:t> Javascript has types contrary to what some people are saying. Coercion and dynamic typing might make it seem like there are no types.</a:t>
+            </a:r>
+            <a:endParaRPr lang="da-DK" dirty="0" smtClean="0"/>
+          </a:p>
+          <a:p>
+            <a:r>
+              <a:rPr lang="da-DK" dirty="0" smtClean="0"/>
+              <a:t>Imperative </a:t>
+            </a:r>
+            <a:r>
+              <a:rPr lang="da-DK" dirty="0" smtClean="0"/>
+              <a:t>and structured: if, while,</a:t>
+            </a:r>
+            <a:r>
+              <a:rPr lang="da-DK" baseline="0" dirty="0" smtClean="0"/>
+              <a:t> switch, for</a:t>
+            </a:r>
+          </a:p>
+          <a:p>
+            <a:r>
+              <a:rPr lang="da-DK" baseline="0" dirty="0" smtClean="0"/>
+              <a:t>Dynamic: x </a:t>
+            </a:r>
+            <a:r>
+              <a:rPr lang="da-DK" baseline="0" dirty="0" err="1" smtClean="0"/>
+              <a:t>can</a:t>
+            </a:r>
+            <a:r>
+              <a:rPr lang="da-DK" baseline="0" dirty="0" smtClean="0"/>
+              <a:t> </a:t>
+            </a:r>
+            <a:r>
+              <a:rPr lang="da-DK" baseline="0" dirty="0" err="1" smtClean="0"/>
+              <a:t>be</a:t>
+            </a:r>
+            <a:r>
+              <a:rPr lang="da-DK" baseline="0" dirty="0" smtClean="0"/>
+              <a:t> a </a:t>
+            </a:r>
+            <a:r>
+              <a:rPr lang="da-DK" baseline="0" dirty="0" err="1" smtClean="0"/>
+              <a:t>number</a:t>
+            </a:r>
+            <a:r>
+              <a:rPr lang="da-DK" baseline="0" dirty="0" smtClean="0"/>
+              <a:t> and </a:t>
+            </a:r>
+            <a:r>
+              <a:rPr lang="da-DK" baseline="0" dirty="0" err="1" smtClean="0"/>
+              <a:t>later</a:t>
+            </a:r>
+            <a:r>
+              <a:rPr lang="da-DK" baseline="0" dirty="0" smtClean="0"/>
+              <a:t> a </a:t>
+            </a:r>
+            <a:r>
+              <a:rPr lang="da-DK" baseline="0" dirty="0" err="1" smtClean="0"/>
+              <a:t>string</a:t>
+            </a:r>
+            <a:r>
+              <a:rPr lang="da-DK" baseline="0" dirty="0" smtClean="0"/>
+              <a:t>, </a:t>
+            </a:r>
+            <a:r>
+              <a:rPr lang="da-DK" baseline="0" dirty="0" err="1" smtClean="0"/>
+              <a:t>object</a:t>
+            </a:r>
+            <a:r>
+              <a:rPr lang="da-DK" baseline="0" dirty="0" smtClean="0"/>
+              <a:t>, </a:t>
+            </a:r>
+            <a:r>
+              <a:rPr lang="da-DK" baseline="0" dirty="0" err="1" smtClean="0"/>
+              <a:t>function</a:t>
+            </a:r>
+            <a:r>
+              <a:rPr lang="da-DK" baseline="0" dirty="0" smtClean="0"/>
+              <a:t>, etc.</a:t>
+            </a:r>
+          </a:p>
+          <a:p>
+            <a:r>
+              <a:rPr lang="da-DK" baseline="0" dirty="0" smtClean="0"/>
+              <a:t>Functional: Functions are first class, and can be passed around, bound, curried, etc</a:t>
+            </a:r>
+            <a:r>
+              <a:rPr lang="da-DK" baseline="0" dirty="0" smtClean="0"/>
+              <a:t>. -&gt; Declarative programming</a:t>
+            </a:r>
+            <a:endParaRPr lang="da-DK" baseline="0" dirty="0" smtClean="0"/>
+          </a:p>
+          <a:p>
+            <a:endParaRPr lang="da-DK" baseline="0" dirty="0" smtClean="0"/>
+          </a:p>
+          <a:p>
             <a:endParaRPr lang="da-DK" dirty="0"/>
           </a:p>
         </p:txBody>
@@ -2198,7 +2448,7 @@
     </p:spTree>
     <p:extLst>
       <p:ext uri="{BB962C8B-B14F-4D97-AF65-F5344CB8AC3E}">
-        <p14:creationId xmlns:p14="http://schemas.microsoft.com/office/powerpoint/2010/main" val="260580981"/>
+        <p14:creationId xmlns:p14="http://schemas.microsoft.com/office/powerpoint/2010/main" val="2157140608"/>
       </p:ext>
     </p:extLst>
   </p:cSld>
@@ -2254,80 +2504,38 @@
           <a:p>
             <a:r>
               <a:rPr lang="da-DK" dirty="0" smtClean="0"/>
-              <a:t>- Object </a:t>
-            </a:r>
-            <a:r>
-              <a:rPr lang="da-DK" dirty="0" err="1" smtClean="0"/>
-              <a:t>based</a:t>
-            </a:r>
+              <a:t>Show imperative1.js</a:t>
+            </a:r>
+          </a:p>
+          <a:p>
+            <a:endParaRPr lang="da-DK" dirty="0" smtClean="0"/>
+          </a:p>
+          <a:p>
             <a:r>
               <a:rPr lang="da-DK" dirty="0" smtClean="0"/>
-              <a:t>:</a:t>
+              <a:t>Show node repl.</a:t>
             </a:r>
             <a:r>
               <a:rPr lang="da-DK" baseline="0" dirty="0" smtClean="0"/>
-              <a:t> </a:t>
-            </a:r>
-            <a:r>
-              <a:rPr lang="da-DK" baseline="0" dirty="0" err="1" smtClean="0"/>
-              <a:t>functions</a:t>
+              <a:t> Declare string, length, array, object</a:t>
+            </a:r>
+            <a:endParaRPr lang="da-DK" dirty="0" smtClean="0"/>
+          </a:p>
+          <a:p>
+            <a:r>
+              <a:rPr lang="da-DK" dirty="0" smtClean="0"/>
+              <a:t>Get people to play around</a:t>
             </a:r>
             <a:r>
               <a:rPr lang="da-DK" baseline="0" dirty="0" smtClean="0"/>
-              <a:t> </a:t>
-            </a:r>
-            <a:r>
-              <a:rPr lang="da-DK" baseline="0" dirty="0" err="1" smtClean="0"/>
-              <a:t>are</a:t>
-            </a:r>
-            <a:r>
-              <a:rPr lang="da-DK" baseline="0" dirty="0" smtClean="0"/>
-              <a:t> </a:t>
-            </a:r>
-            <a:r>
-              <a:rPr lang="da-DK" baseline="0" dirty="0" err="1" smtClean="0"/>
-              <a:t>objects</a:t>
-            </a:r>
-            <a:r>
-              <a:rPr lang="da-DK" baseline="0" dirty="0" smtClean="0"/>
-              <a:t>, </a:t>
-            </a:r>
-            <a:r>
-              <a:rPr lang="da-DK" baseline="0" dirty="0" err="1" smtClean="0"/>
-              <a:t>than</a:t>
-            </a:r>
-            <a:r>
-              <a:rPr lang="da-DK" baseline="0" dirty="0" smtClean="0"/>
-              <a:t> </a:t>
-            </a:r>
-            <a:r>
-              <a:rPr lang="da-DK" baseline="0" dirty="0" err="1" smtClean="0"/>
-              <a:t>can</a:t>
-            </a:r>
-            <a:r>
-              <a:rPr lang="da-DK" baseline="0" dirty="0" smtClean="0"/>
-              <a:t> </a:t>
-            </a:r>
-            <a:r>
-              <a:rPr lang="da-DK" baseline="0" dirty="0" err="1" smtClean="0"/>
-              <a:t>be</a:t>
-            </a:r>
-            <a:r>
-              <a:rPr lang="da-DK" baseline="0" dirty="0" smtClean="0"/>
-              <a:t> </a:t>
-            </a:r>
-            <a:r>
-              <a:rPr lang="da-DK" baseline="0" dirty="0" err="1" smtClean="0"/>
-              <a:t>passed</a:t>
-            </a:r>
-            <a:r>
-              <a:rPr lang="da-DK" baseline="0" dirty="0" smtClean="0"/>
-              <a:t> </a:t>
-            </a:r>
-            <a:r>
-              <a:rPr lang="da-DK" baseline="0" dirty="0" err="1" smtClean="0"/>
-              <a:t>around</a:t>
-            </a:r>
+              <a:t> with a node repl for a few minutes</a:t>
+            </a:r>
+            <a:endParaRPr lang="da-DK" dirty="0" smtClean="0"/>
+          </a:p>
+          <a:p>
+            <a:endParaRPr lang="da-DK" dirty="0" smtClean="0"/>
+          </a:p>
+          <a:p>
             <a:endParaRPr lang="da-DK" dirty="0"/>
           </a:p>
         </p:txBody>
@@ -2335,7 +2543,7 @@
     </p:spTree>
     <p:extLst>
       <p:ext uri="{BB962C8B-B14F-4D97-AF65-F5344CB8AC3E}">
-        <p14:creationId xmlns:p14="http://schemas.microsoft.com/office/powerpoint/2010/main" val="1112185795"/>
+        <p14:creationId xmlns:p14="http://schemas.microsoft.com/office/powerpoint/2010/main" val="3150999082"/>
       </p:ext>
     </p:extLst>
   </p:cSld>
@@ -2390,67 +2598,39 @@
           <a:lstStyle/>
           <a:p>
             <a:r>
-              <a:rPr lang="da-DK" dirty="0" err="1" smtClean="0"/>
-              <a:t>Function</a:t>
-            </a:r>
-            <a:r>
               <a:rPr lang="da-DK" dirty="0" smtClean="0"/>
-              <a:t> </a:t>
-            </a:r>
-            <a:r>
-              <a:rPr lang="da-DK" dirty="0" err="1" smtClean="0"/>
-              <a:t>composition</a:t>
-            </a:r>
+              <a:t>types.js</a:t>
+            </a:r>
+          </a:p>
+          <a:p>
+            <a:endParaRPr lang="da-DK" dirty="0" smtClean="0"/>
+          </a:p>
+          <a:p>
             <a:r>
               <a:rPr lang="da-DK" dirty="0" smtClean="0"/>
-              <a:t>,</a:t>
+              <a:t>Objects are property bags pretty</a:t>
             </a:r>
             <a:r>
               <a:rPr lang="da-DK" baseline="0" dirty="0" smtClean="0"/>
-              <a:t> </a:t>
-            </a:r>
-            <a:r>
-              <a:rPr lang="da-DK" baseline="0" dirty="0" err="1" smtClean="0"/>
-              <a:t>chaining</a:t>
-            </a:r>
+              <a:t> much. Good for hashmaps</a:t>
+            </a:r>
+          </a:p>
+          <a:p>
+            <a:endParaRPr lang="da-DK" baseline="0" dirty="0" smtClean="0"/>
+          </a:p>
+          <a:p>
             <a:r>
               <a:rPr lang="da-DK" baseline="0" dirty="0" smtClean="0"/>
-              <a:t>, </a:t>
-            </a:r>
-            <a:r>
-              <a:rPr lang="da-DK" baseline="0" dirty="0" err="1" smtClean="0"/>
-              <a:t>currying</a:t>
-            </a:r>
+              <a:t>Functions are callable objects</a:t>
+            </a:r>
+          </a:p>
+          <a:p>
+            <a:endParaRPr lang="da-DK" baseline="0" dirty="0" smtClean="0"/>
+          </a:p>
+          <a:p>
             <a:r>
               <a:rPr lang="da-DK" baseline="0" dirty="0" smtClean="0"/>
-              <a:t>, etc.</a:t>
-            </a:r>
-            <a:endParaRPr lang="da-DK" dirty="0" smtClean="0"/>
-          </a:p>
-          <a:p>
-            <a:r>
-              <a:rPr lang="da-DK" dirty="0" smtClean="0"/>
-              <a:t>More on </a:t>
-            </a:r>
-            <a:r>
-              <a:rPr lang="da-DK" dirty="0" err="1" smtClean="0"/>
-              <a:t>that</a:t>
-            </a:r>
-            <a:r>
-              <a:rPr lang="da-DK" dirty="0" smtClean="0"/>
-              <a:t> in </a:t>
-            </a:r>
-            <a:r>
-              <a:rPr lang="da-DK" dirty="0" err="1" smtClean="0"/>
-              <a:t>later</a:t>
-            </a:r>
-            <a:r>
-              <a:rPr lang="da-DK" dirty="0" smtClean="0"/>
-              <a:t> </a:t>
-            </a:r>
-            <a:r>
-              <a:rPr lang="da-DK" dirty="0" err="1" smtClean="0"/>
-              <a:t>exercises</a:t>
+              <a:t>Arrays are also objects, but they have a length property, and should only be used as arrays to avoid confusion</a:t>
             </a:r>
             <a:endParaRPr lang="da-DK" dirty="0"/>
           </a:p>
@@ -2459,7 +2639,7 @@
     </p:spTree>
     <p:extLst>
       <p:ext uri="{BB962C8B-B14F-4D97-AF65-F5344CB8AC3E}">
-        <p14:creationId xmlns:p14="http://schemas.microsoft.com/office/powerpoint/2010/main" val="1527587767"/>
+        <p14:creationId xmlns:p14="http://schemas.microsoft.com/office/powerpoint/2010/main" val="260580981"/>
       </p:ext>
     </p:extLst>
   </p:cSld>
@@ -2515,13 +2695,79 @@
           <a:p>
             <a:r>
               <a:rPr lang="da-DK" dirty="0" smtClean="0"/>
-              <a:t>Count + i?</a:t>
-            </a:r>
-          </a:p>
-          <a:p>
+              <a:t>- Object </a:t>
+            </a:r>
+            <a:r>
+              <a:rPr lang="da-DK" dirty="0" err="1" smtClean="0"/>
+              <a:t>based</a:t>
+            </a:r>
             <a:r>
               <a:rPr lang="da-DK" dirty="0" smtClean="0"/>
-              <a:t>Console.log(i);</a:t>
+              <a:t>:</a:t>
+            </a:r>
+            <a:r>
+              <a:rPr lang="da-DK" baseline="0" dirty="0" smtClean="0"/>
+              <a:t> </a:t>
+            </a:r>
+            <a:r>
+              <a:rPr lang="da-DK" baseline="0" dirty="0" err="1" smtClean="0"/>
+              <a:t>functions</a:t>
+            </a:r>
+            <a:r>
+              <a:rPr lang="da-DK" baseline="0" dirty="0" smtClean="0"/>
+              <a:t> </a:t>
+            </a:r>
+            <a:r>
+              <a:rPr lang="da-DK" baseline="0" dirty="0" err="1" smtClean="0"/>
+              <a:t>are</a:t>
+            </a:r>
+            <a:r>
+              <a:rPr lang="da-DK" baseline="0" dirty="0" smtClean="0"/>
+              <a:t> </a:t>
+            </a:r>
+            <a:r>
+              <a:rPr lang="da-DK" baseline="0" dirty="0" err="1" smtClean="0"/>
+              <a:t>objects</a:t>
+            </a:r>
+            <a:r>
+              <a:rPr lang="da-DK" baseline="0" dirty="0" smtClean="0"/>
+              <a:t>, </a:t>
+            </a:r>
+            <a:r>
+              <a:rPr lang="da-DK" baseline="0" dirty="0" err="1" smtClean="0"/>
+              <a:t>than</a:t>
+            </a:r>
+            <a:r>
+              <a:rPr lang="da-DK" baseline="0" dirty="0" smtClean="0"/>
+              <a:t> </a:t>
+            </a:r>
+            <a:r>
+              <a:rPr lang="da-DK" baseline="0" dirty="0" err="1" smtClean="0"/>
+              <a:t>can</a:t>
+            </a:r>
+            <a:r>
+              <a:rPr lang="da-DK" baseline="0" dirty="0" smtClean="0"/>
+              <a:t> </a:t>
+            </a:r>
+            <a:r>
+              <a:rPr lang="da-DK" baseline="0" dirty="0" err="1" smtClean="0"/>
+              <a:t>be</a:t>
+            </a:r>
+            <a:r>
+              <a:rPr lang="da-DK" baseline="0" dirty="0" smtClean="0"/>
+              <a:t> </a:t>
+            </a:r>
+            <a:r>
+              <a:rPr lang="da-DK" baseline="0" dirty="0" err="1" smtClean="0"/>
+              <a:t>passed</a:t>
+            </a:r>
+            <a:r>
+              <a:rPr lang="da-DK" baseline="0" dirty="0" smtClean="0"/>
+              <a:t> </a:t>
+            </a:r>
+            <a:r>
+              <a:rPr lang="da-DK" baseline="0" dirty="0" err="1" smtClean="0"/>
+              <a:t>around</a:t>
             </a:r>
             <a:endParaRPr lang="da-DK" dirty="0"/>
           </a:p>
@@ -2530,7 +2776,7 @@
     </p:spTree>
     <p:extLst>
       <p:ext uri="{BB962C8B-B14F-4D97-AF65-F5344CB8AC3E}">
-        <p14:creationId xmlns:p14="http://schemas.microsoft.com/office/powerpoint/2010/main" val="4248618219"/>
+        <p14:creationId xmlns:p14="http://schemas.microsoft.com/office/powerpoint/2010/main" val="1112185795"/>
       </p:ext>
     </p:extLst>
   </p:cSld>
@@ -2585,12 +2831,8 @@
           <a:lstStyle/>
           <a:p>
             <a:r>
-              <a:rPr lang="da-DK" dirty="0" smtClean="0"/>
-              <a:t>Lex1 – is </a:t>
-            </a:r>
-            <a:r>
               <a:rPr lang="da-DK" dirty="0" err="1" smtClean="0"/>
-              <a:t>this</a:t>
+              <a:t>Function</a:t>
             </a:r>
             <a:r>
               <a:rPr lang="da-DK" dirty="0" smtClean="0"/>
@@ -2598,21 +2840,11 @@
             </a:r>
             <a:r>
               <a:rPr lang="da-DK" dirty="0" err="1" smtClean="0"/>
-              <a:t>closure</a:t>
+              <a:t>composition</a:t>
             </a:r>
             <a:r>
               <a:rPr lang="da-DK" dirty="0" smtClean="0"/>
-              <a:t>?</a:t>
-            </a:r>
-          </a:p>
-          <a:p>
-            <a:r>
-              <a:rPr lang="da-DK" dirty="0" smtClean="0"/>
-              <a:t>Closure1 - &gt; </a:t>
-            </a:r>
-            <a:r>
-              <a:rPr lang="da-DK" dirty="0" err="1" smtClean="0"/>
-              <a:t>observed</a:t>
+              <a:t>,</a:t>
             </a:r>
             <a:r>
               <a:rPr lang="da-DK" baseline="0" dirty="0" smtClean="0"/>
@@ -2620,14 +2852,47 @@
             </a:r>
             <a:r>
               <a:rPr lang="da-DK" baseline="0" dirty="0" err="1" smtClean="0"/>
-              <a:t>closure</a:t>
-            </a:r>
-            <a:endParaRPr lang="da-DK" baseline="0" dirty="0" smtClean="0"/>
-          </a:p>
-          <a:p>
+              <a:t>chaining</a:t>
+            </a:r>
+            <a:r>
+              <a:rPr lang="da-DK" baseline="0" dirty="0" smtClean="0"/>
+              <a:t>, </a:t>
+            </a:r>
+            <a:r>
+              <a:rPr lang="da-DK" baseline="0" dirty="0" err="1" smtClean="0"/>
+              <a:t>currying</a:t>
+            </a:r>
+            <a:r>
+              <a:rPr lang="da-DK" baseline="0" dirty="0" smtClean="0"/>
+              <a:t>, etc.</a:t>
+            </a:r>
             <a:endParaRPr lang="da-DK" dirty="0" smtClean="0"/>
           </a:p>
           <a:p>
+            <a:r>
+              <a:rPr lang="da-DK" dirty="0" smtClean="0"/>
+              <a:t>More on </a:t>
+            </a:r>
+            <a:r>
+              <a:rPr lang="da-DK" dirty="0" err="1" smtClean="0"/>
+              <a:t>that</a:t>
+            </a:r>
+            <a:r>
+              <a:rPr lang="da-DK" dirty="0" smtClean="0"/>
+              <a:t> in </a:t>
+            </a:r>
+            <a:r>
+              <a:rPr lang="da-DK" dirty="0" err="1" smtClean="0"/>
+              <a:t>later</a:t>
+            </a:r>
+            <a:r>
+              <a:rPr lang="da-DK" dirty="0" smtClean="0"/>
+              <a:t> </a:t>
+            </a:r>
+            <a:r>
+              <a:rPr lang="da-DK" dirty="0" err="1" smtClean="0"/>
+              <a:t>exercises</a:t>
+            </a:r>
             <a:endParaRPr lang="da-DK" dirty="0"/>
           </a:p>
         </p:txBody>
@@ -2635,7 +2900,7 @@
     </p:spTree>
     <p:extLst>
       <p:ext uri="{BB962C8B-B14F-4D97-AF65-F5344CB8AC3E}">
-        <p14:creationId xmlns:p14="http://schemas.microsoft.com/office/powerpoint/2010/main" val="495123908"/>
+        <p14:creationId xmlns:p14="http://schemas.microsoft.com/office/powerpoint/2010/main" val="1527587767"/>
       </p:ext>
     </p:extLst>
   </p:cSld>
@@ -2690,34 +2955,14 @@
           <a:lstStyle/>
           <a:p>
             <a:r>
-              <a:rPr lang="da-DK" dirty="0" err="1" smtClean="0"/>
-              <a:t>IIFEs</a:t>
-            </a:r>
-            <a:r>
               <a:rPr lang="da-DK" dirty="0" smtClean="0"/>
-              <a:t>, </a:t>
-            </a:r>
-            <a:r>
-              <a:rPr lang="da-DK" dirty="0" err="1" smtClean="0"/>
-              <a:t>see</a:t>
-            </a:r>
+              <a:t>Count + i?</a:t>
+            </a:r>
+          </a:p>
+          <a:p>
             <a:r>
               <a:rPr lang="da-DK" dirty="0" smtClean="0"/>
-              <a:t> </a:t>
-            </a:r>
-            <a:r>
-              <a:rPr lang="da-DK" dirty="0" err="1" smtClean="0"/>
-              <a:t>closure</a:t>
-            </a:r>
-            <a:r>
-              <a:rPr lang="da-DK" baseline="0" dirty="0" smtClean="0"/>
-              <a:t> 3</a:t>
-            </a:r>
-          </a:p>
-          <a:p>
-            <a:r>
-              <a:rPr lang="da-DK" baseline="0" dirty="0" err="1" smtClean="0"/>
-              <a:t>Modules</a:t>
+              <a:t>Console.log(i);</a:t>
             </a:r>
             <a:endParaRPr lang="da-DK" dirty="0"/>
           </a:p>
@@ -2726,7 +2971,7 @@
     </p:spTree>
     <p:extLst>
       <p:ext uri="{BB962C8B-B14F-4D97-AF65-F5344CB8AC3E}">
-        <p14:creationId xmlns:p14="http://schemas.microsoft.com/office/powerpoint/2010/main" val="3470971837"/>
+        <p14:creationId xmlns:p14="http://schemas.microsoft.com/office/powerpoint/2010/main" val="4248618219"/>
       </p:ext>
     </p:extLst>
   </p:cSld>
@@ -14941,7 +15186,7 @@
             </a:r>
             <a:r>
               <a:rPr lang="en-US" dirty="0">
-                <a:hlinkClick r:id="rId2" tooltip="Prototype-based programming"/>
+                <a:hlinkClick r:id="rId3" tooltip="Prototype-based programming"/>
               </a:rPr>
               <a:t>prototype-based</a:t>
             </a:r>
@@ -14951,7 +15196,7 @@
             </a:r>
             <a:r>
               <a:rPr lang="en-US" dirty="0">
-                <a:hlinkClick r:id="rId3" tooltip="Scripting language"/>
+                <a:hlinkClick r:id="rId4" tooltip="Scripting language"/>
               </a:rPr>
               <a:t>scripting language</a:t>
             </a:r>
@@ -14961,7 +15206,7 @@
             </a:r>
             <a:r>
               <a:rPr lang="en-US" dirty="0">
-                <a:hlinkClick r:id="rId4" tooltip="Dynamic language"/>
+                <a:hlinkClick r:id="rId5" tooltip="Dynamic language"/>
               </a:rPr>
               <a:t>dynamic</a:t>
             </a:r>
@@ -14971,7 +15216,7 @@
             </a:r>
             <a:r>
               <a:rPr lang="en-US" dirty="0">
-                <a:hlinkClick r:id="rId5" tooltip="First-class functions"/>
+                <a:hlinkClick r:id="rId6" tooltip="First-class functions"/>
               </a:rPr>
               <a:t>first-class functions</a:t>
             </a:r>
@@ -14981,7 +15226,7 @@
             </a:r>
             <a:r>
               <a:rPr lang="en-US" dirty="0">
-                <a:hlinkClick r:id="rId6" tooltip="Multi-paradigm"/>
+                <a:hlinkClick r:id="rId7" tooltip="Multi-paradigm"/>
               </a:rPr>
               <a:t>multi-paradigm</a:t>
             </a:r>
@@ -14991,7 +15236,7 @@
             </a:r>
             <a:r>
               <a:rPr lang="en-US" dirty="0">
-                <a:hlinkClick r:id="rId7" tooltip="Object-oriented programming"/>
+                <a:hlinkClick r:id="rId8" tooltip="Object-oriented programming"/>
               </a:rPr>
               <a:t>object-oriented</a:t>
             </a:r>
@@ -15001,7 +15246,7 @@
             </a:r>
             <a:r>
               <a:rPr lang="en-US" baseline="30000" dirty="0">
-                <a:hlinkClick r:id="rId8"/>
+                <a:hlinkClick r:id="rId9"/>
               </a:rPr>
               <a:t>[6]</a:t>
             </a:r>
@@ -15011,7 +15256,7 @@
             </a:r>
             <a:r>
               <a:rPr lang="en-US" dirty="0">
-                <a:hlinkClick r:id="rId9" tooltip="Imperative programming"/>
+                <a:hlinkClick r:id="rId10" tooltip="Imperative programming"/>
               </a:rPr>
               <a:t>imperative</a:t>
             </a:r>
@@ -15021,13 +15266,13 @@
             </a:r>
             <a:r>
               <a:rPr lang="en-US" dirty="0">
-                <a:hlinkClick r:id="rId10" tooltip="Functional programming"/>
+                <a:hlinkClick r:id="rId11" tooltip="Functional programming"/>
               </a:rPr>
               <a:t>functional</a:t>
             </a:r>
             <a:r>
               <a:rPr lang="en-US" baseline="30000" dirty="0">
-                <a:hlinkClick r:id="rId8"/>
+                <a:hlinkClick r:id="rId9"/>
               </a:rPr>
               <a:t>[1][7]</a:t>
             </a:r>
@@ -15558,8 +15803,19 @@
           <a:p>
             <a:pPr lvl="1"/>
             <a:r>
+              <a:rPr lang="en-US" dirty="0"/>
+              <a:t>a</a:t>
+            </a:r>
+            <a:r>
               <a:rPr lang="en-US" dirty="0" smtClean="0"/>
-              <a:t>array</a:t>
+              <a:t>rray</a:t>
+            </a:r>
+          </a:p>
+          <a:p>
+            <a:pPr lvl="1"/>
+            <a:r>
+              <a:rPr lang="en-US" dirty="0" smtClean="0"/>
+              <a:t>…</a:t>
             </a:r>
             <a:endParaRPr lang="en-US" dirty="0"/>
           </a:p>
@@ -15609,7 +15865,9 @@
           <a:lstStyle/>
           <a:p>
             <a:r>
-              <a:rPr lang="da-DK" dirty="0" smtClean="0"/>
+              <a:rPr lang="da-DK" dirty="0" smtClean="0">
+                <a:hlinkClick r:id="rId4"/>
+              </a:rPr>
               <a:t>Types</a:t>
             </a:r>
             <a:endParaRPr lang="da-DK" dirty="0"/>

</xml_diff>

<commit_message>
added a few notes to pptx
</commit_message>
<xml_diff>
--- a/JavaScript Fundamentals.pptx
+++ b/JavaScript Fundamentals.pptx
@@ -8,10 +8,10 @@
     <p:sldMasterId id="2147483911" r:id="rId4"/>
   </p:sldMasterIdLst>
   <p:notesMasterIdLst>
-    <p:notesMasterId r:id="rId28"/>
+    <p:notesMasterId r:id="rId27"/>
   </p:notesMasterIdLst>
   <p:handoutMasterIdLst>
-    <p:handoutMasterId r:id="rId29"/>
+    <p:handoutMasterId r:id="rId28"/>
   </p:handoutMasterIdLst>
   <p:sldIdLst>
     <p:sldId id="256" r:id="rId5"/>
@@ -30,13 +30,12 @@
     <p:sldId id="271" r:id="rId18"/>
     <p:sldId id="269" r:id="rId19"/>
     <p:sldId id="270" r:id="rId20"/>
-    <p:sldId id="278" r:id="rId21"/>
-    <p:sldId id="260" r:id="rId22"/>
-    <p:sldId id="268" r:id="rId23"/>
-    <p:sldId id="273" r:id="rId24"/>
-    <p:sldId id="274" r:id="rId25"/>
-    <p:sldId id="275" r:id="rId26"/>
-    <p:sldId id="276" r:id="rId27"/>
+    <p:sldId id="260" r:id="rId21"/>
+    <p:sldId id="268" r:id="rId22"/>
+    <p:sldId id="273" r:id="rId23"/>
+    <p:sldId id="274" r:id="rId24"/>
+    <p:sldId id="275" r:id="rId25"/>
+    <p:sldId id="276" r:id="rId26"/>
   </p:sldIdLst>
   <p:sldSz cx="9144000" cy="6858000" type="screen4x3"/>
   <p:notesSz cx="6858000" cy="9144000"/>
@@ -221,7 +220,7 @@
             <a:fld id="{0054C2FE-BA7B-41D2-B892-E5AC5FCF854B}" type="datetimeFigureOut">
               <a:rPr lang="da-DK" smtClean="0"/>
               <a:pPr/>
-              <a:t>30-10-2014</a:t>
+              <a:t>31-10-2014</a:t>
             </a:fld>
             <a:endParaRPr lang="da-DK" dirty="0"/>
           </a:p>
@@ -389,7 +388,7 @@
             <a:fld id="{454483E1-46E1-47A5-84FB-98D3EDCCF46E}" type="datetimeFigureOut">
               <a:rPr lang="da-DK" smtClean="0"/>
               <a:pPr/>
-              <a:t>30-10-2014</a:t>
+              <a:t>31-10-2014</a:t>
             </a:fld>
             <a:endParaRPr lang="da-DK" dirty="0"/>
           </a:p>
@@ -1363,47 +1362,6 @@
           <a:bodyPr/>
           <a:lstStyle/>
           <a:p>
-            <a:r>
-              <a:rPr lang="da-DK" dirty="0" smtClean="0"/>
-              <a:t>I will not go too</a:t>
-            </a:r>
-            <a:r>
-              <a:rPr lang="da-DK" baseline="0" dirty="0" smtClean="0"/>
-              <a:t> much into detail with the dom, since hopefully you will not be doing too much dom manipulation when you are using AngularJS</a:t>
-            </a:r>
-          </a:p>
-          <a:p>
-            <a:endParaRPr lang="da-DK" baseline="0" dirty="0" smtClean="0"/>
-          </a:p>
-          <a:p>
-            <a:r>
-              <a:rPr lang="da-DK" baseline="0" dirty="0" smtClean="0"/>
-              <a:t>Simple dom manipulation in console</a:t>
-            </a:r>
-          </a:p>
-          <a:p>
-            <a:r>
-              <a:rPr lang="da-DK" baseline="0" dirty="0" smtClean="0"/>
-              <a:t>$(‘d1’).append(‘&lt;p&gt;YO&lt;/p&gt;’)</a:t>
-            </a:r>
-          </a:p>
-          <a:p>
-            <a:endParaRPr lang="da-DK" baseline="0" dirty="0" smtClean="0"/>
-          </a:p>
-          <a:p>
-            <a:r>
-              <a:rPr lang="da-DK" baseline="0" dirty="0" smtClean="0"/>
-              <a:t>$(‘d1’).insertAfter($(‘div’))</a:t>
-            </a:r>
-          </a:p>
-          <a:p>
-            <a:endParaRPr lang="da-DK" baseline="0" dirty="0" smtClean="0"/>
-          </a:p>
-          <a:p>
-            <a:r>
-              <a:rPr lang="da-DK" baseline="0" smtClean="0"/>
-              <a:t>dom2.html build simple youtube search</a:t>
-            </a:r>
             <a:endParaRPr lang="da-DK" dirty="0"/>
           </a:p>
         </p:txBody>
@@ -1411,7 +1369,7 @@
     </p:spTree>
     <p:extLst>
       <p:ext uri="{BB962C8B-B14F-4D97-AF65-F5344CB8AC3E}">
-        <p14:creationId xmlns:p14="http://schemas.microsoft.com/office/powerpoint/2010/main" val="4069447524"/>
+        <p14:creationId xmlns:p14="http://schemas.microsoft.com/office/powerpoint/2010/main" val="1557260125"/>
       </p:ext>
     </p:extLst>
   </p:cSld>
@@ -1465,67 +1423,6 @@
           <a:bodyPr/>
           <a:lstStyle/>
           <a:p>
-            <a:endParaRPr lang="da-DK" dirty="0"/>
-          </a:p>
-        </p:txBody>
-      </p:sp>
-    </p:spTree>
-    <p:extLst>
-      <p:ext uri="{BB962C8B-B14F-4D97-AF65-F5344CB8AC3E}">
-        <p14:creationId xmlns:p14="http://schemas.microsoft.com/office/powerpoint/2010/main" val="1557260125"/>
-      </p:ext>
-    </p:extLst>
-  </p:cSld>
-  <p:clrMapOvr>
-    <a:masterClrMapping/>
-  </p:clrMapOvr>
-</p:notes>
-</file>
-
-<file path=ppt/notesSlides/notesSlide17.xml><?xml version="1.0" encoding="utf-8"?>
-<p:notes xmlns:a="http://schemas.openxmlformats.org/drawingml/2006/main" xmlns:r="http://schemas.openxmlformats.org/officeDocument/2006/relationships" xmlns:p="http://schemas.openxmlformats.org/presentationml/2006/main">
-  <p:cSld>
-    <p:spTree>
-      <p:nvGrpSpPr>
-        <p:cNvPr id="1" name=""/>
-        <p:cNvGrpSpPr/>
-        <p:nvPr/>
-      </p:nvGrpSpPr>
-      <p:grpSpPr>
-        <a:xfrm>
-          <a:off x="0" y="0"/>
-          <a:ext cx="0" cy="0"/>
-          <a:chOff x="0" y="0"/>
-          <a:chExt cx="0" cy="0"/>
-        </a:xfrm>
-      </p:grpSpPr>
-      <p:sp>
-        <p:nvSpPr>
-          <p:cNvPr id="2" name="Slide Image Placeholder 1"/>
-          <p:cNvSpPr>
-            <a:spLocks noGrp="1" noRot="1" noChangeAspect="1"/>
-          </p:cNvSpPr>
-          <p:nvPr>
-            <p:ph type="sldImg"/>
-          </p:nvPr>
-        </p:nvSpPr>
-        <p:spPr/>
-      </p:sp>
-      <p:sp>
-        <p:nvSpPr>
-          <p:cNvPr id="3" name="Notes Placeholder 2"/>
-          <p:cNvSpPr>
-            <a:spLocks noGrp="1"/>
-          </p:cNvSpPr>
-          <p:nvPr>
-            <p:ph type="body" idx="1"/>
-          </p:nvPr>
-        </p:nvSpPr>
-        <p:spPr/>
-        <p:txBody>
-          <a:bodyPr/>
-          <a:lstStyle/>
-          <a:p>
             <a:r>
               <a:rPr lang="da-DK" dirty="0" smtClean="0"/>
               <a:t>Show hoisting1,</a:t>
@@ -1664,7 +1561,7 @@
 </p:notes>
 </file>
 
-<file path=ppt/notesSlides/notesSlide18.xml><?xml version="1.0" encoding="utf-8"?>
+<file path=ppt/notesSlides/notesSlide17.xml><?xml version="1.0" encoding="utf-8"?>
 <p:notes xmlns:a="http://schemas.openxmlformats.org/drawingml/2006/main" xmlns:r="http://schemas.openxmlformats.org/officeDocument/2006/relationships" xmlns:p="http://schemas.openxmlformats.org/presentationml/2006/main">
   <p:cSld>
     <p:spTree>
@@ -2173,24 +2070,148 @@
           <a:p>
             <a:r>
               <a:rPr lang="da-DK" dirty="0" smtClean="0"/>
-              <a:t>Start med at spørge hvad deres erfaring er med JavaScript,</a:t>
+              <a:t>- Start </a:t>
+            </a:r>
+            <a:r>
+              <a:rPr lang="da-DK" dirty="0" smtClean="0"/>
+              <a:t>med at spørge hvad deres erfaring er med JavaScript,</a:t>
             </a:r>
             <a:r>
               <a:rPr lang="da-DK" baseline="0" dirty="0" smtClean="0"/>
-              <a:t> html, css etc.</a:t>
-            </a:r>
-          </a:p>
-          <a:p>
+              <a:t> html, css etc</a:t>
+            </a:r>
+            <a:r>
+              <a:rPr lang="da-DK" baseline="0" dirty="0" smtClean="0"/>
+              <a:t>., </a:t>
+            </a:r>
+            <a:r>
+              <a:rPr lang="da-DK" baseline="0" dirty="0" err="1" smtClean="0"/>
+              <a:t>polls</a:t>
+            </a:r>
             <a:endParaRPr lang="da-DK" baseline="0" dirty="0" smtClean="0"/>
           </a:p>
           <a:p>
+            <a:endParaRPr lang="da-DK" baseline="0" dirty="0" smtClean="0"/>
+          </a:p>
+          <a:p>
+            <a:r>
+              <a:rPr lang="da-DK" baseline="0" dirty="0" smtClean="0"/>
+              <a:t>- Lunch break, </a:t>
+            </a:r>
+            <a:r>
+              <a:rPr lang="da-DK" baseline="0" dirty="0" err="1" smtClean="0"/>
+              <a:t>when</a:t>
+            </a:r>
+            <a:r>
+              <a:rPr lang="da-DK" baseline="0" dirty="0" smtClean="0"/>
+              <a:t>?</a:t>
+            </a:r>
+          </a:p>
+          <a:p>
+            <a:endParaRPr lang="da-DK" baseline="0" dirty="0" smtClean="0"/>
+          </a:p>
+          <a:p>
+            <a:r>
+              <a:rPr lang="da-DK" baseline="0" dirty="0" smtClean="0"/>
+              <a:t>- </a:t>
+            </a:r>
+            <a:r>
+              <a:rPr lang="da-DK" baseline="0" dirty="0" err="1" smtClean="0"/>
+              <a:t>Please</a:t>
+            </a:r>
+            <a:r>
+              <a:rPr lang="da-DK" baseline="0" dirty="0" smtClean="0"/>
+              <a:t> </a:t>
+            </a:r>
+            <a:r>
+              <a:rPr lang="da-DK" baseline="0" dirty="0" err="1" smtClean="0"/>
+              <a:t>interrupt</a:t>
+            </a:r>
+            <a:r>
+              <a:rPr lang="da-DK" baseline="0" dirty="0" smtClean="0"/>
+              <a:t>, ask </a:t>
+            </a:r>
+            <a:r>
+              <a:rPr lang="da-DK" baseline="0" dirty="0" err="1" smtClean="0"/>
+              <a:t>questions</a:t>
+            </a:r>
+            <a:r>
+              <a:rPr lang="da-DK" baseline="0" dirty="0" smtClean="0"/>
+              <a:t>, let </a:t>
+            </a:r>
+            <a:r>
+              <a:rPr lang="da-DK" baseline="0" dirty="0" err="1" smtClean="0"/>
+              <a:t>me</a:t>
+            </a:r>
+            <a:r>
+              <a:rPr lang="da-DK" baseline="0" dirty="0" smtClean="0"/>
+              <a:t> </a:t>
+            </a:r>
+            <a:r>
+              <a:rPr lang="da-DK" baseline="0" dirty="0" err="1" smtClean="0"/>
+              <a:t>know</a:t>
+            </a:r>
+            <a:r>
+              <a:rPr lang="da-DK" baseline="0" dirty="0" smtClean="0"/>
+              <a:t> </a:t>
+            </a:r>
+            <a:r>
+              <a:rPr lang="da-DK" baseline="0" dirty="0" err="1" smtClean="0"/>
+              <a:t>if</a:t>
+            </a:r>
+            <a:r>
+              <a:rPr lang="da-DK" baseline="0" dirty="0" smtClean="0"/>
+              <a:t> </a:t>
+            </a:r>
+            <a:r>
+              <a:rPr lang="da-DK" baseline="0" dirty="0" err="1" smtClean="0"/>
+              <a:t>going</a:t>
+            </a:r>
+            <a:r>
+              <a:rPr lang="da-DK" baseline="0" dirty="0" smtClean="0"/>
+              <a:t> </a:t>
+            </a:r>
+            <a:r>
+              <a:rPr lang="da-DK" baseline="0" dirty="0" err="1" smtClean="0"/>
+              <a:t>too</a:t>
+            </a:r>
+            <a:r>
+              <a:rPr lang="da-DK" baseline="0" dirty="0" smtClean="0"/>
+              <a:t> fast, </a:t>
+            </a:r>
+            <a:r>
+              <a:rPr lang="da-DK" baseline="0" dirty="0" err="1" smtClean="0"/>
+              <a:t>too</a:t>
+            </a:r>
+            <a:r>
+              <a:rPr lang="da-DK" baseline="0" dirty="0" smtClean="0"/>
+              <a:t> </a:t>
+            </a:r>
+            <a:r>
+              <a:rPr lang="da-DK" baseline="0" dirty="0" err="1" smtClean="0"/>
+              <a:t>slow</a:t>
+            </a:r>
+            <a:r>
+              <a:rPr lang="da-DK" baseline="0" dirty="0" smtClean="0"/>
+              <a:t>, etc.</a:t>
+            </a:r>
+            <a:endParaRPr lang="da-DK" baseline="0" dirty="0" smtClean="0"/>
+          </a:p>
+          <a:p>
+            <a:endParaRPr lang="da-DK" baseline="0" dirty="0" smtClean="0"/>
+          </a:p>
+          <a:p>
             <a:r>
               <a:rPr lang="da-DK" dirty="0" smtClean="0"/>
-              <a:t>I</a:t>
+              <a:t>- I</a:t>
             </a:r>
             <a:r>
               <a:rPr lang="da-DK" baseline="0" dirty="0" smtClean="0"/>
-              <a:t> will dive a bit deeper than most ”fundamentals” courses might do. The reason for this, is that I think it is important to understand how javascript works in order to be efficient and avoid pitfalls.</a:t>
+              <a:t> </a:t>
+            </a:r>
+            <a:r>
+              <a:rPr lang="da-DK" baseline="0" dirty="0" smtClean="0"/>
+              <a:t>will dive a bit deeper than most ”fundamentals” courses might do. The reason for this, is that I think it is important to understand how javascript works in order to be efficient and avoid pitfalls.</a:t>
             </a:r>
           </a:p>
           <a:p>
@@ -13910,129 +13931,6 @@
           <a:lstStyle/>
           <a:p>
             <a:r>
-              <a:rPr lang="da-DK" dirty="0" smtClean="0"/>
-              <a:t>What is the </a:t>
-            </a:r>
-            <a:r>
-              <a:rPr lang="da-DK" dirty="0" smtClean="0">
-                <a:hlinkClick r:id="rId3"/>
-              </a:rPr>
-              <a:t>DOM?</a:t>
-            </a:r>
-            <a:endParaRPr lang="da-DK" dirty="0" smtClean="0"/>
-          </a:p>
-          <a:p>
-            <a:r>
-              <a:rPr lang="da-DK" dirty="0" smtClean="0"/>
-              <a:t>JavaScript can be used to read the DOM, manipulate it, add event listeners to elements and much more.</a:t>
-            </a:r>
-          </a:p>
-          <a:p>
-            <a:r>
-              <a:rPr lang="da-DK" dirty="0" smtClean="0"/>
-              <a:t>Exercise – build a simple YouTube search using jQuery to manipulate the DOM. Start with </a:t>
-            </a:r>
-            <a:r>
-              <a:rPr lang="da-DK" dirty="0" smtClean="0">
-                <a:hlinkClick r:id="rId4"/>
-              </a:rPr>
-              <a:t>this skeleton</a:t>
-            </a:r>
-            <a:endParaRPr lang="da-DK" dirty="0" smtClean="0"/>
-          </a:p>
-          <a:p>
-            <a:endParaRPr lang="da-DK" dirty="0"/>
-          </a:p>
-        </p:txBody>
-      </p:sp>
-      <p:sp>
-        <p:nvSpPr>
-          <p:cNvPr id="3" name="Text Placeholder 2"/>
-          <p:cNvSpPr>
-            <a:spLocks noGrp="1"/>
-          </p:cNvSpPr>
-          <p:nvPr>
-            <p:ph type="body" sz="quarter" idx="17"/>
-          </p:nvPr>
-        </p:nvSpPr>
-        <p:spPr/>
-        <p:txBody>
-          <a:bodyPr/>
-          <a:lstStyle/>
-          <a:p>
-            <a:endParaRPr lang="da-DK"/>
-          </a:p>
-        </p:txBody>
-      </p:sp>
-      <p:sp>
-        <p:nvSpPr>
-          <p:cNvPr id="4" name="Title 3"/>
-          <p:cNvSpPr>
-            <a:spLocks noGrp="1"/>
-          </p:cNvSpPr>
-          <p:nvPr>
-            <p:ph type="title"/>
-          </p:nvPr>
-        </p:nvSpPr>
-        <p:spPr/>
-        <p:txBody>
-          <a:bodyPr/>
-          <a:lstStyle/>
-          <a:p>
-            <a:r>
-              <a:rPr lang="da-DK" dirty="0" smtClean="0"/>
-              <a:t>JavaScript and the DOM</a:t>
-            </a:r>
-            <a:endParaRPr lang="da-DK" dirty="0"/>
-          </a:p>
-        </p:txBody>
-      </p:sp>
-    </p:spTree>
-    <p:extLst>
-      <p:ext uri="{BB962C8B-B14F-4D97-AF65-F5344CB8AC3E}">
-        <p14:creationId xmlns:p14="http://schemas.microsoft.com/office/powerpoint/2010/main" val="2344913770"/>
-      </p:ext>
-    </p:extLst>
-  </p:cSld>
-  <p:clrMapOvr>
-    <a:masterClrMapping/>
-  </p:clrMapOvr>
-</p:sld>
-</file>
-
-<file path=ppt/slides/slide18.xml><?xml version="1.0" encoding="utf-8"?>
-<p:sld xmlns:a="http://schemas.openxmlformats.org/drawingml/2006/main" xmlns:r="http://schemas.openxmlformats.org/officeDocument/2006/relationships" xmlns:p="http://schemas.openxmlformats.org/presentationml/2006/main">
-  <p:cSld>
-    <p:spTree>
-      <p:nvGrpSpPr>
-        <p:cNvPr id="1" name=""/>
-        <p:cNvGrpSpPr/>
-        <p:nvPr/>
-      </p:nvGrpSpPr>
-      <p:grpSpPr>
-        <a:xfrm>
-          <a:off x="0" y="0"/>
-          <a:ext cx="0" cy="0"/>
-          <a:chOff x="0" y="0"/>
-          <a:chExt cx="0" cy="0"/>
-        </a:xfrm>
-      </p:grpSpPr>
-      <p:sp>
-        <p:nvSpPr>
-          <p:cNvPr id="2" name="Content Placeholder 1"/>
-          <p:cNvSpPr>
-            <a:spLocks noGrp="1"/>
-          </p:cNvSpPr>
-          <p:nvPr>
-            <p:ph idx="1"/>
-          </p:nvPr>
-        </p:nvSpPr>
-        <p:spPr/>
-        <p:txBody>
-          <a:bodyPr/>
-          <a:lstStyle/>
-          <a:p>
-            <a:r>
               <a:rPr lang="da-DK" dirty="0" err="1" smtClean="0"/>
               <a:t>Hoisting</a:t>
             </a:r>
@@ -14189,7 +14087,7 @@
 </p:sld>
 </file>
 
-<file path=ppt/slides/slide19.xml><?xml version="1.0" encoding="utf-8"?>
+<file path=ppt/slides/slide18.xml><?xml version="1.0" encoding="utf-8"?>
 <p:sld xmlns:a="http://schemas.openxmlformats.org/drawingml/2006/main" xmlns:r="http://schemas.openxmlformats.org/officeDocument/2006/relationships" xmlns:p="http://schemas.openxmlformats.org/presentationml/2006/main">
   <p:cSld>
     <p:spTree>
@@ -14523,6 +14421,172 @@
 </p:sld>
 </file>
 
+<file path=ppt/slides/slide19.xml><?xml version="1.0" encoding="utf-8"?>
+<p:sld xmlns:a="http://schemas.openxmlformats.org/drawingml/2006/main" xmlns:r="http://schemas.openxmlformats.org/officeDocument/2006/relationships" xmlns:p="http://schemas.openxmlformats.org/presentationml/2006/main">
+  <p:cSld>
+    <p:spTree>
+      <p:nvGrpSpPr>
+        <p:cNvPr id="1" name=""/>
+        <p:cNvGrpSpPr/>
+        <p:nvPr/>
+      </p:nvGrpSpPr>
+      <p:grpSpPr>
+        <a:xfrm>
+          <a:off x="0" y="0"/>
+          <a:ext cx="0" cy="0"/>
+          <a:chOff x="0" y="0"/>
+          <a:chExt cx="0" cy="0"/>
+        </a:xfrm>
+      </p:grpSpPr>
+      <p:sp>
+        <p:nvSpPr>
+          <p:cNvPr id="2" name="Content Placeholder 1"/>
+          <p:cNvSpPr>
+            <a:spLocks noGrp="1"/>
+          </p:cNvSpPr>
+          <p:nvPr>
+            <p:ph idx="1"/>
+          </p:nvPr>
+        </p:nvSpPr>
+        <p:spPr/>
+        <p:txBody>
+          <a:bodyPr/>
+          <a:lstStyle/>
+          <a:p>
+            <a:r>
+              <a:rPr lang="da-DK" dirty="0" smtClean="0"/>
+              <a:t>Values </a:t>
+            </a:r>
+            <a:r>
+              <a:rPr lang="da-DK" dirty="0" err="1" smtClean="0"/>
+              <a:t>can</a:t>
+            </a:r>
+            <a:r>
+              <a:rPr lang="da-DK" dirty="0" smtClean="0"/>
+              <a:t> </a:t>
+            </a:r>
+            <a:r>
+              <a:rPr lang="da-DK" dirty="0" err="1" smtClean="0"/>
+              <a:t>be</a:t>
+            </a:r>
+            <a:r>
+              <a:rPr lang="da-DK" dirty="0" smtClean="0"/>
+              <a:t> </a:t>
+            </a:r>
+            <a:r>
+              <a:rPr lang="da-DK" dirty="0" err="1" smtClean="0"/>
+              <a:t>implicitly</a:t>
+            </a:r>
+            <a:r>
+              <a:rPr lang="da-DK" dirty="0" smtClean="0"/>
+              <a:t> or </a:t>
+            </a:r>
+            <a:r>
+              <a:rPr lang="da-DK" dirty="0" err="1" smtClean="0"/>
+              <a:t>explicitly</a:t>
+            </a:r>
+            <a:r>
+              <a:rPr lang="da-DK" dirty="0" smtClean="0"/>
+              <a:t> </a:t>
+            </a:r>
+            <a:r>
+              <a:rPr lang="da-DK" dirty="0" err="1" smtClean="0"/>
+              <a:t>coerced</a:t>
+            </a:r>
+            <a:r>
+              <a:rPr lang="da-DK" dirty="0" smtClean="0"/>
+              <a:t> to </a:t>
+            </a:r>
+            <a:r>
+              <a:rPr lang="da-DK" dirty="0" err="1" smtClean="0"/>
+              <a:t>other</a:t>
+            </a:r>
+            <a:r>
+              <a:rPr lang="da-DK" dirty="0" smtClean="0"/>
+              <a:t> types</a:t>
+            </a:r>
+          </a:p>
+          <a:p>
+            <a:r>
+              <a:rPr lang="da-DK" dirty="0" smtClean="0"/>
+              <a:t>== </a:t>
+            </a:r>
+            <a:r>
+              <a:rPr lang="da-DK" dirty="0" err="1" smtClean="0"/>
+              <a:t>vs</a:t>
+            </a:r>
+            <a:r>
+              <a:rPr lang="da-DK" dirty="0" smtClean="0"/>
+              <a:t> ===</a:t>
+            </a:r>
+          </a:p>
+          <a:p>
+            <a:endParaRPr lang="da-DK" dirty="0"/>
+          </a:p>
+        </p:txBody>
+      </p:sp>
+      <p:sp>
+        <p:nvSpPr>
+          <p:cNvPr id="3" name="Text Placeholder 2"/>
+          <p:cNvSpPr>
+            <a:spLocks noGrp="1"/>
+          </p:cNvSpPr>
+          <p:nvPr>
+            <p:ph type="body" sz="quarter" idx="17"/>
+          </p:nvPr>
+        </p:nvSpPr>
+        <p:spPr/>
+        <p:txBody>
+          <a:bodyPr/>
+          <a:lstStyle/>
+          <a:p>
+            <a:endParaRPr lang="da-DK"/>
+          </a:p>
+        </p:txBody>
+      </p:sp>
+      <p:sp>
+        <p:nvSpPr>
+          <p:cNvPr id="4" name="Title 3"/>
+          <p:cNvSpPr>
+            <a:spLocks noGrp="1"/>
+          </p:cNvSpPr>
+          <p:nvPr>
+            <p:ph type="title"/>
+          </p:nvPr>
+        </p:nvSpPr>
+        <p:spPr/>
+        <p:txBody>
+          <a:bodyPr/>
+          <a:lstStyle/>
+          <a:p>
+            <a:r>
+              <a:rPr lang="da-DK" dirty="0" err="1" smtClean="0"/>
+              <a:t>Coercion</a:t>
+            </a:r>
+            <a:endParaRPr lang="da-DK" dirty="0"/>
+          </a:p>
+        </p:txBody>
+      </p:sp>
+    </p:spTree>
+    <p:extLst>
+      <p:ext uri="{BB962C8B-B14F-4D97-AF65-F5344CB8AC3E}">
+        <p14:creationId xmlns:p14="http://schemas.microsoft.com/office/powerpoint/2010/main" val="3689320305"/>
+      </p:ext>
+    </p:extLst>
+  </p:cSld>
+  <p:clrMapOvr>
+    <a:masterClrMapping/>
+  </p:clrMapOvr>
+  <p:timing>
+    <p:tnLst>
+      <p:par>
+        <p:cTn id="1" dur="indefinite" restart="never" nodeType="tmRoot"/>
+      </p:par>
+    </p:tnLst>
+  </p:timing>
+</p:sld>
+</file>
+
 <file path=ppt/slides/slide2.xml><?xml version="1.0" encoding="utf-8"?>
 <p:sld xmlns:a="http://schemas.openxmlformats.org/drawingml/2006/main" xmlns:r="http://schemas.openxmlformats.org/officeDocument/2006/relationships" xmlns:p="http://schemas.openxmlformats.org/presentationml/2006/main">
   <p:cSld>
@@ -14579,13 +14643,15 @@
           <a:p>
             <a:r>
               <a:rPr lang="da-DK" dirty="0" smtClean="0"/>
-              <a:t>Language Features (mixed with samples and exercises)</a:t>
-            </a:r>
-          </a:p>
-          <a:p>
+              <a:t>Language Features (mixed with samples and </a:t>
+            </a:r>
+            <a:r>
+              <a:rPr lang="da-DK" dirty="0" err="1" smtClean="0"/>
+              <a:t>exercises</a:t>
+            </a:r>
             <a:r>
               <a:rPr lang="da-DK" dirty="0" smtClean="0"/>
-              <a:t>JavaScript and the dom</a:t>
+              <a:t>)</a:t>
             </a:r>
           </a:p>
           <a:p>
@@ -14717,13 +14783,167 @@
           <a:bodyPr/>
           <a:lstStyle/>
           <a:p>
-            <a:r>
-              <a:rPr lang="da-DK" dirty="0" smtClean="0"/>
-              <a:t>Values </a:t>
-            </a:r>
+            <a:pPr marL="0" indent="0">
+              <a:buNone/>
+            </a:pPr>
+            <a:r>
+              <a:rPr lang="en-US" sz="2000" dirty="0"/>
+              <a:t>All of JavaScript's values can be divided into two </a:t>
+            </a:r>
+            <a:r>
+              <a:rPr lang="en-US" sz="2000" dirty="0" smtClean="0"/>
+              <a:t>categories:</a:t>
+            </a:r>
+          </a:p>
+          <a:p>
+            <a:pPr marL="514350" indent="-514350">
+              <a:buFont typeface="+mj-lt"/>
+              <a:buAutoNum type="arabicPeriod"/>
+            </a:pPr>
+            <a:r>
+              <a:rPr lang="en-US" sz="2000" dirty="0"/>
+              <a:t>V</a:t>
+            </a:r>
+            <a:r>
+              <a:rPr lang="en-US" sz="2000" dirty="0" smtClean="0"/>
+              <a:t>alues </a:t>
+            </a:r>
+            <a:r>
+              <a:rPr lang="en-US" sz="2000" dirty="0"/>
+              <a:t>that will become false if coerced to </a:t>
+            </a:r>
+            <a:r>
+              <a:rPr lang="en-US" sz="2000" dirty="0" err="1" smtClean="0"/>
+              <a:t>boolean</a:t>
+            </a:r>
+            <a:endParaRPr lang="en-US" sz="2000" dirty="0" smtClean="0"/>
+          </a:p>
+          <a:p>
+            <a:pPr marL="514350" indent="-514350">
+              <a:buFont typeface="+mj-lt"/>
+              <a:buAutoNum type="arabicPeriod"/>
+            </a:pPr>
+            <a:r>
+              <a:rPr lang="en-US" sz="2000" dirty="0"/>
+              <a:t>E</a:t>
+            </a:r>
+            <a:r>
+              <a:rPr lang="en-US" sz="2000" dirty="0" smtClean="0"/>
+              <a:t>verything </a:t>
+            </a:r>
+            <a:r>
+              <a:rPr lang="en-US" sz="2000" dirty="0"/>
+              <a:t>else (which will obviously become true</a:t>
+            </a:r>
+            <a:r>
+              <a:rPr lang="en-US" sz="2000" dirty="0" smtClean="0"/>
+              <a:t>)</a:t>
+            </a:r>
+          </a:p>
+          <a:p>
+            <a:pPr marL="0" indent="0">
+              <a:buNone/>
+            </a:pPr>
+            <a:endParaRPr lang="en-US" sz="2000" dirty="0" smtClean="0"/>
+          </a:p>
+          <a:p>
+            <a:pPr marL="0" indent="0">
+              <a:buNone/>
+            </a:pPr>
+            <a:r>
+              <a:rPr lang="en-US" sz="2000" dirty="0" err="1" smtClean="0"/>
+              <a:t>Falsy</a:t>
+            </a:r>
+            <a:r>
+              <a:rPr lang="en-US" sz="2000" dirty="0" smtClean="0"/>
+              <a:t> values:</a:t>
+            </a:r>
+          </a:p>
+          <a:p>
+            <a:r>
+              <a:rPr lang="en-US" sz="2000" dirty="0" smtClean="0"/>
+              <a:t>undefined</a:t>
+            </a:r>
+            <a:endParaRPr lang="en-US" sz="2000" dirty="0"/>
+          </a:p>
+          <a:p>
+            <a:r>
+              <a:rPr lang="en-US" sz="2000" dirty="0"/>
+              <a:t>null</a:t>
+            </a:r>
+          </a:p>
+          <a:p>
+            <a:r>
+              <a:rPr lang="en-US" sz="2000" dirty="0"/>
+              <a:t>false</a:t>
+            </a:r>
+          </a:p>
+          <a:p>
+            <a:r>
+              <a:rPr lang="en-US" sz="2000" dirty="0" smtClean="0"/>
+              <a:t>0, </a:t>
+            </a:r>
+            <a:r>
+              <a:rPr lang="en-US" sz="2000" dirty="0"/>
+              <a:t>and </a:t>
+            </a:r>
+            <a:r>
+              <a:rPr lang="en-US" sz="2000" dirty="0" err="1"/>
+              <a:t>NaN</a:t>
+            </a:r>
+            <a:endParaRPr lang="en-US" sz="2000" dirty="0"/>
+          </a:p>
+          <a:p>
+            <a:r>
+              <a:rPr lang="en-US" sz="2000" dirty="0" smtClean="0"/>
+              <a:t>“”</a:t>
+            </a:r>
+          </a:p>
+          <a:p>
+            <a:endParaRPr lang="en-US" sz="2000" dirty="0"/>
+          </a:p>
+          <a:p>
+            <a:endParaRPr lang="en-US" sz="2000" dirty="0"/>
+          </a:p>
+        </p:txBody>
+      </p:sp>
+      <p:sp>
+        <p:nvSpPr>
+          <p:cNvPr id="3" name="Text Placeholder 2"/>
+          <p:cNvSpPr>
+            <a:spLocks noGrp="1"/>
+          </p:cNvSpPr>
+          <p:nvPr>
+            <p:ph type="body" sz="quarter" idx="17"/>
+          </p:nvPr>
+        </p:nvSpPr>
+        <p:spPr/>
+        <p:txBody>
+          <a:bodyPr/>
+          <a:lstStyle/>
+          <a:p>
+            <a:endParaRPr lang="da-DK" dirty="0"/>
+          </a:p>
+        </p:txBody>
+      </p:sp>
+      <p:sp>
+        <p:nvSpPr>
+          <p:cNvPr id="4" name="Title 3"/>
+          <p:cNvSpPr>
+            <a:spLocks noGrp="1"/>
+          </p:cNvSpPr>
+          <p:nvPr>
+            <p:ph type="title"/>
+          </p:nvPr>
+        </p:nvSpPr>
+        <p:spPr/>
+        <p:txBody>
+          <a:bodyPr/>
+          <a:lstStyle/>
+          <a:p>
             <a:r>
               <a:rPr lang="da-DK" dirty="0" err="1" smtClean="0"/>
-              <a:t>can</a:t>
+              <a:t>Falsy</a:t>
             </a:r>
             <a:r>
               <a:rPr lang="da-DK" dirty="0" smtClean="0"/>
@@ -14731,101 +14951,7 @@
             </a:r>
             <a:r>
               <a:rPr lang="da-DK" dirty="0" err="1" smtClean="0"/>
-              <a:t>be</a:t>
-            </a:r>
-            <a:r>
-              <a:rPr lang="da-DK" dirty="0" smtClean="0"/>
-              <a:t> </a:t>
-            </a:r>
-            <a:r>
-              <a:rPr lang="da-DK" dirty="0" err="1" smtClean="0"/>
-              <a:t>implicitly</a:t>
-            </a:r>
-            <a:r>
-              <a:rPr lang="da-DK" dirty="0" smtClean="0"/>
-              <a:t> or </a:t>
-            </a:r>
-            <a:r>
-              <a:rPr lang="da-DK" dirty="0" err="1" smtClean="0"/>
-              <a:t>explicitly</a:t>
-            </a:r>
-            <a:r>
-              <a:rPr lang="da-DK" dirty="0" smtClean="0"/>
-              <a:t> </a:t>
-            </a:r>
-            <a:r>
-              <a:rPr lang="da-DK" dirty="0" err="1" smtClean="0"/>
-              <a:t>coerced</a:t>
-            </a:r>
-            <a:r>
-              <a:rPr lang="da-DK" dirty="0" smtClean="0"/>
-              <a:t> to </a:t>
-            </a:r>
-            <a:r>
-              <a:rPr lang="da-DK" dirty="0" err="1" smtClean="0"/>
-              <a:t>other</a:t>
-            </a:r>
-            <a:r>
-              <a:rPr lang="da-DK" dirty="0" smtClean="0"/>
-              <a:t> types</a:t>
-            </a:r>
-          </a:p>
-          <a:p>
-            <a:r>
-              <a:rPr lang="da-DK" dirty="0" smtClean="0"/>
-              <a:t>== </a:t>
-            </a:r>
-            <a:r>
-              <a:rPr lang="da-DK" dirty="0" err="1" smtClean="0"/>
-              <a:t>vs</a:t>
-            </a:r>
-            <a:r>
-              <a:rPr lang="da-DK" dirty="0" smtClean="0"/>
-              <a:t> ===</a:t>
-            </a:r>
-          </a:p>
-          <a:p>
-            <a:endParaRPr lang="da-DK" dirty="0"/>
-          </a:p>
-        </p:txBody>
-      </p:sp>
-      <p:sp>
-        <p:nvSpPr>
-          <p:cNvPr id="3" name="Text Placeholder 2"/>
-          <p:cNvSpPr>
-            <a:spLocks noGrp="1"/>
-          </p:cNvSpPr>
-          <p:nvPr>
-            <p:ph type="body" sz="quarter" idx="17"/>
-          </p:nvPr>
-        </p:nvSpPr>
-        <p:spPr/>
-        <p:txBody>
-          <a:bodyPr/>
-          <a:lstStyle/>
-          <a:p>
-            <a:endParaRPr lang="da-DK"/>
-          </a:p>
-        </p:txBody>
-      </p:sp>
-      <p:sp>
-        <p:nvSpPr>
-          <p:cNvPr id="4" name="Title 3"/>
-          <p:cNvSpPr>
-            <a:spLocks noGrp="1"/>
-          </p:cNvSpPr>
-          <p:nvPr>
-            <p:ph type="title"/>
-          </p:nvPr>
-        </p:nvSpPr>
-        <p:spPr/>
-        <p:txBody>
-          <a:bodyPr/>
-          <a:lstStyle/>
-          <a:p>
-            <a:r>
-              <a:rPr lang="da-DK" dirty="0" err="1" smtClean="0"/>
-              <a:t>Coercion</a:t>
+              <a:t>values</a:t>
             </a:r>
             <a:endParaRPr lang="da-DK" dirty="0"/>
           </a:p>
@@ -14834,7 +14960,7 @@
     </p:spTree>
     <p:extLst>
       <p:ext uri="{BB962C8B-B14F-4D97-AF65-F5344CB8AC3E}">
-        <p14:creationId xmlns:p14="http://schemas.microsoft.com/office/powerpoint/2010/main" val="3689320305"/>
+        <p14:creationId xmlns:p14="http://schemas.microsoft.com/office/powerpoint/2010/main" val="287527280"/>
       </p:ext>
     </p:extLst>
   </p:cSld>
@@ -14887,232 +15013,6 @@
               <a:buNone/>
             </a:pPr>
             <a:r>
-              <a:rPr lang="en-US" sz="2000" dirty="0"/>
-              <a:t>All of JavaScript's values can be divided into two </a:t>
-            </a:r>
-            <a:r>
-              <a:rPr lang="en-US" sz="2000" dirty="0" smtClean="0"/>
-              <a:t>categories:</a:t>
-            </a:r>
-          </a:p>
-          <a:p>
-            <a:pPr marL="514350" indent="-514350">
-              <a:buFont typeface="+mj-lt"/>
-              <a:buAutoNum type="arabicPeriod"/>
-            </a:pPr>
-            <a:r>
-              <a:rPr lang="en-US" sz="2000" dirty="0"/>
-              <a:t>V</a:t>
-            </a:r>
-            <a:r>
-              <a:rPr lang="en-US" sz="2000" dirty="0" smtClean="0"/>
-              <a:t>alues </a:t>
-            </a:r>
-            <a:r>
-              <a:rPr lang="en-US" sz="2000" dirty="0"/>
-              <a:t>that will become false if coerced to </a:t>
-            </a:r>
-            <a:r>
-              <a:rPr lang="en-US" sz="2000" dirty="0" err="1" smtClean="0"/>
-              <a:t>boolean</a:t>
-            </a:r>
-            <a:endParaRPr lang="en-US" sz="2000" dirty="0" smtClean="0"/>
-          </a:p>
-          <a:p>
-            <a:pPr marL="514350" indent="-514350">
-              <a:buFont typeface="+mj-lt"/>
-              <a:buAutoNum type="arabicPeriod"/>
-            </a:pPr>
-            <a:r>
-              <a:rPr lang="en-US" sz="2000" dirty="0"/>
-              <a:t>E</a:t>
-            </a:r>
-            <a:r>
-              <a:rPr lang="en-US" sz="2000" dirty="0" smtClean="0"/>
-              <a:t>verything </a:t>
-            </a:r>
-            <a:r>
-              <a:rPr lang="en-US" sz="2000" dirty="0"/>
-              <a:t>else (which will obviously become true</a:t>
-            </a:r>
-            <a:r>
-              <a:rPr lang="en-US" sz="2000" dirty="0" smtClean="0"/>
-              <a:t>)</a:t>
-            </a:r>
-          </a:p>
-          <a:p>
-            <a:pPr marL="0" indent="0">
-              <a:buNone/>
-            </a:pPr>
-            <a:endParaRPr lang="en-US" sz="2000" dirty="0" smtClean="0"/>
-          </a:p>
-          <a:p>
-            <a:pPr marL="0" indent="0">
-              <a:buNone/>
-            </a:pPr>
-            <a:r>
-              <a:rPr lang="en-US" sz="2000" dirty="0" err="1" smtClean="0"/>
-              <a:t>Falsy</a:t>
-            </a:r>
-            <a:r>
-              <a:rPr lang="en-US" sz="2000" dirty="0" smtClean="0"/>
-              <a:t> values:</a:t>
-            </a:r>
-          </a:p>
-          <a:p>
-            <a:r>
-              <a:rPr lang="en-US" sz="2000" dirty="0" smtClean="0"/>
-              <a:t>undefined</a:t>
-            </a:r>
-            <a:endParaRPr lang="en-US" sz="2000" dirty="0"/>
-          </a:p>
-          <a:p>
-            <a:r>
-              <a:rPr lang="en-US" sz="2000" dirty="0"/>
-              <a:t>null</a:t>
-            </a:r>
-          </a:p>
-          <a:p>
-            <a:r>
-              <a:rPr lang="en-US" sz="2000" dirty="0"/>
-              <a:t>false</a:t>
-            </a:r>
-          </a:p>
-          <a:p>
-            <a:r>
-              <a:rPr lang="en-US" sz="2000" dirty="0" smtClean="0"/>
-              <a:t>0, </a:t>
-            </a:r>
-            <a:r>
-              <a:rPr lang="en-US" sz="2000" dirty="0"/>
-              <a:t>and </a:t>
-            </a:r>
-            <a:r>
-              <a:rPr lang="en-US" sz="2000" dirty="0" err="1"/>
-              <a:t>NaN</a:t>
-            </a:r>
-            <a:endParaRPr lang="en-US" sz="2000" dirty="0"/>
-          </a:p>
-          <a:p>
-            <a:r>
-              <a:rPr lang="en-US" sz="2000" dirty="0" smtClean="0"/>
-              <a:t>“”</a:t>
-            </a:r>
-          </a:p>
-          <a:p>
-            <a:endParaRPr lang="en-US" sz="2000" dirty="0"/>
-          </a:p>
-          <a:p>
-            <a:endParaRPr lang="en-US" sz="2000" dirty="0"/>
-          </a:p>
-        </p:txBody>
-      </p:sp>
-      <p:sp>
-        <p:nvSpPr>
-          <p:cNvPr id="3" name="Text Placeholder 2"/>
-          <p:cNvSpPr>
-            <a:spLocks noGrp="1"/>
-          </p:cNvSpPr>
-          <p:nvPr>
-            <p:ph type="body" sz="quarter" idx="17"/>
-          </p:nvPr>
-        </p:nvSpPr>
-        <p:spPr/>
-        <p:txBody>
-          <a:bodyPr/>
-          <a:lstStyle/>
-          <a:p>
-            <a:endParaRPr lang="da-DK" dirty="0"/>
-          </a:p>
-        </p:txBody>
-      </p:sp>
-      <p:sp>
-        <p:nvSpPr>
-          <p:cNvPr id="4" name="Title 3"/>
-          <p:cNvSpPr>
-            <a:spLocks noGrp="1"/>
-          </p:cNvSpPr>
-          <p:nvPr>
-            <p:ph type="title"/>
-          </p:nvPr>
-        </p:nvSpPr>
-        <p:spPr/>
-        <p:txBody>
-          <a:bodyPr/>
-          <a:lstStyle/>
-          <a:p>
-            <a:r>
-              <a:rPr lang="da-DK" dirty="0" err="1" smtClean="0"/>
-              <a:t>Falsy</a:t>
-            </a:r>
-            <a:r>
-              <a:rPr lang="da-DK" dirty="0" smtClean="0"/>
-              <a:t> </a:t>
-            </a:r>
-            <a:r>
-              <a:rPr lang="da-DK" dirty="0" err="1" smtClean="0"/>
-              <a:t>values</a:t>
-            </a:r>
-            <a:endParaRPr lang="da-DK" dirty="0"/>
-          </a:p>
-        </p:txBody>
-      </p:sp>
-    </p:spTree>
-    <p:extLst>
-      <p:ext uri="{BB962C8B-B14F-4D97-AF65-F5344CB8AC3E}">
-        <p14:creationId xmlns:p14="http://schemas.microsoft.com/office/powerpoint/2010/main" val="287527280"/>
-      </p:ext>
-    </p:extLst>
-  </p:cSld>
-  <p:clrMapOvr>
-    <a:masterClrMapping/>
-  </p:clrMapOvr>
-  <p:timing>
-    <p:tnLst>
-      <p:par>
-        <p:cTn id="1" dur="indefinite" restart="never" nodeType="tmRoot"/>
-      </p:par>
-    </p:tnLst>
-  </p:timing>
-</p:sld>
-</file>
-
-<file path=ppt/slides/slide22.xml><?xml version="1.0" encoding="utf-8"?>
-<p:sld xmlns:a="http://schemas.openxmlformats.org/drawingml/2006/main" xmlns:r="http://schemas.openxmlformats.org/officeDocument/2006/relationships" xmlns:p="http://schemas.openxmlformats.org/presentationml/2006/main">
-  <p:cSld>
-    <p:spTree>
-      <p:nvGrpSpPr>
-        <p:cNvPr id="1" name=""/>
-        <p:cNvGrpSpPr/>
-        <p:nvPr/>
-      </p:nvGrpSpPr>
-      <p:grpSpPr>
-        <a:xfrm>
-          <a:off x="0" y="0"/>
-          <a:ext cx="0" cy="0"/>
-          <a:chOff x="0" y="0"/>
-          <a:chExt cx="0" cy="0"/>
-        </a:xfrm>
-      </p:grpSpPr>
-      <p:sp>
-        <p:nvSpPr>
-          <p:cNvPr id="2" name="Content Placeholder 1"/>
-          <p:cNvSpPr>
-            <a:spLocks noGrp="1"/>
-          </p:cNvSpPr>
-          <p:nvPr>
-            <p:ph idx="1"/>
-          </p:nvPr>
-        </p:nvSpPr>
-        <p:spPr/>
-        <p:txBody>
-          <a:bodyPr/>
-          <a:lstStyle/>
-          <a:p>
-            <a:pPr marL="0" indent="0">
-              <a:buNone/>
-            </a:pPr>
-            <a:r>
               <a:rPr lang="da-DK" dirty="0" err="1"/>
               <a:t>f</a:t>
             </a:r>
@@ -15236,7 +15136,7 @@
 </p:sld>
 </file>
 
-<file path=ppt/slides/slide23.xml><?xml version="1.0" encoding="utf-8"?>
+<file path=ppt/slides/slide22.xml><?xml version="1.0" encoding="utf-8"?>
 <p:sld xmlns:a="http://schemas.openxmlformats.org/drawingml/2006/main" xmlns:r="http://schemas.openxmlformats.org/officeDocument/2006/relationships" xmlns:p="http://schemas.openxmlformats.org/presentationml/2006/main">
   <p:cSld>
     <p:spTree>
@@ -15863,7 +15763,7 @@
           </a:p>
           <a:p>
             <a:r>
-              <a:rPr lang="da-DK" smtClean="0"/>
+              <a:rPr lang="da-DK" dirty="0" smtClean="0"/>
               <a:t>Variables</a:t>
             </a:r>
             <a:endParaRPr lang="da-DK" dirty="0"/>

</xml_diff>